<commit_message>
adding updates to ppt
</commit_message>
<xml_diff>
--- a/MABC_CONF_2024/Poster_MABC_2024.pptx
+++ b/MABC_CONF_2024/Poster_MABC_2024.pptx
@@ -2997,8 +2997,8 @@
         </p:blipFill>
         <p:spPr bwMode="auto">
           <a:xfrm>
-            <a:off x="731520" y="2009140"/>
-            <a:ext cx="7874000" cy="1651000"/>
+            <a:off x="247124" y="1530554"/>
+            <a:ext cx="9668948" cy="2027360"/>
           </a:xfrm>
           <a:prstGeom prst="rect">
             <a:avLst/>
@@ -3015,6 +3015,433 @@
           </a:extLst>
         </p:spPr>
       </p:pic>
+      <p:pic>
+        <p:nvPicPr>
+          <p:cNvPr id="1028" name="Picture 4" descr="A green circle with white text&#10;&#10;Description automatically generated">
+            <a:extLst>
+              <a:ext uri="{FF2B5EF4-FFF2-40B4-BE49-F238E27FC236}">
+                <a16:creationId xmlns:a16="http://schemas.microsoft.com/office/drawing/2014/main" id="{31660AEB-0CD6-C2A1-AB7B-D825DE4513C1}"/>
+              </a:ext>
+            </a:extLst>
+          </p:cNvPr>
+          <p:cNvPicPr>
+            <a:picLocks noChangeAspect="1" noChangeArrowheads="1"/>
+          </p:cNvPicPr>
+          <p:nvPr/>
+        </p:nvPicPr>
+        <p:blipFill>
+          <a:blip r:embed="rId3">
+            <a:extLst>
+              <a:ext uri="{28A0092B-C50C-407E-A947-70E740481C1C}">
+                <a14:useLocalDpi xmlns:a14="http://schemas.microsoft.com/office/drawing/2010/main" val="0"/>
+              </a:ext>
+            </a:extLst>
+          </a:blip>
+          <a:srcRect/>
+          <a:stretch>
+            <a:fillRect/>
+          </a:stretch>
+        </p:blipFill>
+        <p:spPr bwMode="auto">
+          <a:xfrm>
+            <a:off x="34906476" y="1530554"/>
+            <a:ext cx="3251200" cy="3251200"/>
+          </a:xfrm>
+          <a:prstGeom prst="rect">
+            <a:avLst/>
+          </a:prstGeom>
+          <a:noFill/>
+          <a:extLst>
+            <a:ext uri="{909E8E84-426E-40DD-AFC4-6F175D3DCCD1}">
+              <a14:hiddenFill xmlns:a14="http://schemas.microsoft.com/office/drawing/2010/main">
+                <a:solidFill>
+                  <a:srgbClr val="FFFFFF"/>
+                </a:solidFill>
+              </a14:hiddenFill>
+            </a:ext>
+          </a:extLst>
+        </p:spPr>
+      </p:pic>
+      <p:sp>
+        <p:nvSpPr>
+          <p:cNvPr id="5" name="TextBox 4">
+            <a:extLst>
+              <a:ext uri="{FF2B5EF4-FFF2-40B4-BE49-F238E27FC236}">
+                <a16:creationId xmlns:a16="http://schemas.microsoft.com/office/drawing/2014/main" id="{F3847CC7-E71B-EA5A-0615-0D0B4D21F9E5}"/>
+              </a:ext>
+            </a:extLst>
+          </p:cNvPr>
+          <p:cNvSpPr txBox="1"/>
+          <p:nvPr/>
+        </p:nvSpPr>
+        <p:spPr>
+          <a:xfrm>
+            <a:off x="922304" y="-166065"/>
+            <a:ext cx="38523348" cy="3393237"/>
+          </a:xfrm>
+          <a:prstGeom prst="rect">
+            <a:avLst/>
+          </a:prstGeom>
+          <a:noFill/>
+        </p:spPr>
+        <p:txBody>
+          <a:bodyPr wrap="square">
+            <a:spAutoFit/>
+          </a:bodyPr>
+          <a:lstStyle/>
+          <a:p>
+            <a:pPr algn="ctr" rtl="0">
+              <a:spcBef>
+                <a:spcPts val="0"/>
+              </a:spcBef>
+              <a:spcAft>
+                <a:spcPts val="300"/>
+              </a:spcAft>
+            </a:pPr>
+            <a:r>
+              <a:rPr lang="en-US" sz="8800" b="1" i="0" dirty="0">
+                <a:solidFill>
+                  <a:schemeClr val="accent1"/>
+                </a:solidFill>
+                <a:effectLst/>
+                <a:latin typeface="Calibri" panose="020F0502020204030204" pitchFamily="34" charset="0"/>
+                <a:cs typeface="Calibri" panose="020F0502020204030204" pitchFamily="34" charset="0"/>
+              </a:rPr>
+              <a:t> Standardization</a:t>
+            </a:r>
+            <a:r>
+              <a:rPr lang="en-US" sz="8800" b="1" i="0" u="none" strike="noStrike" dirty="0">
+                <a:solidFill>
+                  <a:schemeClr val="accent1"/>
+                </a:solidFill>
+                <a:effectLst/>
+                <a:latin typeface="Calibri" panose="020F0502020204030204" pitchFamily="34" charset="0"/>
+                <a:cs typeface="Calibri" panose="020F0502020204030204" pitchFamily="34" charset="0"/>
+              </a:rPr>
+              <a:t> of Tumor Names in  NIH-Clinical Trials Registry using Large Language Model Embedding Analysis</a:t>
+            </a:r>
+            <a:endParaRPr lang="en-US" sz="8800" b="1" dirty="0">
+              <a:solidFill>
+                <a:schemeClr val="accent1"/>
+              </a:solidFill>
+              <a:effectLst/>
+              <a:latin typeface="Calibri" panose="020F0502020204030204" pitchFamily="34" charset="0"/>
+              <a:cs typeface="Calibri" panose="020F0502020204030204" pitchFamily="34" charset="0"/>
+            </a:endParaRPr>
+          </a:p>
+          <a:p>
+            <a:br>
+              <a:rPr lang="en-US" dirty="0"/>
+            </a:br>
+            <a:endParaRPr lang="en-US" dirty="0"/>
+          </a:p>
+        </p:txBody>
+      </p:sp>
+      <p:sp>
+        <p:nvSpPr>
+          <p:cNvPr id="8" name="TextBox 7">
+            <a:extLst>
+              <a:ext uri="{FF2B5EF4-FFF2-40B4-BE49-F238E27FC236}">
+                <a16:creationId xmlns:a16="http://schemas.microsoft.com/office/drawing/2014/main" id="{9A961976-F7E4-D3FD-E1DE-80E3EBFDC226}"/>
+              </a:ext>
+            </a:extLst>
+          </p:cNvPr>
+          <p:cNvSpPr txBox="1"/>
+          <p:nvPr/>
+        </p:nvSpPr>
+        <p:spPr>
+          <a:xfrm>
+            <a:off x="10590508" y="3020925"/>
+            <a:ext cx="20777200" cy="1323439"/>
+          </a:xfrm>
+          <a:prstGeom prst="rect">
+            <a:avLst/>
+          </a:prstGeom>
+          <a:noFill/>
+        </p:spPr>
+        <p:txBody>
+          <a:bodyPr wrap="square" rtlCol="0">
+            <a:spAutoFit/>
+          </a:bodyPr>
+          <a:lstStyle/>
+          <a:p>
+            <a:pPr algn="ctr"/>
+            <a:r>
+              <a:rPr lang="en-US" sz="4000" b="0" i="0" u="none" strike="noStrike" dirty="0">
+                <a:solidFill>
+                  <a:srgbClr val="000000"/>
+                </a:solidFill>
+                <a:effectLst/>
+                <a:latin typeface="Arial" panose="020B0604020202020204" pitchFamily="34" charset="0"/>
+              </a:rPr>
+              <a:t>Aditya Lahiri</a:t>
+            </a:r>
+            <a:r>
+              <a:rPr lang="en-US" sz="4000" b="0" i="0" u="none" strike="noStrike" baseline="30000" dirty="0">
+                <a:solidFill>
+                  <a:srgbClr val="000000"/>
+                </a:solidFill>
+                <a:effectLst/>
+                <a:latin typeface="Arial" panose="020B0604020202020204" pitchFamily="34" charset="0"/>
+              </a:rPr>
+              <a:t>1</a:t>
+            </a:r>
+            <a:r>
+              <a:rPr lang="en-US" sz="4000" b="0" i="0" u="none" strike="noStrike" dirty="0">
+                <a:solidFill>
+                  <a:srgbClr val="000000"/>
+                </a:solidFill>
+                <a:effectLst/>
+                <a:latin typeface="Arial" panose="020B0604020202020204" pitchFamily="34" charset="0"/>
+              </a:rPr>
+              <a:t>, Sangeeta Shukla</a:t>
+            </a:r>
+            <a:r>
+              <a:rPr lang="en-US" sz="4000" b="0" i="0" u="none" strike="noStrike" baseline="30000" dirty="0">
+                <a:solidFill>
+                  <a:srgbClr val="000000"/>
+                </a:solidFill>
+                <a:effectLst/>
+                <a:latin typeface="Arial" panose="020B0604020202020204" pitchFamily="34" charset="0"/>
+              </a:rPr>
+              <a:t>1</a:t>
+            </a:r>
+            <a:r>
+              <a:rPr lang="en-US" sz="4000" b="0" i="0" u="none" strike="noStrike" dirty="0">
+                <a:solidFill>
+                  <a:srgbClr val="000000"/>
+                </a:solidFill>
+                <a:effectLst/>
+                <a:latin typeface="Arial" panose="020B0604020202020204" pitchFamily="34" charset="0"/>
+              </a:rPr>
+              <a:t>, Ben Stear</a:t>
+            </a:r>
+            <a:r>
+              <a:rPr lang="en-US" sz="4000" b="0" i="0" u="none" strike="noStrike" baseline="30000" dirty="0">
+                <a:solidFill>
+                  <a:srgbClr val="000000"/>
+                </a:solidFill>
+                <a:effectLst/>
+                <a:latin typeface="Arial" panose="020B0604020202020204" pitchFamily="34" charset="0"/>
+              </a:rPr>
+              <a:t>1</a:t>
+            </a:r>
+            <a:r>
+              <a:rPr lang="en-US" sz="4000" b="0" i="0" u="none" strike="noStrike" dirty="0">
+                <a:solidFill>
+                  <a:srgbClr val="000000"/>
+                </a:solidFill>
+                <a:effectLst/>
+                <a:latin typeface="Arial" panose="020B0604020202020204" pitchFamily="34" charset="0"/>
+              </a:rPr>
+              <a:t>, Taha </a:t>
+            </a:r>
+            <a:r>
+              <a:rPr lang="en-US" sz="4000" b="0" i="0" u="none" strike="noStrike" dirty="0" err="1">
+                <a:solidFill>
+                  <a:srgbClr val="000000"/>
+                </a:solidFill>
+                <a:effectLst/>
+                <a:latin typeface="Arial" panose="020B0604020202020204" pitchFamily="34" charset="0"/>
+              </a:rPr>
+              <a:t>Mohseni</a:t>
+            </a:r>
+            <a:r>
+              <a:rPr lang="en-US" sz="4000" b="0" i="0" u="none" strike="noStrike" dirty="0">
+                <a:solidFill>
+                  <a:srgbClr val="000000"/>
+                </a:solidFill>
+                <a:effectLst/>
+                <a:latin typeface="Arial" panose="020B0604020202020204" pitchFamily="34" charset="0"/>
+              </a:rPr>
+              <a:t> Ahooyi</a:t>
+            </a:r>
+            <a:r>
+              <a:rPr lang="en-US" sz="4000" b="0" i="0" u="none" strike="noStrike" baseline="30000" dirty="0">
+                <a:solidFill>
+                  <a:srgbClr val="000000"/>
+                </a:solidFill>
+                <a:effectLst/>
+                <a:latin typeface="Arial" panose="020B0604020202020204" pitchFamily="34" charset="0"/>
+              </a:rPr>
+              <a:t>1</a:t>
+            </a:r>
+            <a:r>
+              <a:rPr lang="en-US" sz="4000" b="0" i="0" u="none" strike="noStrike" dirty="0">
+                <a:solidFill>
+                  <a:srgbClr val="000000"/>
+                </a:solidFill>
+                <a:effectLst/>
+                <a:latin typeface="Arial" panose="020B0604020202020204" pitchFamily="34" charset="0"/>
+              </a:rPr>
+              <a:t>, Katherine Beigel</a:t>
+            </a:r>
+            <a:r>
+              <a:rPr lang="en-US" sz="4000" b="0" i="0" u="none" strike="noStrike" baseline="30000" dirty="0">
+                <a:solidFill>
+                  <a:srgbClr val="000000"/>
+                </a:solidFill>
+                <a:effectLst/>
+                <a:latin typeface="Arial" panose="020B0604020202020204" pitchFamily="34" charset="0"/>
+              </a:rPr>
+              <a:t>1</a:t>
+            </a:r>
+            <a:r>
+              <a:rPr lang="en-US" sz="4000" b="0" i="0" u="none" strike="noStrike" dirty="0">
+                <a:solidFill>
+                  <a:srgbClr val="000000"/>
+                </a:solidFill>
+                <a:effectLst/>
+                <a:latin typeface="Arial" panose="020B0604020202020204" pitchFamily="34" charset="0"/>
+              </a:rPr>
+              <a:t>, Elizabeth Margolskee</a:t>
+            </a:r>
+            <a:r>
+              <a:rPr lang="en-US" sz="4000" b="0" i="0" u="none" strike="noStrike" baseline="30000" dirty="0">
+                <a:solidFill>
+                  <a:srgbClr val="000000"/>
+                </a:solidFill>
+                <a:effectLst/>
+                <a:latin typeface="Arial" panose="020B0604020202020204" pitchFamily="34" charset="0"/>
+              </a:rPr>
+              <a:t>2</a:t>
+            </a:r>
+            <a:r>
+              <a:rPr lang="en-US" sz="4000" b="0" i="0" u="none" strike="noStrike" dirty="0">
+                <a:solidFill>
+                  <a:srgbClr val="000000"/>
+                </a:solidFill>
+                <a:effectLst/>
+                <a:latin typeface="Arial" panose="020B0604020202020204" pitchFamily="34" charset="0"/>
+              </a:rPr>
+              <a:t>, Deanne Taylor</a:t>
+            </a:r>
+            <a:r>
+              <a:rPr lang="en-US" sz="4000" b="0" i="0" u="none" strike="noStrike" baseline="30000" dirty="0">
+                <a:solidFill>
+                  <a:srgbClr val="000000"/>
+                </a:solidFill>
+                <a:effectLst/>
+                <a:latin typeface="Arial" panose="020B0604020202020204" pitchFamily="34" charset="0"/>
+              </a:rPr>
+              <a:t>1,3</a:t>
+            </a:r>
+            <a:r>
+              <a:rPr lang="en-US" sz="4000" b="0" i="0" u="none" strike="noStrike" dirty="0">
+                <a:solidFill>
+                  <a:srgbClr val="000000"/>
+                </a:solidFill>
+                <a:effectLst/>
+                <a:latin typeface="Arial" panose="020B0604020202020204" pitchFamily="34" charset="0"/>
+              </a:rPr>
+              <a:t> </a:t>
+            </a:r>
+            <a:endParaRPr lang="en-US" sz="4000" dirty="0"/>
+          </a:p>
+        </p:txBody>
+      </p:sp>
+      <p:sp>
+        <p:nvSpPr>
+          <p:cNvPr id="9" name="TextBox 8">
+            <a:extLst>
+              <a:ext uri="{FF2B5EF4-FFF2-40B4-BE49-F238E27FC236}">
+                <a16:creationId xmlns:a16="http://schemas.microsoft.com/office/drawing/2014/main" id="{91E81AE8-2A56-DA41-FAAC-DB78F7CCEC2F}"/>
+              </a:ext>
+            </a:extLst>
+          </p:cNvPr>
+          <p:cNvSpPr txBox="1"/>
+          <p:nvPr/>
+        </p:nvSpPr>
+        <p:spPr>
+          <a:xfrm>
+            <a:off x="3856382" y="4395024"/>
+            <a:ext cx="31884730" cy="1231106"/>
+          </a:xfrm>
+          <a:prstGeom prst="rect">
+            <a:avLst/>
+          </a:prstGeom>
+          <a:noFill/>
+        </p:spPr>
+        <p:txBody>
+          <a:bodyPr wrap="square" rtlCol="0">
+            <a:spAutoFit/>
+          </a:bodyPr>
+          <a:lstStyle/>
+          <a:p>
+            <a:pPr algn="ctr" rtl="0" fontAlgn="base">
+              <a:spcBef>
+                <a:spcPts val="0"/>
+              </a:spcBef>
+              <a:spcAft>
+                <a:spcPts val="0"/>
+              </a:spcAft>
+            </a:pPr>
+            <a:r>
+              <a:rPr lang="en-US" sz="2800" i="0" u="none" strike="noStrike" baseline="30000" dirty="0">
+                <a:solidFill>
+                  <a:srgbClr val="000000"/>
+                </a:solidFill>
+                <a:effectLst/>
+                <a:latin typeface="Arial" panose="020B0604020202020204" pitchFamily="34" charset="0"/>
+              </a:rPr>
+              <a:t>1 </a:t>
+            </a:r>
+            <a:r>
+              <a:rPr lang="en-US" sz="2800" b="0" i="0" u="none" strike="noStrike" dirty="0">
+                <a:solidFill>
+                  <a:srgbClr val="000000"/>
+                </a:solidFill>
+                <a:effectLst/>
+                <a:latin typeface="Arial" panose="020B0604020202020204" pitchFamily="34" charset="0"/>
+              </a:rPr>
+              <a:t>The Department of Biomedical and Health Informatics, The Children’s Hospital of Philadelphia, Philadelphia PA ; </a:t>
+            </a:r>
+            <a:r>
+              <a:rPr lang="en-US" sz="2800" i="0" u="none" strike="noStrike" baseline="30000" dirty="0">
+                <a:solidFill>
+                  <a:srgbClr val="000000"/>
+                </a:solidFill>
+                <a:effectLst/>
+                <a:latin typeface="Arial" panose="020B0604020202020204" pitchFamily="34" charset="0"/>
+              </a:rPr>
+              <a:t>2</a:t>
+            </a:r>
+            <a:r>
+              <a:rPr lang="en-US" sz="2800" b="0" i="0" u="none" strike="noStrike" dirty="0">
+                <a:solidFill>
+                  <a:srgbClr val="000000"/>
+                </a:solidFill>
+                <a:effectLst/>
+                <a:latin typeface="Arial" panose="020B0604020202020204" pitchFamily="34" charset="0"/>
+              </a:rPr>
+              <a:t>Department of Pathology &amp; Laboratory Medicine, Children's Hospital of Philadelphia, Philadelphia PA ; </a:t>
+            </a:r>
+            <a:r>
+              <a:rPr lang="en-US" sz="2800" i="0" u="none" strike="noStrike" baseline="30000" dirty="0">
+                <a:solidFill>
+                  <a:srgbClr val="000000"/>
+                </a:solidFill>
+                <a:effectLst/>
+                <a:latin typeface="Arial" panose="020B0604020202020204" pitchFamily="34" charset="0"/>
+              </a:rPr>
+              <a:t>3</a:t>
+            </a:r>
+            <a:r>
+              <a:rPr lang="en-US" sz="2800" b="0" i="0" u="none" strike="noStrike" dirty="0">
+                <a:solidFill>
+                  <a:srgbClr val="000000"/>
+                </a:solidFill>
+                <a:effectLst/>
+                <a:latin typeface="Arial" panose="020B0604020202020204" pitchFamily="34" charset="0"/>
+              </a:rPr>
+              <a:t>Department of Pediatrics, University of Pennsylvania Perelman Medical School, Philadelphia PA </a:t>
+            </a:r>
+          </a:p>
+          <a:p>
+            <a:endParaRPr lang="en-US" dirty="0"/>
+          </a:p>
+        </p:txBody>
+      </p:sp>
     </p:spTree>
     <p:extLst>
       <p:ext uri="{BB962C8B-B14F-4D97-AF65-F5344CB8AC3E}">

</xml_diff>

<commit_message>
database definition added to poster
</commit_message>
<xml_diff>
--- a/MABC_CONF_2024/Poster_MABC_2024.pptx
+++ b/MABC_CONF_2024/Poster_MABC_2024.pptx
@@ -4469,6 +4469,204 @@
           </a:prstGeom>
         </p:spPr>
       </p:pic>
+      <p:sp>
+        <p:nvSpPr>
+          <p:cNvPr id="23" name="TextBox 22">
+            <a:extLst>
+              <a:ext uri="{FF2B5EF4-FFF2-40B4-BE49-F238E27FC236}">
+                <a16:creationId xmlns:a16="http://schemas.microsoft.com/office/drawing/2014/main" id="{D37B5267-DD78-579C-EBB2-963E48C0E1E1}"/>
+              </a:ext>
+            </a:extLst>
+          </p:cNvPr>
+          <p:cNvSpPr txBox="1"/>
+          <p:nvPr/>
+        </p:nvSpPr>
+        <p:spPr>
+          <a:xfrm>
+            <a:off x="449589" y="33947267"/>
+            <a:ext cx="16781364" cy="6514604"/>
+          </a:xfrm>
+          <a:prstGeom prst="rect">
+            <a:avLst/>
+          </a:prstGeom>
+          <a:noFill/>
+        </p:spPr>
+        <p:txBody>
+          <a:bodyPr wrap="square">
+            <a:spAutoFit/>
+          </a:bodyPr>
+          <a:lstStyle/>
+          <a:p>
+            <a:pPr algn="just">
+              <a:spcAft>
+                <a:spcPts val="2000"/>
+              </a:spcAft>
+            </a:pPr>
+            <a:r>
+              <a:rPr lang="en-US" sz="3200" dirty="0">
+                <a:effectLst/>
+                <a:latin typeface="Calibri" panose="020F0502020204030204" pitchFamily="34" charset="0"/>
+                <a:cs typeface="Calibri" panose="020F0502020204030204" pitchFamily="34" charset="0"/>
+              </a:rPr>
+              <a:t>The Clinical Trials (CT) registry contains information on drugs used for treating various conditions. From the CT registry, we extracted </a:t>
+            </a:r>
+            <a:r>
+              <a:rPr lang="en-US" sz="3200" b="0" i="0" u="none" strike="noStrike" dirty="0">
+                <a:solidFill>
+                  <a:srgbClr val="000000"/>
+                </a:solidFill>
+                <a:effectLst/>
+                <a:latin typeface="Calibri" panose="020F0502020204030204" pitchFamily="34" charset="0"/>
+                <a:cs typeface="Calibri" panose="020F0502020204030204" pitchFamily="34" charset="0"/>
+              </a:rPr>
+              <a:t> 801,197 records of conditions. Our pipeline extracted 105,483 unique diseases of which 13,230 were tumors. Among the 13,230 tumors, 6324 tumors were pediatric tumors. </a:t>
+            </a:r>
+          </a:p>
+          <a:p>
+            <a:pPr algn="just">
+              <a:spcAft>
+                <a:spcPts val="2000"/>
+              </a:spcAft>
+            </a:pPr>
+            <a:endParaRPr lang="en-US" sz="3200" dirty="0">
+              <a:solidFill>
+                <a:srgbClr val="000000"/>
+              </a:solidFill>
+              <a:latin typeface="Calibri" panose="020F0502020204030204" pitchFamily="34" charset="0"/>
+              <a:cs typeface="Calibri" panose="020F0502020204030204" pitchFamily="34" charset="0"/>
+            </a:endParaRPr>
+          </a:p>
+          <a:p>
+            <a:pPr algn="just">
+              <a:spcAft>
+                <a:spcPts val="2000"/>
+              </a:spcAft>
+            </a:pPr>
+            <a:r>
+              <a:rPr lang="en-US" sz="3200" dirty="0">
+                <a:effectLst/>
+                <a:latin typeface="Calibri" panose="020F0502020204030204" pitchFamily="34" charset="0"/>
+                <a:cs typeface="Calibri" panose="020F0502020204030204" pitchFamily="34" charset="0"/>
+              </a:rPr>
+              <a:t>The WHO Tumor Classification database consists names of adult and pediatric tumors. The database is considered the gold standard for tumor nomenclature and is used for standardization of the tumors identified from the CT registry. We considered  5</a:t>
+            </a:r>
+            <a:r>
+              <a:rPr lang="en-US" sz="3200" baseline="30000" dirty="0">
+                <a:effectLst/>
+                <a:latin typeface="Calibri" panose="020F0502020204030204" pitchFamily="34" charset="0"/>
+                <a:cs typeface="Calibri" panose="020F0502020204030204" pitchFamily="34" charset="0"/>
+              </a:rPr>
+              <a:t>th</a:t>
+            </a:r>
+            <a:r>
+              <a:rPr lang="en-US" sz="3200" dirty="0">
+                <a:effectLst/>
+                <a:latin typeface="Calibri" panose="020F0502020204030204" pitchFamily="34" charset="0"/>
+                <a:cs typeface="Calibri" panose="020F0502020204030204" pitchFamily="34" charset="0"/>
+              </a:rPr>
+              <a:t>, 4</a:t>
+            </a:r>
+            <a:r>
+              <a:rPr lang="en-US" sz="3200" baseline="30000" dirty="0">
+                <a:effectLst/>
+                <a:latin typeface="Calibri" panose="020F0502020204030204" pitchFamily="34" charset="0"/>
+                <a:cs typeface="Calibri" panose="020F0502020204030204" pitchFamily="34" charset="0"/>
+              </a:rPr>
+              <a:t>th</a:t>
+            </a:r>
+            <a:r>
+              <a:rPr lang="en-US" sz="3200" dirty="0">
+                <a:effectLst/>
+                <a:latin typeface="Calibri" panose="020F0502020204030204" pitchFamily="34" charset="0"/>
+                <a:cs typeface="Calibri" panose="020F0502020204030204" pitchFamily="34" charset="0"/>
+              </a:rPr>
+              <a:t> and 3</a:t>
+            </a:r>
+            <a:r>
+              <a:rPr lang="en-US" sz="3200" baseline="30000" dirty="0">
+                <a:effectLst/>
+                <a:latin typeface="Calibri" panose="020F0502020204030204" pitchFamily="34" charset="0"/>
+                <a:cs typeface="Calibri" panose="020F0502020204030204" pitchFamily="34" charset="0"/>
+              </a:rPr>
+              <a:t>rd</a:t>
+            </a:r>
+            <a:r>
+              <a:rPr lang="en-US" sz="3200" dirty="0">
+                <a:effectLst/>
+                <a:latin typeface="Calibri" panose="020F0502020204030204" pitchFamily="34" charset="0"/>
+                <a:cs typeface="Calibri" panose="020F0502020204030204" pitchFamily="34" charset="0"/>
+              </a:rPr>
+              <a:t> editions of the WHO Tumor Classification database for standardizing the tumor </a:t>
+            </a:r>
+            <a:r>
+              <a:rPr lang="en-US" sz="3200" dirty="0">
+                <a:latin typeface="Calibri" panose="020F0502020204030204" pitchFamily="34" charset="0"/>
+                <a:cs typeface="Calibri" panose="020F0502020204030204" pitchFamily="34" charset="0"/>
+              </a:rPr>
+              <a:t>names in the </a:t>
+            </a:r>
+            <a:r>
+              <a:rPr lang="en-US" sz="3200" dirty="0">
+                <a:effectLst/>
+                <a:latin typeface="Calibri" panose="020F0502020204030204" pitchFamily="34" charset="0"/>
+                <a:cs typeface="Calibri" panose="020F0502020204030204" pitchFamily="34" charset="0"/>
+              </a:rPr>
+              <a:t>CT registry. </a:t>
+            </a:r>
+            <a:br>
+              <a:rPr lang="en-US" sz="3200" dirty="0">
+                <a:effectLst/>
+                <a:latin typeface="Calibri" panose="020F0502020204030204" pitchFamily="34" charset="0"/>
+                <a:cs typeface="Calibri" panose="020F0502020204030204" pitchFamily="34" charset="0"/>
+              </a:rPr>
+            </a:br>
+            <a:br>
+              <a:rPr lang="en-US" sz="3200" dirty="0">
+                <a:effectLst/>
+                <a:latin typeface="Calibri" panose="020F0502020204030204" pitchFamily="34" charset="0"/>
+                <a:cs typeface="Calibri" panose="020F0502020204030204" pitchFamily="34" charset="0"/>
+              </a:rPr>
+            </a:br>
+            <a:r>
+              <a:rPr lang="en-US" sz="3200" dirty="0">
+                <a:effectLst/>
+                <a:latin typeface="Calibri" panose="020F0502020204030204" pitchFamily="34" charset="0"/>
+                <a:cs typeface="Calibri" panose="020F0502020204030204" pitchFamily="34" charset="0"/>
+              </a:rPr>
+              <a:t>The Nationa</a:t>
+            </a:r>
+            <a:r>
+              <a:rPr lang="en-US" sz="3200" dirty="0">
+                <a:latin typeface="Calibri" panose="020F0502020204030204" pitchFamily="34" charset="0"/>
+                <a:cs typeface="Calibri" panose="020F0502020204030204" pitchFamily="34" charset="0"/>
+              </a:rPr>
+              <a:t>l Cancer Institute thesaurus (</a:t>
+            </a:r>
+            <a:r>
+              <a:rPr lang="en-US" sz="3200" dirty="0" err="1">
+                <a:latin typeface="Calibri" panose="020F0502020204030204" pitchFamily="34" charset="0"/>
+                <a:cs typeface="Calibri" panose="020F0502020204030204" pitchFamily="34" charset="0"/>
+              </a:rPr>
+              <a:t>NCIt</a:t>
+            </a:r>
+            <a:r>
+              <a:rPr lang="en-US" sz="3200" dirty="0">
+                <a:latin typeface="Calibri" panose="020F0502020204030204" pitchFamily="34" charset="0"/>
+                <a:cs typeface="Calibri" panose="020F0502020204030204" pitchFamily="34" charset="0"/>
+              </a:rPr>
+              <a:t>) also provides standardized tumor terms and it is also used for standardizing the tumor names from the clinical trials registry.  </a:t>
+            </a:r>
+            <a:r>
+              <a:rPr lang="en-US" sz="3200" dirty="0">
+                <a:effectLst/>
+                <a:latin typeface="Calibri" panose="020F0502020204030204" pitchFamily="34" charset="0"/>
+                <a:cs typeface="Calibri" panose="020F0502020204030204" pitchFamily="34" charset="0"/>
+              </a:rPr>
+              <a:t> </a:t>
+            </a:r>
+          </a:p>
+        </p:txBody>
+      </p:sp>
     </p:spTree>
     <p:extLst>
       <p:ext uri="{BB962C8B-B14F-4D97-AF65-F5344CB8AC3E}">

</xml_diff>

<commit_message>
adding methods update, building short image for pipeline
</commit_message>
<xml_diff>
--- a/MABC_CONF_2024/Poster_MABC_2024.pptx
+++ b/MABC_CONF_2024/Poster_MABC_2024.pptx
@@ -3924,7 +3924,7 @@
         <p:spPr>
           <a:xfrm>
             <a:off x="449589" y="6119881"/>
-            <a:ext cx="16623792" cy="938712"/>
+            <a:ext cx="16860148" cy="938712"/>
           </a:xfrm>
           <a:prstGeom prst="rect">
             <a:avLst/>
@@ -3970,8 +3970,8 @@
         </p:nvSpPr>
         <p:spPr>
           <a:xfrm>
-            <a:off x="528375" y="19226983"/>
-            <a:ext cx="16623792" cy="938712"/>
+            <a:off x="449588" y="18227514"/>
+            <a:ext cx="16860149" cy="938712"/>
           </a:xfrm>
           <a:prstGeom prst="rect">
             <a:avLst/>
@@ -4017,8 +4017,8 @@
         </p:nvSpPr>
         <p:spPr>
           <a:xfrm>
-            <a:off x="449589" y="37420639"/>
-            <a:ext cx="16623792" cy="938712"/>
+            <a:off x="370801" y="35631948"/>
+            <a:ext cx="16938937" cy="938712"/>
           </a:xfrm>
           <a:prstGeom prst="rect">
             <a:avLst/>
@@ -4064,8 +4064,8 @@
         </p:nvSpPr>
         <p:spPr>
           <a:xfrm>
-            <a:off x="449589" y="6970876"/>
-            <a:ext cx="16781364" cy="12957393"/>
+            <a:off x="370803" y="7122504"/>
+            <a:ext cx="16781364" cy="11480066"/>
           </a:xfrm>
           <a:prstGeom prst="rect">
             <a:avLst/>
@@ -4078,7 +4078,7 @@
           </a:bodyPr>
           <a:lstStyle/>
           <a:p>
-            <a:pPr rtl="0">
+            <a:pPr algn="just" rtl="0">
               <a:spcBef>
                 <a:spcPts val="0"/>
               </a:spcBef>
@@ -4095,7 +4095,62 @@
                 <a:latin typeface="Calibri" panose="020F0502020204030204" pitchFamily="34" charset="0"/>
                 <a:cs typeface="Calibri" panose="020F0502020204030204" pitchFamily="34" charset="0"/>
               </a:rPr>
-              <a:t>Objective:</a:t>
+              <a:t>Objective: </a:t>
+            </a:r>
+            <a:r>
+              <a:rPr lang="en-US" sz="3200" b="0" i="0" u="none" strike="noStrike" dirty="0">
+                <a:solidFill>
+                  <a:srgbClr val="0E101A"/>
+                </a:solidFill>
+                <a:effectLst/>
+                <a:latin typeface="Calibri" panose="020F0502020204030204" pitchFamily="34" charset="0"/>
+                <a:cs typeface="Calibri" panose="020F0502020204030204" pitchFamily="34" charset="0"/>
+              </a:rPr>
+              <a:t>This study aimed to extract tumor names from the National Institute of Health's (NIH) clinical trials registry (</a:t>
+            </a:r>
+            <a:r>
+              <a:rPr lang="en-US" sz="3200" b="0" i="0" u="none" strike="noStrike" dirty="0" err="1">
+                <a:solidFill>
+                  <a:srgbClr val="0E101A"/>
+                </a:solidFill>
+                <a:effectLst/>
+                <a:latin typeface="Calibri" panose="020F0502020204030204" pitchFamily="34" charset="0"/>
+                <a:cs typeface="Calibri" panose="020F0502020204030204" pitchFamily="34" charset="0"/>
+              </a:rPr>
+              <a:t>ClinicalTrials.gov</a:t>
+            </a:r>
+            <a:r>
+              <a:rPr lang="en-US" sz="3200" b="0" i="0" u="none" strike="noStrike" dirty="0">
+                <a:solidFill>
+                  <a:srgbClr val="0E101A"/>
+                </a:solidFill>
+                <a:effectLst/>
+                <a:latin typeface="Calibri" panose="020F0502020204030204" pitchFamily="34" charset="0"/>
+                <a:cs typeface="Calibri" panose="020F0502020204030204" pitchFamily="34" charset="0"/>
+              </a:rPr>
+              <a:t>) and standardize them according to the corresponding tumor terminology established in the World Health Organization's (WHO) tumor classification system and the National Cancer Institute Thesaurus (</a:t>
+            </a:r>
+            <a:r>
+              <a:rPr lang="en-US" sz="3200" b="0" i="0" u="none" strike="noStrike" dirty="0" err="1">
+                <a:solidFill>
+                  <a:srgbClr val="0E101A"/>
+                </a:solidFill>
+                <a:effectLst/>
+                <a:latin typeface="Calibri" panose="020F0502020204030204" pitchFamily="34" charset="0"/>
+                <a:cs typeface="Calibri" panose="020F0502020204030204" pitchFamily="34" charset="0"/>
+              </a:rPr>
+              <a:t>NCIt</a:t>
+            </a:r>
+            <a:r>
+              <a:rPr lang="en-US" sz="3200" b="0" i="0" u="none" strike="noStrike" dirty="0">
+                <a:solidFill>
+                  <a:srgbClr val="0E101A"/>
+                </a:solidFill>
+                <a:effectLst/>
+                <a:latin typeface="Calibri" panose="020F0502020204030204" pitchFamily="34" charset="0"/>
+                <a:cs typeface="Calibri" panose="020F0502020204030204" pitchFamily="34" charset="0"/>
+              </a:rPr>
+              <a:t>).</a:t>
             </a:r>
             <a:endParaRPr lang="en-US" sz="3200" b="0" dirty="0">
               <a:effectLst/>
@@ -4104,7 +4159,7 @@
             </a:endParaRPr>
           </a:p>
           <a:p>
-            <a:pPr rtl="0">
+            <a:pPr algn="just" rtl="0">
               <a:spcBef>
                 <a:spcPts val="0"/>
               </a:spcBef>
@@ -4113,6 +4168,24 @@
               </a:spcAft>
             </a:pPr>
             <a:r>
+              <a:rPr lang="en-US" sz="3200" b="1" i="0" u="none" strike="noStrike" dirty="0">
+                <a:solidFill>
+                  <a:srgbClr val="0E101A"/>
+                </a:solidFill>
+                <a:effectLst/>
+                <a:latin typeface="Calibri" panose="020F0502020204030204" pitchFamily="34" charset="0"/>
+                <a:cs typeface="Calibri" panose="020F0502020204030204" pitchFamily="34" charset="0"/>
+              </a:rPr>
+              <a:t>Materials and Methods:</a:t>
+            </a:r>
+            <a:r>
+              <a:rPr lang="en-US" sz="3200" dirty="0">
+                <a:latin typeface="Calibri" panose="020F0502020204030204" pitchFamily="34" charset="0"/>
+                <a:cs typeface="Calibri" panose="020F0502020204030204" pitchFamily="34" charset="0"/>
+              </a:rPr>
+              <a:t> </a:t>
+            </a:r>
+            <a:r>
               <a:rPr lang="en-US" sz="3200" b="0" i="0" u="none" strike="noStrike" dirty="0">
                 <a:solidFill>
                   <a:srgbClr val="0E101A"/>
@@ -4121,51 +4194,7 @@
                 <a:latin typeface="Calibri" panose="020F0502020204030204" pitchFamily="34" charset="0"/>
                 <a:cs typeface="Calibri" panose="020F0502020204030204" pitchFamily="34" charset="0"/>
               </a:rPr>
-              <a:t>This study aimed to extract tumor names from the National Institute of Health's (NIH) clinical trials registry (</a:t>
-            </a:r>
-            <a:r>
-              <a:rPr lang="en-US" sz="3200" b="0" i="0" u="none" strike="noStrike" dirty="0" err="1">
-                <a:solidFill>
-                  <a:srgbClr val="0E101A"/>
-                </a:solidFill>
-                <a:effectLst/>
-                <a:latin typeface="Calibri" panose="020F0502020204030204" pitchFamily="34" charset="0"/>
-                <a:cs typeface="Calibri" panose="020F0502020204030204" pitchFamily="34" charset="0"/>
-              </a:rPr>
-              <a:t>ClinicalTrials.gov</a:t>
-            </a:r>
-            <a:r>
-              <a:rPr lang="en-US" sz="3200" b="0" i="0" u="none" strike="noStrike" dirty="0">
-                <a:solidFill>
-                  <a:srgbClr val="0E101A"/>
-                </a:solidFill>
-                <a:effectLst/>
-                <a:latin typeface="Calibri" panose="020F0502020204030204" pitchFamily="34" charset="0"/>
-                <a:cs typeface="Calibri" panose="020F0502020204030204" pitchFamily="34" charset="0"/>
-              </a:rPr>
-              <a:t>) and standardize them according to the corresponding tumor terminology established in the World Health Organization's (WHO) tumor classification system and the National Cancer Institute Thesaurus (</a:t>
-            </a:r>
-            <a:r>
-              <a:rPr lang="en-US" sz="3200" b="0" i="0" u="none" strike="noStrike" dirty="0" err="1">
-                <a:solidFill>
-                  <a:srgbClr val="0E101A"/>
-                </a:solidFill>
-                <a:effectLst/>
-                <a:latin typeface="Calibri" panose="020F0502020204030204" pitchFamily="34" charset="0"/>
-                <a:cs typeface="Calibri" panose="020F0502020204030204" pitchFamily="34" charset="0"/>
-              </a:rPr>
-              <a:t>NCIt</a:t>
-            </a:r>
-            <a:r>
-              <a:rPr lang="en-US" sz="3200" b="0" i="0" u="none" strike="noStrike" dirty="0">
-                <a:solidFill>
-                  <a:srgbClr val="0E101A"/>
-                </a:solidFill>
-                <a:effectLst/>
-                <a:latin typeface="Calibri" panose="020F0502020204030204" pitchFamily="34" charset="0"/>
-                <a:cs typeface="Calibri" panose="020F0502020204030204" pitchFamily="34" charset="0"/>
-              </a:rPr>
-              <a:t>).</a:t>
+              <a:t>We developed a computational pipeline that loads the disease data file from NIH's clinical trials registry and identifies tumors from the rest of the diseases. Following the tumor identification, each tumor from the registry is mapped to a standardized tumor terminology from the WHO tumor classification system and NCIT using twelve text standardization methods based on text-similarity and text-embedding methods. We evaluate each of these methods on a subset of tumors derived from the registry to evaluate their accuracies in mapping the tumors to their standardized tumor terminology in the WHO tumor classification system. We limit the accuracy evaluation to only the WHO tumor classification system as it is considered the gold standard for tumor nomenclature.</a:t>
             </a:r>
             <a:endParaRPr lang="en-US" sz="3200" b="0" dirty="0">
               <a:effectLst/>
@@ -4174,7 +4203,7 @@
             </a:endParaRPr>
           </a:p>
           <a:p>
-            <a:pPr rtl="0">
+            <a:pPr algn="just" rtl="0">
               <a:spcBef>
                 <a:spcPts val="0"/>
               </a:spcBef>
@@ -4191,7 +4220,25 @@
                 <a:latin typeface="Calibri" panose="020F0502020204030204" pitchFamily="34" charset="0"/>
                 <a:cs typeface="Calibri" panose="020F0502020204030204" pitchFamily="34" charset="0"/>
               </a:rPr>
-              <a:t>Materials and Methods:</a:t>
+              <a:t>Results:</a:t>
+            </a:r>
+            <a:r>
+              <a:rPr lang="en-US" sz="3200" dirty="0">
+                <a:latin typeface="Calibri" panose="020F0502020204030204" pitchFamily="34" charset="0"/>
+                <a:cs typeface="Calibri" panose="020F0502020204030204" pitchFamily="34" charset="0"/>
+              </a:rPr>
+              <a:t> </a:t>
+            </a:r>
+            <a:r>
+              <a:rPr lang="en-US" sz="3200" b="0" i="0" u="none" strike="noStrike" dirty="0">
+                <a:solidFill>
+                  <a:srgbClr val="0E101A"/>
+                </a:solidFill>
+                <a:effectLst/>
+                <a:latin typeface="Calibri" panose="020F0502020204030204" pitchFamily="34" charset="0"/>
+                <a:cs typeface="Calibri" panose="020F0502020204030204" pitchFamily="34" charset="0"/>
+              </a:rPr>
+              <a:t>Our results revealed that embedding-based text standardization methods outperformed methods based on text-matching algorithms. We generated two different sets of embeddings from OpenAI’s large language models and observed that accuracy of methods improved with embeddings that had higher dimensions. In particular, we found that finding the closest WHO term to a given tumor name from the registry using Euclidean distance outperformed the other methods.</a:t>
             </a:r>
             <a:endParaRPr lang="en-US" sz="3200" b="0" dirty="0">
               <a:effectLst/>
@@ -4200,7 +4247,7 @@
             </a:endParaRPr>
           </a:p>
           <a:p>
-            <a:pPr rtl="0">
+            <a:pPr algn="just" rtl="0">
               <a:spcBef>
                 <a:spcPts val="0"/>
               </a:spcBef>
@@ -4209,7 +4256,7 @@
               </a:spcAft>
             </a:pPr>
             <a:r>
-              <a:rPr lang="en-US" sz="3200" b="0" i="0" u="none" strike="noStrike" dirty="0">
+              <a:rPr lang="en-US" sz="3200" b="1" i="0" u="none" strike="noStrike" dirty="0">
                 <a:solidFill>
                   <a:srgbClr val="0E101A"/>
                 </a:solidFill>
@@ -4217,101 +4264,15 @@
                 <a:latin typeface="Calibri" panose="020F0502020204030204" pitchFamily="34" charset="0"/>
                 <a:cs typeface="Calibri" panose="020F0502020204030204" pitchFamily="34" charset="0"/>
               </a:rPr>
-              <a:t>We developed a computational pipeline that loads the disease data file from NIH's clinical trials registry and identifies tumors from the rest of the diseases. Following the tumor identification, each tumor from the registry is mapped to a standardized tumor terminology from the WHO tumor classification system and NCIT using twelve text standardization methods based on text-similarity and text-embedding methods. We evaluate each of these methods on a subset of tumors derived from the registry to evaluate their accuracies in mapping the tumors to their standardized tumor terminology in the WHO tumor classification system. We limit the accuracy evaluation to only the WHO tumor classification system as it is considered the gold standard for tumor nomenclature.</a:t>
-            </a:r>
-            <a:endParaRPr lang="en-US" sz="3200" b="0" dirty="0">
-              <a:effectLst/>
-              <a:latin typeface="Calibri" panose="020F0502020204030204" pitchFamily="34" charset="0"/>
-              <a:cs typeface="Calibri" panose="020F0502020204030204" pitchFamily="34" charset="0"/>
-            </a:endParaRPr>
-          </a:p>
-          <a:p>
-            <a:pPr rtl="0">
-              <a:spcBef>
-                <a:spcPts val="0"/>
-              </a:spcBef>
-              <a:spcAft>
-                <a:spcPts val="0"/>
-              </a:spcAft>
-            </a:pPr>
-            <a:r>
-              <a:rPr lang="en-US" sz="3200" b="1" i="0" u="none" strike="noStrike" dirty="0">
-                <a:solidFill>
-                  <a:srgbClr val="0E101A"/>
-                </a:solidFill>
-                <a:effectLst/>
-                <a:latin typeface="Calibri" panose="020F0502020204030204" pitchFamily="34" charset="0"/>
-                <a:cs typeface="Calibri" panose="020F0502020204030204" pitchFamily="34" charset="0"/>
-              </a:rPr>
-              <a:t>Results:</a:t>
-            </a:r>
-            <a:endParaRPr lang="en-US" sz="3200" b="0" dirty="0">
-              <a:effectLst/>
-              <a:latin typeface="Calibri" panose="020F0502020204030204" pitchFamily="34" charset="0"/>
-              <a:cs typeface="Calibri" panose="020F0502020204030204" pitchFamily="34" charset="0"/>
-            </a:endParaRPr>
-          </a:p>
-          <a:p>
-            <a:pPr rtl="0">
-              <a:spcBef>
-                <a:spcPts val="0"/>
-              </a:spcBef>
-              <a:spcAft>
-                <a:spcPts val="0"/>
-              </a:spcAft>
-            </a:pPr>
-            <a:r>
-              <a:rPr lang="en-US" sz="3200" b="0" i="0" u="none" strike="noStrike" dirty="0">
-                <a:solidFill>
-                  <a:srgbClr val="0E101A"/>
-                </a:solidFill>
-                <a:effectLst/>
-                <a:latin typeface="Calibri" panose="020F0502020204030204" pitchFamily="34" charset="0"/>
-                <a:cs typeface="Calibri" panose="020F0502020204030204" pitchFamily="34" charset="0"/>
-              </a:rPr>
-              <a:t>Our results revealed that embedding-based text standardization methods outperformed methods based on text-matching algorithms. We generated two different sets of embeddings from OpenAI’s large language models and observed that accuracy of methods improved with embeddings that had higher dimensions. In particular, we found that finding the closest WHO term to a given tumor name from the registry using Euclidean distance outperformed the other methods.</a:t>
-            </a:r>
-            <a:endParaRPr lang="en-US" sz="3200" b="0" dirty="0">
-              <a:effectLst/>
-              <a:latin typeface="Calibri" panose="020F0502020204030204" pitchFamily="34" charset="0"/>
-              <a:cs typeface="Calibri" panose="020F0502020204030204" pitchFamily="34" charset="0"/>
-            </a:endParaRPr>
-          </a:p>
-          <a:p>
-            <a:pPr rtl="0">
-              <a:spcBef>
-                <a:spcPts val="0"/>
-              </a:spcBef>
-              <a:spcAft>
-                <a:spcPts val="0"/>
-              </a:spcAft>
-            </a:pPr>
-            <a:r>
-              <a:rPr lang="en-US" sz="3200" b="1" i="0" u="none" strike="noStrike" dirty="0">
-                <a:solidFill>
-                  <a:srgbClr val="0E101A"/>
-                </a:solidFill>
-                <a:effectLst/>
-                <a:latin typeface="Calibri" panose="020F0502020204030204" pitchFamily="34" charset="0"/>
-                <a:cs typeface="Calibri" panose="020F0502020204030204" pitchFamily="34" charset="0"/>
-              </a:rPr>
               <a:t>Discussion and Conclusion:</a:t>
             </a:r>
-            <a:endParaRPr lang="en-US" sz="3200" b="0" dirty="0">
-              <a:effectLst/>
-              <a:latin typeface="Calibri" panose="020F0502020204030204" pitchFamily="34" charset="0"/>
-              <a:cs typeface="Calibri" panose="020F0502020204030204" pitchFamily="34" charset="0"/>
-            </a:endParaRPr>
-          </a:p>
-          <a:p>
-            <a:pPr rtl="0">
-              <a:spcBef>
-                <a:spcPts val="0"/>
-              </a:spcBef>
-              <a:spcAft>
-                <a:spcPts val="0"/>
-              </a:spcAft>
-            </a:pPr>
+            <a:r>
+              <a:rPr lang="en-US" sz="3200" dirty="0">
+                <a:latin typeface="Calibri" panose="020F0502020204030204" pitchFamily="34" charset="0"/>
+                <a:cs typeface="Calibri" panose="020F0502020204030204" pitchFamily="34" charset="0"/>
+              </a:rPr>
+              <a:t> </a:t>
+            </a:r>
             <a:r>
               <a:rPr lang="en-US" sz="3200" b="0" i="0" u="none" strike="noStrike" dirty="0">
                 <a:solidFill>
@@ -4406,8 +4367,8 @@
         </p:blipFill>
         <p:spPr>
           <a:xfrm>
-            <a:off x="5293439" y="44656627"/>
-            <a:ext cx="6560316" cy="2139034"/>
+            <a:off x="4760597" y="37065076"/>
+            <a:ext cx="6113349" cy="2548647"/>
           </a:xfrm>
           <a:prstGeom prst="rect">
             <a:avLst/>
@@ -4436,8 +4397,8 @@
         </p:blipFill>
         <p:spPr>
           <a:xfrm>
-            <a:off x="12727460" y="44654637"/>
-            <a:ext cx="5041558" cy="1876255"/>
+            <a:off x="11623328" y="37065076"/>
+            <a:ext cx="5686409" cy="2282520"/>
           </a:xfrm>
           <a:prstGeom prst="rect">
             <a:avLst/>
@@ -4466,7 +4427,7 @@
         </p:blipFill>
         <p:spPr>
           <a:xfrm>
-            <a:off x="449589" y="44654637"/>
+            <a:off x="370802" y="37014259"/>
             <a:ext cx="3640413" cy="2928450"/>
           </a:xfrm>
           <a:prstGeom prst="rect">
@@ -4488,7 +4449,7 @@
         </p:nvSpPr>
         <p:spPr>
           <a:xfrm>
-            <a:off x="528376" y="38478484"/>
+            <a:off x="370801" y="40496284"/>
             <a:ext cx="16781364" cy="5765681"/>
           </a:xfrm>
           <a:prstGeom prst="rect">
@@ -4679,7 +4640,7 @@
         </p:nvSpPr>
         <p:spPr>
           <a:xfrm>
-            <a:off x="18282684" y="20002229"/>
+            <a:off x="18282684" y="26551310"/>
             <a:ext cx="16623792" cy="938712"/>
           </a:xfrm>
           <a:prstGeom prst="rect">
@@ -4726,7 +4687,7 @@
         </p:nvSpPr>
         <p:spPr>
           <a:xfrm>
-            <a:off x="18282684" y="31218847"/>
+            <a:off x="18282684" y="37539772"/>
             <a:ext cx="16623792" cy="938712"/>
           </a:xfrm>
           <a:prstGeom prst="rect">
@@ -4773,7 +4734,7 @@
         </p:nvSpPr>
         <p:spPr>
           <a:xfrm>
-            <a:off x="18282684" y="38331868"/>
+            <a:off x="18282684" y="47546118"/>
             <a:ext cx="16623792" cy="938712"/>
           </a:xfrm>
           <a:prstGeom prst="rect">
@@ -4820,8 +4781,8 @@
         </p:nvSpPr>
         <p:spPr>
           <a:xfrm>
-            <a:off x="528376" y="20376571"/>
-            <a:ext cx="16781364" cy="16619934"/>
+            <a:off x="370802" y="19296454"/>
+            <a:ext cx="16938937" cy="16619934"/>
           </a:xfrm>
           <a:prstGeom prst="rect">
             <a:avLst/>
@@ -4834,7 +4795,7 @@
           </a:bodyPr>
           <a:lstStyle/>
           <a:p>
-            <a:pPr>
+            <a:pPr algn="just">
               <a:spcBef>
                 <a:spcPts val="0"/>
               </a:spcBef>
@@ -4993,7 +4954,7 @@
             </a:r>
           </a:p>
           <a:p>
-            <a:pPr>
+            <a:pPr algn="just">
               <a:spcBef>
                 <a:spcPts val="0"/>
               </a:spcBef>
@@ -5011,7 +4972,7 @@
             </a:endParaRPr>
           </a:p>
           <a:p>
-            <a:pPr>
+            <a:pPr algn="just">
               <a:spcBef>
                 <a:spcPts val="0"/>
               </a:spcBef>
@@ -5054,7 +5015,7 @@
             </a:r>
           </a:p>
           <a:p>
-            <a:pPr>
+            <a:pPr algn="just">
               <a:spcBef>
                 <a:spcPts val="0"/>
               </a:spcBef>
@@ -5072,7 +5033,7 @@
             </a:endParaRPr>
           </a:p>
           <a:p>
-            <a:pPr>
+            <a:pPr algn="just">
               <a:spcBef>
                 <a:spcPts val="0"/>
               </a:spcBef>
@@ -5093,7 +5054,7 @@
             </a:r>
           </a:p>
           <a:p>
-            <a:pPr>
+            <a:pPr algn="just">
               <a:spcBef>
                 <a:spcPts val="0"/>
               </a:spcBef>
@@ -5116,7 +5077,7 @@
             </a:r>
           </a:p>
           <a:p>
-            <a:pPr>
+            <a:pPr algn="just">
               <a:spcBef>
                 <a:spcPts val="0"/>
               </a:spcBef>
@@ -5139,7 +5100,7 @@
             </a:r>
           </a:p>
           <a:p>
-            <a:pPr>
+            <a:pPr algn="just">
               <a:spcBef>
                 <a:spcPts val="0"/>
               </a:spcBef>
@@ -5184,7 +5145,7 @@
             </a:r>
           </a:p>
           <a:p>
-            <a:pPr>
+            <a:pPr algn="just">
               <a:spcBef>
                 <a:spcPts val="0"/>
               </a:spcBef>
@@ -5204,7 +5165,7 @@
             </a:endParaRPr>
           </a:p>
           <a:p>
-            <a:pPr>
+            <a:pPr algn="just">
               <a:spcBef>
                 <a:spcPts val="0"/>
               </a:spcBef>
@@ -5226,6 +5187,77 @@
           </a:p>
           <a:p>
             <a:endParaRPr lang="en-US" dirty="0"/>
+          </a:p>
+        </p:txBody>
+      </p:sp>
+      <p:sp>
+        <p:nvSpPr>
+          <p:cNvPr id="16" name="TextBox 15">
+            <a:extLst>
+              <a:ext uri="{FF2B5EF4-FFF2-40B4-BE49-F238E27FC236}">
+                <a16:creationId xmlns:a16="http://schemas.microsoft.com/office/drawing/2014/main" id="{27B3E798-9FE3-5AAC-46DF-5DAB0F88680C}"/>
+              </a:ext>
+            </a:extLst>
+          </p:cNvPr>
+          <p:cNvSpPr txBox="1"/>
+          <p:nvPr/>
+        </p:nvSpPr>
+        <p:spPr>
+          <a:xfrm>
+            <a:off x="18282684" y="7299647"/>
+            <a:ext cx="16884646" cy="5509200"/>
+          </a:xfrm>
+          <a:prstGeom prst="rect">
+            <a:avLst/>
+          </a:prstGeom>
+          <a:noFill/>
+        </p:spPr>
+        <p:txBody>
+          <a:bodyPr wrap="square" rtlCol="0">
+            <a:spAutoFit/>
+          </a:bodyPr>
+          <a:lstStyle/>
+          <a:p>
+            <a:r>
+              <a:rPr lang="en-US" sz="3200" dirty="0">
+                <a:latin typeface="Calibri" panose="020F0502020204030204" pitchFamily="34" charset="0"/>
+                <a:cs typeface="Calibri" panose="020F0502020204030204" pitchFamily="34" charset="0"/>
+              </a:rPr>
+              <a:t>We implemented several methods based on text-matching and text-embedding to standardize the tumor terms in the CT registry with respect to the WHO and </a:t>
+            </a:r>
+            <a:r>
+              <a:rPr lang="en-US" sz="3200" dirty="0" err="1">
+                <a:latin typeface="Calibri" panose="020F0502020204030204" pitchFamily="34" charset="0"/>
+                <a:cs typeface="Calibri" panose="020F0502020204030204" pitchFamily="34" charset="0"/>
+              </a:rPr>
+              <a:t>NCIt</a:t>
+            </a:r>
+            <a:r>
+              <a:rPr lang="en-US" sz="3200" dirty="0">
+                <a:latin typeface="Calibri" panose="020F0502020204030204" pitchFamily="34" charset="0"/>
+                <a:cs typeface="Calibri" panose="020F0502020204030204" pitchFamily="34" charset="0"/>
+              </a:rPr>
+              <a:t> databases. Text matching methods are based on edit distances, which are a class of metric that quantifies the syntactical differences between strings. The larger the edit distance between two strings, the further apart the strings are; thus, two strings with minimal edit distance could convey the same meaning. Text embeddings, on the other hand, are low-dimensional numeric vector representations of unstructured text data. Unlike edit distances, text embeddings focus on capturing the semantic and contextual meaning of the input text they encode; consequently, in the embedding vector space, texts with similar meanings should have embeddings close to each other, and texts that differ in meaning should be further apart </a:t>
+            </a:r>
+            <a:r>
+              <a:rPr lang="en-US" sz="3200" dirty="0">
+                <a:solidFill>
+                  <a:srgbClr val="4A6EE0"/>
+                </a:solidFill>
+                <a:effectLst/>
+                <a:latin typeface="Calibri" panose="020F0502020204030204" pitchFamily="34" charset="0"/>
+                <a:cs typeface="Calibri" panose="020F0502020204030204" pitchFamily="34" charset="0"/>
+                <a:hlinkClick r:id="rId13"/>
+              </a:rPr>
+              <a:t>[21–24]</a:t>
+            </a:r>
+            <a:r>
+              <a:rPr lang="en-US" sz="3200" dirty="0">
+                <a:latin typeface="Calibri" panose="020F0502020204030204" pitchFamily="34" charset="0"/>
+                <a:cs typeface="Calibri" panose="020F0502020204030204" pitchFamily="34" charset="0"/>
+              </a:rPr>
+              <a:t>. The several methods used for standardizing tumor names in the CT registry is described in the pipeline schematic below. </a:t>
+            </a:r>
           </a:p>
         </p:txBody>
       </p:sp>

</xml_diff>

<commit_message>
adding MABC methods update
</commit_message>
<xml_diff>
--- a/MABC_CONF_2024/Poster_MABC_2024.pptx
+++ b/MABC_CONF_2024/Poster_MABC_2024.pptx
@@ -4312,8 +4312,8 @@
         </p:nvSpPr>
         <p:spPr>
           <a:xfrm>
-            <a:off x="18282684" y="6119881"/>
-            <a:ext cx="16623792" cy="938712"/>
+            <a:off x="17539395" y="6018353"/>
+            <a:ext cx="20415816" cy="938712"/>
           </a:xfrm>
           <a:prstGeom prst="rect">
             <a:avLst/>
@@ -4449,7 +4449,7 @@
         </p:nvSpPr>
         <p:spPr>
           <a:xfrm>
-            <a:off x="370801" y="40496284"/>
+            <a:off x="304122" y="40207557"/>
             <a:ext cx="16781364" cy="5765681"/>
           </a:xfrm>
           <a:prstGeom prst="rect">
@@ -4640,8 +4640,8 @@
         </p:nvSpPr>
         <p:spPr>
           <a:xfrm>
-            <a:off x="18282684" y="26551310"/>
-            <a:ext cx="16623792" cy="938712"/>
+            <a:off x="17827511" y="34495398"/>
+            <a:ext cx="19433003" cy="938712"/>
           </a:xfrm>
           <a:prstGeom prst="rect">
             <a:avLst/>
@@ -4734,8 +4734,8 @@
         </p:nvSpPr>
         <p:spPr>
           <a:xfrm>
-            <a:off x="18282684" y="47546118"/>
-            <a:ext cx="16623792" cy="938712"/>
+            <a:off x="-1" y="46610020"/>
+            <a:ext cx="38404801" cy="938712"/>
           </a:xfrm>
           <a:prstGeom prst="rect">
             <a:avLst/>
@@ -4762,7 +4762,7 @@
                 <a:latin typeface="Calibri" panose="020F0502020204030204" pitchFamily="34" charset="0"/>
                 <a:cs typeface="Calibri" panose="020F0502020204030204" pitchFamily="34" charset="0"/>
               </a:rPr>
-              <a:t>Reference</a:t>
+              <a:t>References</a:t>
             </a:r>
           </a:p>
         </p:txBody>
@@ -5204,8 +5204,8 @@
         </p:nvSpPr>
         <p:spPr>
           <a:xfrm>
-            <a:off x="18282684" y="7299647"/>
-            <a:ext cx="16884646" cy="5509200"/>
+            <a:off x="17438161" y="19537560"/>
+            <a:ext cx="20618281" cy="4524315"/>
           </a:xfrm>
           <a:prstGeom prst="rect">
             <a:avLst/>
@@ -5218,6 +5218,7 @@
           </a:bodyPr>
           <a:lstStyle/>
           <a:p>
+            <a:pPr algn="just"/>
             <a:r>
               <a:rPr lang="en-US" sz="3200" dirty="0">
                 <a:latin typeface="Calibri" panose="020F0502020204030204" pitchFamily="34" charset="0"/>
@@ -5256,8 +5257,287 @@
                 <a:latin typeface="Calibri" panose="020F0502020204030204" pitchFamily="34" charset="0"/>
                 <a:cs typeface="Calibri" panose="020F0502020204030204" pitchFamily="34" charset="0"/>
               </a:rPr>
-              <a:t>. The several methods used for standardizing tumor names in the CT registry is described in the pipeline schematic below. </a:t>
-            </a:r>
+              <a:t>. The several methods used for standardizing tumor names in the CT registry is described and also depicted in the pipeline below. </a:t>
+            </a:r>
+          </a:p>
+        </p:txBody>
+      </p:sp>
+      <p:pic>
+        <p:nvPicPr>
+          <p:cNvPr id="32" name="Picture 31" descr="A diagram of a company&#10;&#10;Description automatically generated">
+            <a:extLst>
+              <a:ext uri="{FF2B5EF4-FFF2-40B4-BE49-F238E27FC236}">
+                <a16:creationId xmlns:a16="http://schemas.microsoft.com/office/drawing/2014/main" id="{02E85AC4-6FE5-A42A-06F8-4DFC24EE3E3E}"/>
+              </a:ext>
+            </a:extLst>
+          </p:cNvPr>
+          <p:cNvPicPr>
+            <a:picLocks noChangeAspect="1"/>
+          </p:cNvPicPr>
+          <p:nvPr/>
+        </p:nvPicPr>
+        <p:blipFill>
+          <a:blip r:embed="rId14"/>
+          <a:stretch>
+            <a:fillRect/>
+          </a:stretch>
+        </p:blipFill>
+        <p:spPr>
+          <a:xfrm>
+            <a:off x="21242936" y="7053314"/>
+            <a:ext cx="13008733" cy="12423729"/>
+          </a:xfrm>
+          <a:prstGeom prst="rect">
+            <a:avLst/>
+          </a:prstGeom>
+        </p:spPr>
+      </p:pic>
+      <p:sp>
+        <p:nvSpPr>
+          <p:cNvPr id="33" name="TextBox 32">
+            <a:extLst>
+              <a:ext uri="{FF2B5EF4-FFF2-40B4-BE49-F238E27FC236}">
+                <a16:creationId xmlns:a16="http://schemas.microsoft.com/office/drawing/2014/main" id="{BAAA3DD9-701D-C003-268B-4CEA325C8C21}"/>
+              </a:ext>
+            </a:extLst>
+          </p:cNvPr>
+          <p:cNvSpPr txBox="1"/>
+          <p:nvPr/>
+        </p:nvSpPr>
+        <p:spPr>
+          <a:xfrm>
+            <a:off x="17502024" y="24023984"/>
+            <a:ext cx="19569920" cy="8217634"/>
+          </a:xfrm>
+          <a:prstGeom prst="rect">
+            <a:avLst/>
+          </a:prstGeom>
+          <a:noFill/>
+        </p:spPr>
+        <p:txBody>
+          <a:bodyPr wrap="square" rtlCol="0">
+            <a:spAutoFit/>
+          </a:bodyPr>
+          <a:lstStyle/>
+          <a:p>
+            <a:pPr>
+              <a:spcBef>
+                <a:spcPts val="0"/>
+              </a:spcBef>
+              <a:spcAft>
+                <a:spcPts val="0"/>
+              </a:spcAft>
+            </a:pPr>
+            <a:r>
+              <a:rPr lang="en-US" sz="3200" b="1" dirty="0">
+                <a:solidFill>
+                  <a:srgbClr val="0E101A"/>
+                </a:solidFill>
+                <a:effectLst/>
+              </a:rPr>
+              <a:t>Text matching methods: </a:t>
+            </a:r>
+          </a:p>
+          <a:p>
+            <a:pPr>
+              <a:spcBef>
+                <a:spcPts val="0"/>
+              </a:spcBef>
+              <a:spcAft>
+                <a:spcPts val="0"/>
+              </a:spcAft>
+            </a:pPr>
+            <a:r>
+              <a:rPr lang="en-US" sz="3200" dirty="0">
+                <a:solidFill>
+                  <a:srgbClr val="0E101A"/>
+                </a:solidFill>
+                <a:effectLst/>
+              </a:rPr>
+              <a:t>We used the following three edit distances to measure the differences between tumor terms: Normalized </a:t>
+            </a:r>
+            <a:r>
+              <a:rPr lang="en-US" sz="3200" dirty="0" err="1">
+                <a:solidFill>
+                  <a:srgbClr val="0E101A"/>
+                </a:solidFill>
+                <a:effectLst/>
+              </a:rPr>
+              <a:t>Levenshtein</a:t>
+            </a:r>
+            <a:r>
+              <a:rPr lang="en-US" sz="3200" dirty="0">
+                <a:solidFill>
+                  <a:srgbClr val="0E101A"/>
+                </a:solidFill>
+                <a:effectLst/>
+              </a:rPr>
+              <a:t>, </a:t>
+            </a:r>
+            <a:r>
+              <a:rPr lang="en-US" sz="3200" dirty="0" err="1">
+                <a:solidFill>
+                  <a:srgbClr val="0E101A"/>
+                </a:solidFill>
+                <a:effectLst/>
+              </a:rPr>
+              <a:t>Jarro</a:t>
+            </a:r>
+            <a:r>
+              <a:rPr lang="en-US" sz="3200" dirty="0">
+                <a:solidFill>
+                  <a:srgbClr val="0E101A"/>
+                </a:solidFill>
+                <a:effectLst/>
+              </a:rPr>
+              <a:t>-Winkler, and cosine distance.  </a:t>
+            </a:r>
+          </a:p>
+          <a:p>
+            <a:pPr>
+              <a:spcBef>
+                <a:spcPts val="0"/>
+              </a:spcBef>
+              <a:spcAft>
+                <a:spcPts val="0"/>
+              </a:spcAft>
+            </a:pPr>
+            <a:r>
+              <a:rPr lang="en-US" sz="3200" b="1" dirty="0">
+                <a:solidFill>
+                  <a:srgbClr val="0E101A"/>
+                </a:solidFill>
+                <a:effectLst/>
+              </a:rPr>
+              <a:t>Closest match using edit distance:</a:t>
+            </a:r>
+            <a:r>
+              <a:rPr lang="en-US" sz="3200" dirty="0">
+                <a:solidFill>
+                  <a:srgbClr val="0E101A"/>
+                </a:solidFill>
+                <a:effectLst/>
+              </a:rPr>
+              <a:t> In this method, we computed the edit distance between each tumor term in the CT registry with respect to each term in the WHO and NCIT databases. We then identified the WHO and NCIT terms closest to each tumor term in the CT registry and assigned them as the standardized term. </a:t>
+            </a:r>
+          </a:p>
+          <a:p>
+            <a:pPr>
+              <a:spcBef>
+                <a:spcPts val="0"/>
+              </a:spcBef>
+              <a:spcAft>
+                <a:spcPts val="0"/>
+              </a:spcAft>
+            </a:pPr>
+            <a:r>
+              <a:rPr lang="en-US" sz="3200" b="1" dirty="0">
+                <a:solidFill>
+                  <a:srgbClr val="0E101A"/>
+                </a:solidFill>
+                <a:effectLst/>
+              </a:rPr>
+              <a:t>Edit distance and Affinity Propagation Clustering</a:t>
+            </a:r>
+            <a:r>
+              <a:rPr lang="en-US" sz="3200" dirty="0">
+                <a:solidFill>
+                  <a:srgbClr val="0E101A"/>
+                </a:solidFill>
+                <a:effectLst/>
+              </a:rPr>
+              <a:t>: In this method, we computed the pairwise edit distance between each tumor term in the CT registry, WHO, and NCIT databases and used it as a divergence metric for affinity propagation clustering. For each cluster, we evaluate if they are large to perform nested clustering if necessary and also </a:t>
+            </a:r>
+            <a:r>
+              <a:rPr lang="en-US" sz="3200" dirty="0" err="1">
+                <a:solidFill>
+                  <a:srgbClr val="0E101A"/>
+                </a:solidFill>
+                <a:effectLst/>
+              </a:rPr>
+              <a:t>perfromed</a:t>
+            </a:r>
+            <a:r>
+              <a:rPr lang="en-US" sz="3200" dirty="0">
+                <a:solidFill>
+                  <a:srgbClr val="0E101A"/>
+                </a:solidFill>
+                <a:effectLst/>
+              </a:rPr>
+              <a:t> outlier analysis using isolation forest and local outlier factors. Finally, for each cluster, we identified the WHO and NCIT terms closest to each cluster member. If there was a WHO or NCIT term closest to most of the cluster members (majority), then that term is assigned as the standardized tumor name for each cluster member; otherwise, each cluster member is assigned to its nearest (in terms of edit distances) matching WHO and NCIT terms. </a:t>
+            </a:r>
+          </a:p>
+          <a:p>
+            <a:r>
+              <a:rPr lang="en-US" sz="3200" dirty="0">
+                <a:solidFill>
+                  <a:srgbClr val="000000"/>
+                </a:solidFill>
+                <a:latin typeface="Calibri" panose="020F0502020204030204" pitchFamily="34" charset="0"/>
+                <a:cs typeface="Calibri" panose="020F0502020204030204" pitchFamily="34" charset="0"/>
+              </a:rPr>
+              <a:t> </a:t>
+            </a:r>
+          </a:p>
+          <a:p>
+            <a:endParaRPr lang="en-US" sz="4800" dirty="0">
+              <a:latin typeface="Calibri" panose="020F0502020204030204" pitchFamily="34" charset="0"/>
+              <a:cs typeface="Calibri" panose="020F0502020204030204" pitchFamily="34" charset="0"/>
+            </a:endParaRPr>
+          </a:p>
+        </p:txBody>
+      </p:sp>
+      <p:sp>
+        <p:nvSpPr>
+          <p:cNvPr id="34" name="TextBox 33">
+            <a:extLst>
+              <a:ext uri="{FF2B5EF4-FFF2-40B4-BE49-F238E27FC236}">
+                <a16:creationId xmlns:a16="http://schemas.microsoft.com/office/drawing/2014/main" id="{00BC8C99-C106-5610-BD14-C8351680576C}"/>
+              </a:ext>
+            </a:extLst>
+          </p:cNvPr>
+          <p:cNvSpPr txBox="1"/>
+          <p:nvPr/>
+        </p:nvSpPr>
+        <p:spPr>
+          <a:xfrm>
+            <a:off x="19848308" y="44038321"/>
+            <a:ext cx="6746272" cy="1200329"/>
+          </a:xfrm>
+          <a:prstGeom prst="rect">
+            <a:avLst/>
+          </a:prstGeom>
+          <a:noFill/>
+        </p:spPr>
+        <p:txBody>
+          <a:bodyPr wrap="square" rtlCol="0">
+            <a:spAutoFit/>
+          </a:bodyPr>
+          <a:lstStyle/>
+          <a:p>
+            <a:endParaRPr lang="en-US" sz="1800" dirty="0">
+              <a:solidFill>
+                <a:srgbClr val="000000"/>
+              </a:solidFill>
+              <a:latin typeface="Calibri" panose="020F0502020204030204" pitchFamily="34" charset="0"/>
+              <a:cs typeface="Calibri" panose="020F0502020204030204" pitchFamily="34" charset="0"/>
+            </a:endParaRPr>
+          </a:p>
+          <a:p>
+            <a:r>
+              <a:rPr lang="en-US" sz="1800" b="0" i="0" u="none" strike="noStrike" dirty="0">
+                <a:solidFill>
+                  <a:srgbClr val="000000"/>
+                </a:solidFill>
+                <a:effectLst/>
+                <a:latin typeface="Calibri" panose="020F0502020204030204" pitchFamily="34" charset="0"/>
+                <a:cs typeface="Calibri" panose="020F0502020204030204" pitchFamily="34" charset="0"/>
+              </a:rPr>
+              <a:t>Open AI Embedding:  text-embedding-ada-002 (ADA002) and text-embedding-3-large (referred as LTE-3)</a:t>
+            </a:r>
+          </a:p>
+          <a:p>
+            <a:endParaRPr lang="en-US" dirty="0"/>
           </a:p>
         </p:txBody>
       </p:sp>

</xml_diff>

<commit_message>
adding refs to poster
</commit_message>
<xml_diff>
--- a/MABC_CONF_2024/Poster_MABC_2024.pptx
+++ b/MABC_CONF_2024/Poster_MABC_2024.pptx
@@ -4312,7 +4312,7 @@
         </p:nvSpPr>
         <p:spPr>
           <a:xfrm>
-            <a:off x="17474080" y="6150962"/>
+            <a:off x="17605220" y="6106424"/>
             <a:ext cx="20683595" cy="938712"/>
           </a:xfrm>
           <a:prstGeom prst="rect">
@@ -4367,7 +4367,7 @@
         </p:blipFill>
         <p:spPr>
           <a:xfrm>
-            <a:off x="4294011" y="47318443"/>
+            <a:off x="4501891" y="47543778"/>
             <a:ext cx="6113349" cy="2548647"/>
           </a:xfrm>
           <a:prstGeom prst="rect">
@@ -4397,7 +4397,7 @@
         </p:blipFill>
         <p:spPr>
           <a:xfrm>
-            <a:off x="11186696" y="47451506"/>
+            <a:off x="11196386" y="47561832"/>
             <a:ext cx="5686409" cy="2282520"/>
           </a:xfrm>
           <a:prstGeom prst="rect">
@@ -4474,7 +4474,7 @@
                 <a:latin typeface="Calibri" panose="020F0502020204030204" pitchFamily="34" charset="0"/>
                 <a:cs typeface="Calibri" panose="020F0502020204030204" pitchFamily="34" charset="0"/>
               </a:rPr>
-              <a:t>The Clinical Trials (CT) registry contains information on drugs used for treating various conditions. From the CT registry, we extracted </a:t>
+              <a:t>The Clinical Trials (CT) registry contains information regarding various aspects of a clinical trial study and is stored in the database in the form text files. Using the conditions file in the CT registry, we extracted </a:t>
             </a:r>
             <a:r>
               <a:rPr lang="en-US" sz="3200" b="0" i="0" u="none" strike="noStrike" dirty="0">
@@ -4640,7 +4640,7 @@
         </p:nvSpPr>
         <p:spPr>
           <a:xfrm>
-            <a:off x="17372561" y="45940848"/>
+            <a:off x="17208214" y="46610020"/>
             <a:ext cx="20916254" cy="938712"/>
           </a:xfrm>
           <a:prstGeom prst="rect">
@@ -4799,7 +4799,30 @@
                 <a:cs typeface="Calibri" panose="020F0502020204030204" pitchFamily="34" charset="0"/>
                 <a:hlinkClick r:id="rId10"/>
               </a:rPr>
-              <a:t>[3]</a:t>
+              <a:t>[3</a:t>
+            </a:r>
+            <a:r>
+              <a:rPr lang="en-US" sz="3200" dirty="0">
+                <a:solidFill>
+                  <a:srgbClr val="4A6EE0"/>
+                </a:solidFill>
+                <a:effectLst/>
+                <a:latin typeface="Calibri" panose="020F0502020204030204" pitchFamily="34" charset="0"/>
+                <a:cs typeface="Calibri" panose="020F0502020204030204" pitchFamily="34" charset="0"/>
+              </a:rPr>
+              <a:t>-</a:t>
+            </a:r>
+            <a:r>
+              <a:rPr lang="en-US" sz="3200" dirty="0">
+                <a:solidFill>
+                  <a:srgbClr val="4A6EE0"/>
+                </a:solidFill>
+                <a:effectLst/>
+                <a:latin typeface="Calibri" panose="020F0502020204030204" pitchFamily="34" charset="0"/>
+                <a:cs typeface="Calibri" panose="020F0502020204030204" pitchFamily="34" charset="0"/>
+                <a:hlinkClick r:id="rId11"/>
+              </a:rPr>
+              <a:t>4]</a:t>
             </a:r>
             <a:r>
               <a:rPr lang="en-US" sz="3200" dirty="0">
@@ -4810,7 +4833,7 @@
                 <a:latin typeface="Calibri" panose="020F0502020204030204" pitchFamily="34" charset="0"/>
                 <a:cs typeface="Calibri" panose="020F0502020204030204" pitchFamily="34" charset="0"/>
               </a:rPr>
-              <a:t> </a:t>
+              <a:t>. Compared to adult cancers, pediatric cancers are rarer and with fewer available therapeutic agents that have been tested in clinical trials due to challenges associated with recruiting statistically significant and diverse pediatric populations to support the various phases of clinical trials, logistical issues related to clinical trial-site location and molecular heterogeneity of tumors </a:t>
             </a:r>
             <a:r>
               <a:rPr lang="en-US" sz="3200" dirty="0">
@@ -4820,32 +4843,9 @@
                 <a:effectLst/>
                 <a:latin typeface="Calibri" panose="020F0502020204030204" pitchFamily="34" charset="0"/>
                 <a:cs typeface="Calibri" panose="020F0502020204030204" pitchFamily="34" charset="0"/>
-                <a:hlinkClick r:id="rId11"/>
-              </a:rPr>
-              <a:t>[4]</a:t>
-            </a:r>
-            <a:r>
-              <a:rPr lang="en-US" sz="3200" dirty="0">
-                <a:solidFill>
-                  <a:srgbClr val="0E101A"/>
-                </a:solidFill>
-                <a:effectLst/>
-                <a:latin typeface="Calibri" panose="020F0502020204030204" pitchFamily="34" charset="0"/>
-                <a:cs typeface="Calibri" panose="020F0502020204030204" pitchFamily="34" charset="0"/>
-              </a:rPr>
-              <a:t>. Compared to adult cancers, pediatric cancers are rarer and with fewer available therapeutic agents that have been tested in clinical trials due to challenges associated with recruiting statistically significant and diverse pediatric populations to support the various phases of clinical trials, logistical issues related to clinical trial-site location and molecular heterogeneity of tumors </a:t>
-            </a:r>
-            <a:r>
-              <a:rPr lang="en-US" sz="3200" dirty="0">
-                <a:solidFill>
-                  <a:srgbClr val="4A6EE0"/>
-                </a:solidFill>
-                <a:effectLst/>
-                <a:latin typeface="Calibri" panose="020F0502020204030204" pitchFamily="34" charset="0"/>
-                <a:cs typeface="Calibri" panose="020F0502020204030204" pitchFamily="34" charset="0"/>
                 <a:hlinkClick r:id="rId12"/>
               </a:rPr>
-              <a:t>[7,8]</a:t>
+              <a:t>[7-8]</a:t>
             </a:r>
             <a:r>
               <a:rPr lang="en-US" sz="3200" dirty="0">
@@ -5124,7 +5124,7 @@
                 <a:cs typeface="Calibri" panose="020F0502020204030204" pitchFamily="34" charset="0"/>
                 <a:hlinkClick r:id="rId13"/>
               </a:rPr>
-              <a:t>[21–24]</a:t>
+              <a:t>[9–12]</a:t>
             </a:r>
             <a:r>
               <a:rPr lang="en-US" sz="3200" dirty="0">
@@ -5185,7 +5185,7 @@
         </p:blipFill>
         <p:spPr>
           <a:xfrm>
-            <a:off x="19848308" y="7122504"/>
+            <a:off x="20075319" y="7122504"/>
             <a:ext cx="14098078" cy="13464086"/>
           </a:xfrm>
           <a:prstGeom prst="rect">
@@ -5630,13 +5630,13 @@
           <p:nvPr>
             <p:extLst>
               <p:ext uri="{D42A27DB-BD31-4B8C-83A1-F6EECF244321}">
-                <p14:modId xmlns:p14="http://schemas.microsoft.com/office/powerpoint/2010/main" val="2485601636"/>
+                <p14:modId xmlns:p14="http://schemas.microsoft.com/office/powerpoint/2010/main" val="1590498535"/>
               </p:ext>
             </p:extLst>
           </p:nvPr>
         </p:nvGraphicFramePr>
         <p:xfrm>
-          <a:off x="28952955" y="39434744"/>
+          <a:off x="28952955" y="39855801"/>
           <a:ext cx="9335860" cy="6399133"/>
         </p:xfrm>
         <a:graphic>
@@ -9428,7 +9428,7 @@
         <p:spPr>
           <a:xfrm>
             <a:off x="17356795" y="35833696"/>
-            <a:ext cx="20650387" cy="3539430"/>
+            <a:ext cx="20650387" cy="4031873"/>
           </a:xfrm>
           <a:prstGeom prst="rect">
             <a:avLst/>
@@ -9467,7 +9467,7 @@
             </a:r>
             <a:r>
               <a:rPr lang="en-US" sz="3200" dirty="0"/>
-              <a:t>) edition of WHO database. We limit the accuracy evaluations to only the WHO tumor database as it is considered the gold standard for tumor nomenclature. </a:t>
+              <a:t>) edition of WHO database. We limit the accuracy evaluations to only the WHO tumor database as it is considered the gold standard for tumor nomenclature.  However, we provide the WHO and NCIT standardized terms for each tumor term in the CT registry as supplemental files. </a:t>
             </a:r>
           </a:p>
         </p:txBody>
@@ -9487,13 +9487,13 @@
           <p:nvPr>
             <p:extLst>
               <p:ext uri="{D42A27DB-BD31-4B8C-83A1-F6EECF244321}">
-                <p14:modId xmlns:p14="http://schemas.microsoft.com/office/powerpoint/2010/main" val="2788771664"/>
+                <p14:modId xmlns:p14="http://schemas.microsoft.com/office/powerpoint/2010/main" val="1553477944"/>
               </p:ext>
             </p:extLst>
           </p:nvPr>
         </p:nvGraphicFramePr>
         <p:xfrm>
-          <a:off x="17460612" y="39447917"/>
+          <a:off x="17478060" y="39907445"/>
           <a:ext cx="11062410" cy="6389389"/>
         </p:xfrm>
         <a:graphic>
@@ -13104,6 +13104,613 @@
           </a:graphicData>
         </a:graphic>
       </p:graphicFrame>
+      <p:sp>
+        <p:nvSpPr>
+          <p:cNvPr id="43" name="TextBox 42">
+            <a:extLst>
+              <a:ext uri="{FF2B5EF4-FFF2-40B4-BE49-F238E27FC236}">
+                <a16:creationId xmlns:a16="http://schemas.microsoft.com/office/drawing/2014/main" id="{BD343152-4960-4376-23FD-0496C1BAB544}"/>
+              </a:ext>
+            </a:extLst>
+          </p:cNvPr>
+          <p:cNvSpPr txBox="1"/>
+          <p:nvPr/>
+        </p:nvSpPr>
+        <p:spPr>
+          <a:xfrm>
+            <a:off x="17309737" y="47451506"/>
+            <a:ext cx="20650387" cy="3908762"/>
+          </a:xfrm>
+          <a:prstGeom prst="rect">
+            <a:avLst/>
+          </a:prstGeom>
+          <a:noFill/>
+        </p:spPr>
+        <p:txBody>
+          <a:bodyPr wrap="square" rtlCol="0">
+            <a:spAutoFit/>
+          </a:bodyPr>
+          <a:lstStyle/>
+          <a:p>
+            <a:pPr>
+              <a:spcBef>
+                <a:spcPts val="0"/>
+              </a:spcBef>
+              <a:spcAft>
+                <a:spcPts val="0"/>
+              </a:spcAft>
+            </a:pPr>
+            <a:endParaRPr lang="en-US" sz="1600" dirty="0">
+              <a:effectLst/>
+              <a:latin typeface="Calibri" panose="020F0502020204030204" pitchFamily="34" charset="0"/>
+              <a:cs typeface="Calibri" panose="020F0502020204030204" pitchFamily="34" charset="0"/>
+            </a:endParaRPr>
+          </a:p>
+          <a:p>
+            <a:pPr marL="342900" indent="-342900">
+              <a:spcBef>
+                <a:spcPts val="0"/>
+              </a:spcBef>
+              <a:spcAft>
+                <a:spcPts val="0"/>
+              </a:spcAft>
+              <a:buFont typeface="+mj-lt"/>
+              <a:buAutoNum type="arabicPeriod"/>
+            </a:pPr>
+            <a:r>
+              <a:rPr lang="en-US" sz="1600" dirty="0">
+                <a:effectLst/>
+                <a:latin typeface="Calibri" panose="020F0502020204030204" pitchFamily="34" charset="0"/>
+                <a:cs typeface="Calibri" panose="020F0502020204030204" pitchFamily="34" charset="0"/>
+              </a:rPr>
+              <a:t>Bray F, Laversanne M, Sung H, </a:t>
+            </a:r>
+            <a:r>
+              <a:rPr lang="en-US" sz="1600" i="1" dirty="0">
+                <a:effectLst/>
+                <a:latin typeface="Calibri" panose="020F0502020204030204" pitchFamily="34" charset="0"/>
+                <a:cs typeface="Calibri" panose="020F0502020204030204" pitchFamily="34" charset="0"/>
+              </a:rPr>
+              <a:t>et al.</a:t>
+            </a:r>
+            <a:r>
+              <a:rPr lang="en-US" sz="1600" dirty="0">
+                <a:effectLst/>
+                <a:latin typeface="Calibri" panose="020F0502020204030204" pitchFamily="34" charset="0"/>
+                <a:cs typeface="Calibri" panose="020F0502020204030204" pitchFamily="34" charset="0"/>
+              </a:rPr>
+              <a:t> Global cancer statistics 2022: GLOBOCAN estimates of incidence and mortality worldwide for 36 cancers in 185 countries. </a:t>
+            </a:r>
+            <a:r>
+              <a:rPr lang="en-US" sz="1600" i="1" dirty="0">
+                <a:effectLst/>
+                <a:latin typeface="Calibri" panose="020F0502020204030204" pitchFamily="34" charset="0"/>
+                <a:cs typeface="Calibri" panose="020F0502020204030204" pitchFamily="34" charset="0"/>
+              </a:rPr>
+              <a:t>CA Cancer J Clin</a:t>
+            </a:r>
+            <a:r>
+              <a:rPr lang="en-US" sz="1600" dirty="0">
+                <a:effectLst/>
+                <a:latin typeface="Calibri" panose="020F0502020204030204" pitchFamily="34" charset="0"/>
+                <a:cs typeface="Calibri" panose="020F0502020204030204" pitchFamily="34" charset="0"/>
+              </a:rPr>
+              <a:t>. 2024;74:229–63.</a:t>
+            </a:r>
+          </a:p>
+          <a:p>
+            <a:pPr marL="342900" indent="-342900">
+              <a:spcBef>
+                <a:spcPts val="0"/>
+              </a:spcBef>
+              <a:spcAft>
+                <a:spcPts val="0"/>
+              </a:spcAft>
+              <a:buFont typeface="+mj-lt"/>
+              <a:buAutoNum type="arabicPeriod"/>
+            </a:pPr>
+            <a:r>
+              <a:rPr lang="en-US" sz="1600" dirty="0">
+                <a:effectLst/>
+                <a:latin typeface="Calibri" panose="020F0502020204030204" pitchFamily="34" charset="0"/>
+                <a:cs typeface="Calibri" panose="020F0502020204030204" pitchFamily="34" charset="0"/>
+              </a:rPr>
+              <a:t> Siegel RL, Giaquinto AN, Jemal A. Cancer statistics, 2024. </a:t>
+            </a:r>
+            <a:r>
+              <a:rPr lang="en-US" sz="1600" i="1" dirty="0">
+                <a:effectLst/>
+                <a:latin typeface="Calibri" panose="020F0502020204030204" pitchFamily="34" charset="0"/>
+                <a:cs typeface="Calibri" panose="020F0502020204030204" pitchFamily="34" charset="0"/>
+              </a:rPr>
+              <a:t>CA Cancer J Clin</a:t>
+            </a:r>
+            <a:r>
+              <a:rPr lang="en-US" sz="1600" dirty="0">
+                <a:effectLst/>
+                <a:latin typeface="Calibri" panose="020F0502020204030204" pitchFamily="34" charset="0"/>
+                <a:cs typeface="Calibri" panose="020F0502020204030204" pitchFamily="34" charset="0"/>
+              </a:rPr>
+              <a:t>. 2024;74:12–49.</a:t>
+            </a:r>
+          </a:p>
+          <a:p>
+            <a:pPr marL="342900" indent="-342900">
+              <a:spcBef>
+                <a:spcPts val="0"/>
+              </a:spcBef>
+              <a:spcAft>
+                <a:spcPts val="0"/>
+              </a:spcAft>
+              <a:buFont typeface="+mj-lt"/>
+              <a:buAutoNum type="arabicPeriod"/>
+            </a:pPr>
+            <a:r>
+              <a:rPr lang="en-US" sz="1600" dirty="0">
+                <a:effectLst/>
+                <a:latin typeface="Calibri" panose="020F0502020204030204" pitchFamily="34" charset="0"/>
+                <a:cs typeface="Calibri" panose="020F0502020204030204" pitchFamily="34" charset="0"/>
+              </a:rPr>
+              <a:t>Matt GY, Sioson E, Shelton K, </a:t>
+            </a:r>
+            <a:r>
+              <a:rPr lang="en-US" sz="1600" i="1" dirty="0">
+                <a:effectLst/>
+                <a:latin typeface="Calibri" panose="020F0502020204030204" pitchFamily="34" charset="0"/>
+                <a:cs typeface="Calibri" panose="020F0502020204030204" pitchFamily="34" charset="0"/>
+              </a:rPr>
+              <a:t>et al.</a:t>
+            </a:r>
+            <a:r>
+              <a:rPr lang="en-US" sz="1600" dirty="0">
+                <a:effectLst/>
+                <a:latin typeface="Calibri" panose="020F0502020204030204" pitchFamily="34" charset="0"/>
+                <a:cs typeface="Calibri" panose="020F0502020204030204" pitchFamily="34" charset="0"/>
+              </a:rPr>
+              <a:t> St. Jude Survivorship Portal: Sharing and Analyzing Large Clinical and Genomic Datasets from Pediatric Cancer Survivors. </a:t>
+            </a:r>
+            <a:r>
+              <a:rPr lang="en-US" sz="1600" i="1" dirty="0">
+                <a:effectLst/>
+                <a:latin typeface="Calibri" panose="020F0502020204030204" pitchFamily="34" charset="0"/>
+                <a:cs typeface="Calibri" panose="020F0502020204030204" pitchFamily="34" charset="0"/>
+              </a:rPr>
+              <a:t>Cancer Discov</a:t>
+            </a:r>
+            <a:r>
+              <a:rPr lang="en-US" sz="1600" dirty="0">
+                <a:effectLst/>
+                <a:latin typeface="Calibri" panose="020F0502020204030204" pitchFamily="34" charset="0"/>
+                <a:cs typeface="Calibri" panose="020F0502020204030204" pitchFamily="34" charset="0"/>
+              </a:rPr>
+              <a:t>. 2024;14:1403–17.</a:t>
+            </a:r>
+          </a:p>
+          <a:p>
+            <a:pPr marL="342900" indent="-342900">
+              <a:spcBef>
+                <a:spcPts val="0"/>
+              </a:spcBef>
+              <a:spcAft>
+                <a:spcPts val="0"/>
+              </a:spcAft>
+              <a:buFont typeface="+mj-lt"/>
+              <a:buAutoNum type="arabicPeriod"/>
+            </a:pPr>
+            <a:r>
+              <a:rPr lang="en-US" sz="1600" dirty="0">
+                <a:effectLst/>
+                <a:latin typeface="Calibri" panose="020F0502020204030204" pitchFamily="34" charset="0"/>
+                <a:cs typeface="Calibri" panose="020F0502020204030204" pitchFamily="34" charset="0"/>
+              </a:rPr>
+              <a:t>Aristizabal P, Winestone LE, Umaretiya P, </a:t>
+            </a:r>
+            <a:r>
+              <a:rPr lang="en-US" sz="1600" i="1" dirty="0">
+                <a:effectLst/>
+                <a:latin typeface="Calibri" panose="020F0502020204030204" pitchFamily="34" charset="0"/>
+                <a:cs typeface="Calibri" panose="020F0502020204030204" pitchFamily="34" charset="0"/>
+              </a:rPr>
+              <a:t>et al.</a:t>
+            </a:r>
+            <a:r>
+              <a:rPr lang="en-US" sz="1600" dirty="0">
+                <a:effectLst/>
+                <a:latin typeface="Calibri" panose="020F0502020204030204" pitchFamily="34" charset="0"/>
+                <a:cs typeface="Calibri" panose="020F0502020204030204" pitchFamily="34" charset="0"/>
+              </a:rPr>
+              <a:t> Disparities in Pediatric Oncology: The 21st Century Opportunity to Improve Outcomes for Children and Adolescents With Cancer. </a:t>
+            </a:r>
+            <a:r>
+              <a:rPr lang="en-US" sz="1600" i="1" dirty="0">
+                <a:effectLst/>
+                <a:latin typeface="Calibri" panose="020F0502020204030204" pitchFamily="34" charset="0"/>
+                <a:cs typeface="Calibri" panose="020F0502020204030204" pitchFamily="34" charset="0"/>
+              </a:rPr>
+              <a:t>Am Soc Clin Oncol Educ Book</a:t>
+            </a:r>
+            <a:r>
+              <a:rPr lang="en-US" sz="1600" dirty="0">
+                <a:effectLst/>
+                <a:latin typeface="Calibri" panose="020F0502020204030204" pitchFamily="34" charset="0"/>
+                <a:cs typeface="Calibri" panose="020F0502020204030204" pitchFamily="34" charset="0"/>
+              </a:rPr>
+              <a:t>. 2021;41:e315–26.</a:t>
+            </a:r>
+          </a:p>
+          <a:p>
+            <a:pPr marL="342900" indent="-342900">
+              <a:spcBef>
+                <a:spcPts val="0"/>
+              </a:spcBef>
+              <a:spcAft>
+                <a:spcPts val="0"/>
+              </a:spcAft>
+              <a:buFont typeface="+mj-lt"/>
+              <a:buAutoNum type="arabicPeriod"/>
+            </a:pPr>
+            <a:r>
+              <a:rPr lang="en-US" sz="1600" dirty="0">
+                <a:effectLst/>
+                <a:latin typeface="Calibri" panose="020F0502020204030204" pitchFamily="34" charset="0"/>
+                <a:cs typeface="Calibri" panose="020F0502020204030204" pitchFamily="34" charset="0"/>
+              </a:rPr>
+              <a:t> Hunger Stephen P., Mullighan Charles G. Acute Lymphoblastic Leukemia in Children. </a:t>
+            </a:r>
+            <a:r>
+              <a:rPr lang="en-US" sz="1600" i="1" dirty="0">
+                <a:effectLst/>
+                <a:latin typeface="Calibri" panose="020F0502020204030204" pitchFamily="34" charset="0"/>
+                <a:cs typeface="Calibri" panose="020F0502020204030204" pitchFamily="34" charset="0"/>
+              </a:rPr>
+              <a:t>N Engl J Med</a:t>
+            </a:r>
+            <a:r>
+              <a:rPr lang="en-US" sz="1600" dirty="0">
+                <a:effectLst/>
+                <a:latin typeface="Calibri" panose="020F0502020204030204" pitchFamily="34" charset="0"/>
+                <a:cs typeface="Calibri" panose="020F0502020204030204" pitchFamily="34" charset="0"/>
+              </a:rPr>
+              <a:t>. ;373:1541–52.</a:t>
+            </a:r>
+          </a:p>
+          <a:p>
+            <a:pPr marL="342900" indent="-342900">
+              <a:spcBef>
+                <a:spcPts val="0"/>
+              </a:spcBef>
+              <a:spcAft>
+                <a:spcPts val="0"/>
+              </a:spcAft>
+              <a:buFont typeface="+mj-lt"/>
+              <a:buAutoNum type="arabicPeriod"/>
+            </a:pPr>
+            <a:r>
+              <a:rPr lang="en-US" sz="1600" dirty="0">
+                <a:effectLst/>
+                <a:latin typeface="Calibri" panose="020F0502020204030204" pitchFamily="34" charset="0"/>
+                <a:cs typeface="Calibri" panose="020F0502020204030204" pitchFamily="34" charset="0"/>
+              </a:rPr>
+              <a:t> Laetsch TW, DuBois SG, Bender JG, </a:t>
+            </a:r>
+            <a:r>
+              <a:rPr lang="en-US" sz="1600" i="1" dirty="0">
+                <a:effectLst/>
+                <a:latin typeface="Calibri" panose="020F0502020204030204" pitchFamily="34" charset="0"/>
+                <a:cs typeface="Calibri" panose="020F0502020204030204" pitchFamily="34" charset="0"/>
+              </a:rPr>
+              <a:t>et al.</a:t>
+            </a:r>
+            <a:r>
+              <a:rPr lang="en-US" sz="1600" dirty="0">
+                <a:effectLst/>
+                <a:latin typeface="Calibri" panose="020F0502020204030204" pitchFamily="34" charset="0"/>
+                <a:cs typeface="Calibri" panose="020F0502020204030204" pitchFamily="34" charset="0"/>
+              </a:rPr>
+              <a:t> Opportunities and Challenges in Drug Development for Pediatric Cancers. </a:t>
+            </a:r>
+            <a:r>
+              <a:rPr lang="en-US" sz="1600" i="1" dirty="0">
+                <a:effectLst/>
+                <a:latin typeface="Calibri" panose="020F0502020204030204" pitchFamily="34" charset="0"/>
+                <a:cs typeface="Calibri" panose="020F0502020204030204" pitchFamily="34" charset="0"/>
+              </a:rPr>
+              <a:t>Cancer Discov</a:t>
+            </a:r>
+            <a:r>
+              <a:rPr lang="en-US" sz="1600" dirty="0">
+                <a:effectLst/>
+                <a:latin typeface="Calibri" panose="020F0502020204030204" pitchFamily="34" charset="0"/>
+                <a:cs typeface="Calibri" panose="020F0502020204030204" pitchFamily="34" charset="0"/>
+              </a:rPr>
+              <a:t>. 2021;11:545–59.</a:t>
+            </a:r>
+          </a:p>
+          <a:p>
+            <a:pPr marL="342900" indent="-342900">
+              <a:spcBef>
+                <a:spcPts val="0"/>
+              </a:spcBef>
+              <a:spcAft>
+                <a:spcPts val="0"/>
+              </a:spcAft>
+              <a:buFont typeface="+mj-lt"/>
+              <a:buAutoNum type="arabicPeriod"/>
+            </a:pPr>
+            <a:r>
+              <a:rPr lang="en-US" sz="1600" dirty="0">
+                <a:effectLst/>
+                <a:latin typeface="Calibri" panose="020F0502020204030204" pitchFamily="34" charset="0"/>
+                <a:cs typeface="Calibri" panose="020F0502020204030204" pitchFamily="34" charset="0"/>
+              </a:rPr>
+              <a:t> Renfro LA, Ji L, Piao J, </a:t>
+            </a:r>
+            <a:r>
+              <a:rPr lang="en-US" sz="1600" i="1" dirty="0">
+                <a:effectLst/>
+                <a:latin typeface="Calibri" panose="020F0502020204030204" pitchFamily="34" charset="0"/>
+                <a:cs typeface="Calibri" panose="020F0502020204030204" pitchFamily="34" charset="0"/>
+              </a:rPr>
+              <a:t>et al.</a:t>
+            </a:r>
+            <a:r>
+              <a:rPr lang="en-US" sz="1600" dirty="0">
+                <a:effectLst/>
+                <a:latin typeface="Calibri" panose="020F0502020204030204" pitchFamily="34" charset="0"/>
+                <a:cs typeface="Calibri" panose="020F0502020204030204" pitchFamily="34" charset="0"/>
+              </a:rPr>
+              <a:t> Trial Design Challenges and Approaches for Precision Oncology in Rare Tumors: Experiences of the Children’s Oncology Group. </a:t>
+            </a:r>
+            <a:r>
+              <a:rPr lang="en-US" sz="1600" i="1" dirty="0">
+                <a:effectLst/>
+                <a:latin typeface="Calibri" panose="020F0502020204030204" pitchFamily="34" charset="0"/>
+                <a:cs typeface="Calibri" panose="020F0502020204030204" pitchFamily="34" charset="0"/>
+              </a:rPr>
+              <a:t>JCO Precis Oncol</a:t>
+            </a:r>
+            <a:r>
+              <a:rPr lang="en-US" sz="1600" dirty="0">
+                <a:effectLst/>
+                <a:latin typeface="Calibri" panose="020F0502020204030204" pitchFamily="34" charset="0"/>
+                <a:cs typeface="Calibri" panose="020F0502020204030204" pitchFamily="34" charset="0"/>
+              </a:rPr>
+              <a:t>. 2019;3. doi: 10.1200/PO.19.00060</a:t>
+            </a:r>
+          </a:p>
+          <a:p>
+            <a:pPr marL="342900" indent="-342900">
+              <a:spcBef>
+                <a:spcPts val="0"/>
+              </a:spcBef>
+              <a:spcAft>
+                <a:spcPts val="0"/>
+              </a:spcAft>
+              <a:buFont typeface="+mj-lt"/>
+              <a:buAutoNum type="arabicPeriod"/>
+            </a:pPr>
+            <a:r>
+              <a:rPr lang="en-US" sz="1600" dirty="0">
+                <a:effectLst/>
+                <a:latin typeface="Calibri" panose="020F0502020204030204" pitchFamily="34" charset="0"/>
+                <a:cs typeface="Calibri" panose="020F0502020204030204" pitchFamily="34" charset="0"/>
+              </a:rPr>
+              <a:t> Rivers Z, Hyde B, Ronski K, </a:t>
+            </a:r>
+            <a:r>
+              <a:rPr lang="en-US" sz="1600" i="1" dirty="0">
+                <a:effectLst/>
+                <a:latin typeface="Calibri" panose="020F0502020204030204" pitchFamily="34" charset="0"/>
+                <a:cs typeface="Calibri" panose="020F0502020204030204" pitchFamily="34" charset="0"/>
+              </a:rPr>
+              <a:t>et al.</a:t>
+            </a:r>
+            <a:r>
+              <a:rPr lang="en-US" sz="1600" dirty="0">
+                <a:effectLst/>
+                <a:latin typeface="Calibri" panose="020F0502020204030204" pitchFamily="34" charset="0"/>
+                <a:cs typeface="Calibri" panose="020F0502020204030204" pitchFamily="34" charset="0"/>
+              </a:rPr>
+              <a:t> Exploring Barriers to Pediatric Cancer Clinical Trials: The Role of a Networked, Just-in-Time Study Program. </a:t>
+            </a:r>
+            <a:r>
+              <a:rPr lang="en-US" sz="1600" i="1" dirty="0">
+                <a:effectLst/>
+                <a:latin typeface="Calibri" panose="020F0502020204030204" pitchFamily="34" charset="0"/>
+                <a:cs typeface="Calibri" panose="020F0502020204030204" pitchFamily="34" charset="0"/>
+              </a:rPr>
+              <a:t>Clin Ther</a:t>
+            </a:r>
+            <a:r>
+              <a:rPr lang="en-US" sz="1600" dirty="0">
+                <a:effectLst/>
+                <a:latin typeface="Calibri" panose="020F0502020204030204" pitchFamily="34" charset="0"/>
+                <a:cs typeface="Calibri" panose="020F0502020204030204" pitchFamily="34" charset="0"/>
+              </a:rPr>
+              <a:t>. 2023;45:1148–50.</a:t>
+            </a:r>
+          </a:p>
+          <a:p>
+            <a:pPr marL="342900" indent="-342900">
+              <a:spcBef>
+                <a:spcPts val="0"/>
+              </a:spcBef>
+              <a:spcAft>
+                <a:spcPts val="0"/>
+              </a:spcAft>
+              <a:buFont typeface="+mj-lt"/>
+              <a:buAutoNum type="arabicPeriod"/>
+            </a:pPr>
+            <a:r>
+              <a:rPr lang="en-US" sz="1600" dirty="0">
+                <a:effectLst/>
+                <a:latin typeface="Calibri" panose="020F0502020204030204" pitchFamily="34" charset="0"/>
+                <a:cs typeface="Calibri" panose="020F0502020204030204" pitchFamily="34" charset="0"/>
+              </a:rPr>
+              <a:t> Morris J, Kuleshov V, Shmatikov V, </a:t>
+            </a:r>
+            <a:r>
+              <a:rPr lang="en-US" sz="1600" i="1" dirty="0">
+                <a:effectLst/>
+                <a:latin typeface="Calibri" panose="020F0502020204030204" pitchFamily="34" charset="0"/>
+                <a:cs typeface="Calibri" panose="020F0502020204030204" pitchFamily="34" charset="0"/>
+              </a:rPr>
+              <a:t>et al.</a:t>
+            </a:r>
+            <a:r>
+              <a:rPr lang="en-US" sz="1600" dirty="0">
+                <a:effectLst/>
+                <a:latin typeface="Calibri" panose="020F0502020204030204" pitchFamily="34" charset="0"/>
+                <a:cs typeface="Calibri" panose="020F0502020204030204" pitchFamily="34" charset="0"/>
+              </a:rPr>
+              <a:t> Text embeddings reveal (almost) as much as text. </a:t>
+            </a:r>
+            <a:r>
+              <a:rPr lang="en-US" sz="1600" i="1" dirty="0">
+                <a:effectLst/>
+                <a:latin typeface="Calibri" panose="020F0502020204030204" pitchFamily="34" charset="0"/>
+                <a:cs typeface="Calibri" panose="020F0502020204030204" pitchFamily="34" charset="0"/>
+              </a:rPr>
+              <a:t>Proceedings of the 2023 Conference on Empirical Methods in Natural Language Processing</a:t>
+            </a:r>
+            <a:r>
+              <a:rPr lang="en-US" sz="1600" dirty="0">
+                <a:effectLst/>
+                <a:latin typeface="Calibri" panose="020F0502020204030204" pitchFamily="34" charset="0"/>
+                <a:cs typeface="Calibri" panose="020F0502020204030204" pitchFamily="34" charset="0"/>
+              </a:rPr>
+              <a:t>. Stroudsburg, PA, USA: Association for Computational Linguistics 2023.</a:t>
+            </a:r>
+          </a:p>
+          <a:p>
+            <a:pPr marL="342900" indent="-342900">
+              <a:spcBef>
+                <a:spcPts val="0"/>
+              </a:spcBef>
+              <a:spcAft>
+                <a:spcPts val="0"/>
+              </a:spcAft>
+              <a:buFont typeface="+mj-lt"/>
+              <a:buAutoNum type="arabicPeriod"/>
+            </a:pPr>
+            <a:r>
+              <a:rPr lang="en-US" sz="1600" dirty="0">
+                <a:effectLst/>
+                <a:latin typeface="Calibri" panose="020F0502020204030204" pitchFamily="34" charset="0"/>
+                <a:cs typeface="Calibri" panose="020F0502020204030204" pitchFamily="34" charset="0"/>
+              </a:rPr>
+              <a:t> Mikolov T. Efficient estimation of word representations in vector space. </a:t>
+            </a:r>
+            <a:r>
+              <a:rPr lang="en-US" sz="1600" i="1" dirty="0">
+                <a:effectLst/>
+                <a:latin typeface="Calibri" panose="020F0502020204030204" pitchFamily="34" charset="0"/>
+                <a:cs typeface="Calibri" panose="020F0502020204030204" pitchFamily="34" charset="0"/>
+              </a:rPr>
+              <a:t>arXiv preprint arXiv:13013781</a:t>
+            </a:r>
+            <a:r>
+              <a:rPr lang="en-US" sz="1600" dirty="0">
+                <a:effectLst/>
+                <a:latin typeface="Calibri" panose="020F0502020204030204" pitchFamily="34" charset="0"/>
+                <a:cs typeface="Calibri" panose="020F0502020204030204" pitchFamily="34" charset="0"/>
+              </a:rPr>
+              <a:t>. Published Online First: 2013.</a:t>
+            </a:r>
+          </a:p>
+          <a:p>
+            <a:pPr marL="342900" indent="-342900">
+              <a:spcBef>
+                <a:spcPts val="0"/>
+              </a:spcBef>
+              <a:spcAft>
+                <a:spcPts val="0"/>
+              </a:spcAft>
+              <a:buFont typeface="+mj-lt"/>
+              <a:buAutoNum type="arabicPeriod"/>
+            </a:pPr>
+            <a:r>
+              <a:rPr lang="en-US" sz="1600" dirty="0">
+                <a:effectLst/>
+                <a:latin typeface="Calibri" panose="020F0502020204030204" pitchFamily="34" charset="0"/>
+                <a:cs typeface="Calibri" panose="020F0502020204030204" pitchFamily="34" charset="0"/>
+              </a:rPr>
+              <a:t> Incitti F, Urli F, Snidaro L. Beyond word embeddings: A survey. </a:t>
+            </a:r>
+            <a:r>
+              <a:rPr lang="en-US" sz="1600" i="1" dirty="0">
+                <a:effectLst/>
+                <a:latin typeface="Calibri" panose="020F0502020204030204" pitchFamily="34" charset="0"/>
+                <a:cs typeface="Calibri" panose="020F0502020204030204" pitchFamily="34" charset="0"/>
+              </a:rPr>
+              <a:t>Inf Fusion</a:t>
+            </a:r>
+            <a:r>
+              <a:rPr lang="en-US" sz="1600" dirty="0">
+                <a:effectLst/>
+                <a:latin typeface="Calibri" panose="020F0502020204030204" pitchFamily="34" charset="0"/>
+                <a:cs typeface="Calibri" panose="020F0502020204030204" pitchFamily="34" charset="0"/>
+              </a:rPr>
+              <a:t>. 2023;89:418–36.</a:t>
+            </a:r>
+          </a:p>
+          <a:p>
+            <a:pPr marL="342900" indent="-342900">
+              <a:spcBef>
+                <a:spcPts val="0"/>
+              </a:spcBef>
+              <a:spcAft>
+                <a:spcPts val="0"/>
+              </a:spcAft>
+              <a:buFont typeface="+mj-lt"/>
+              <a:buAutoNum type="arabicPeriod"/>
+            </a:pPr>
+            <a:r>
+              <a:rPr lang="en-US" sz="1600" dirty="0">
+                <a:effectLst/>
+                <a:latin typeface="Calibri" panose="020F0502020204030204" pitchFamily="34" charset="0"/>
+                <a:cs typeface="Calibri" panose="020F0502020204030204" pitchFamily="34" charset="0"/>
+              </a:rPr>
+              <a:t> Khattak FK, Jeblee S, Pou-Prom C, </a:t>
+            </a:r>
+            <a:r>
+              <a:rPr lang="en-US" sz="1600" i="1" dirty="0">
+                <a:effectLst/>
+                <a:latin typeface="Calibri" panose="020F0502020204030204" pitchFamily="34" charset="0"/>
+                <a:cs typeface="Calibri" panose="020F0502020204030204" pitchFamily="34" charset="0"/>
+              </a:rPr>
+              <a:t>et al.</a:t>
+            </a:r>
+            <a:r>
+              <a:rPr lang="en-US" sz="1600" dirty="0">
+                <a:effectLst/>
+                <a:latin typeface="Calibri" panose="020F0502020204030204" pitchFamily="34" charset="0"/>
+                <a:cs typeface="Calibri" panose="020F0502020204030204" pitchFamily="34" charset="0"/>
+              </a:rPr>
+              <a:t> A survey of word embeddings for clinical text. </a:t>
+            </a:r>
+            <a:r>
+              <a:rPr lang="en-US" sz="1600" i="1" dirty="0">
+                <a:effectLst/>
+                <a:latin typeface="Calibri" panose="020F0502020204030204" pitchFamily="34" charset="0"/>
+                <a:cs typeface="Calibri" panose="020F0502020204030204" pitchFamily="34" charset="0"/>
+              </a:rPr>
+              <a:t>J Biomed Inform</a:t>
+            </a:r>
+            <a:r>
+              <a:rPr lang="en-US" sz="1600" dirty="0">
+                <a:effectLst/>
+                <a:latin typeface="Calibri" panose="020F0502020204030204" pitchFamily="34" charset="0"/>
+                <a:cs typeface="Calibri" panose="020F0502020204030204" pitchFamily="34" charset="0"/>
+              </a:rPr>
+              <a:t>. 2019;100S:100057.</a:t>
+            </a:r>
+          </a:p>
+          <a:p>
+            <a:endParaRPr lang="en-US" dirty="0"/>
+          </a:p>
+        </p:txBody>
+      </p:sp>
     </p:spTree>
     <p:extLst>
       <p:ext uri="{BB962C8B-B14F-4D97-AF65-F5344CB8AC3E}">

</xml_diff>

<commit_message>
update paper and poster abstracts
</commit_message>
<xml_diff>
--- a/MABC_CONF_2024/Poster_MABC_2024.pptx
+++ b/MABC_CONF_2024/Poster_MABC_2024.pptx
@@ -3923,8 +3923,8 @@
         </p:nvSpPr>
         <p:spPr>
           <a:xfrm>
-            <a:off x="449589" y="6119881"/>
-            <a:ext cx="16860148" cy="938712"/>
+            <a:off x="242639" y="6090290"/>
+            <a:ext cx="16897841" cy="938712"/>
           </a:xfrm>
           <a:prstGeom prst="rect">
             <a:avLst/>
@@ -3970,7 +3970,7 @@
         </p:nvSpPr>
         <p:spPr>
           <a:xfrm>
-            <a:off x="280332" y="17953061"/>
+            <a:off x="280332" y="18437991"/>
             <a:ext cx="16860149" cy="938712"/>
           </a:xfrm>
           <a:prstGeom prst="rect">
@@ -4017,7 +4017,7 @@
         </p:nvSpPr>
         <p:spPr>
           <a:xfrm>
-            <a:off x="91742" y="39766805"/>
+            <a:off x="242640" y="40318811"/>
             <a:ext cx="16938937" cy="938712"/>
           </a:xfrm>
           <a:prstGeom prst="rect">
@@ -4064,8 +4064,8 @@
         </p:nvSpPr>
         <p:spPr>
           <a:xfrm>
-            <a:off x="370803" y="7122504"/>
-            <a:ext cx="16781364" cy="11480066"/>
+            <a:off x="242639" y="7124865"/>
+            <a:ext cx="16938935" cy="11972508"/>
           </a:xfrm>
           <a:prstGeom prst="rect">
             <a:avLst/>
@@ -4194,7 +4194,29 @@
                 <a:latin typeface="Calibri" panose="020F0502020204030204" pitchFamily="34" charset="0"/>
                 <a:cs typeface="Calibri" panose="020F0502020204030204" pitchFamily="34" charset="0"/>
               </a:rPr>
-              <a:t>We developed a computational pipeline that loads the disease data file from NIH's clinical trials registry and identifies tumors from the rest of the diseases. Following the tumor identification, each tumor from the registry is mapped to a standardized tumor terminology from the WHO tumor classification system and NCIT using twelve text standardization methods based on text-similarity and text-embedding methods. We evaluate each of these methods on a subset of tumors derived from the registry to evaluate their accuracies in mapping the tumors to their standardized tumor terminology in the WHO tumor classification system. We limit the accuracy evaluation to only the WHO tumor classification system as it is considered the gold standard for tumor nomenclature.</a:t>
+              <a:t>We developed a computational pipeline that loads the conditions data file from NIH's clinical trials registry and identifies tumors from the rest of the conditions. Following the tumor identification, each tumor from the registry is mapped to a standardized tumor terminology from the WHO tumor classification system and </a:t>
+            </a:r>
+            <a:r>
+              <a:rPr lang="en-US" sz="3200" b="0" i="0" u="none" strike="noStrike" dirty="0" err="1">
+                <a:solidFill>
+                  <a:srgbClr val="0E101A"/>
+                </a:solidFill>
+                <a:effectLst/>
+                <a:latin typeface="Calibri" panose="020F0502020204030204" pitchFamily="34" charset="0"/>
+                <a:cs typeface="Calibri" panose="020F0502020204030204" pitchFamily="34" charset="0"/>
+              </a:rPr>
+              <a:t>NCIt</a:t>
+            </a:r>
+            <a:r>
+              <a:rPr lang="en-US" sz="3200" b="0" i="0" u="none" strike="noStrike" dirty="0">
+                <a:solidFill>
+                  <a:srgbClr val="0E101A"/>
+                </a:solidFill>
+                <a:effectLst/>
+                <a:latin typeface="Calibri" panose="020F0502020204030204" pitchFamily="34" charset="0"/>
+                <a:cs typeface="Calibri" panose="020F0502020204030204" pitchFamily="34" charset="0"/>
+              </a:rPr>
+              <a:t> using twelve text standardization methods based on text-similarity and text-embedding methods. We evaluated the accuracy of each of these methods in mapping tumor names to standardized tumor terminology in the WHO tumor classification system on a subset of tumor names derived from the clinical trials registry. We limit the accuracy evaluation to only the WHO tumor classification system as it is considered the gold standard for tumor nomenclature.</a:t>
             </a:r>
             <a:endParaRPr lang="en-US" sz="3200" b="0" dirty="0">
               <a:effectLst/>
@@ -4220,14 +4242,7 @@
                 <a:latin typeface="Calibri" panose="020F0502020204030204" pitchFamily="34" charset="0"/>
                 <a:cs typeface="Calibri" panose="020F0502020204030204" pitchFamily="34" charset="0"/>
               </a:rPr>
-              <a:t>Results:</a:t>
-            </a:r>
-            <a:r>
-              <a:rPr lang="en-US" sz="3200" dirty="0">
-                <a:latin typeface="Calibri" panose="020F0502020204030204" pitchFamily="34" charset="0"/>
-                <a:cs typeface="Calibri" panose="020F0502020204030204" pitchFamily="34" charset="0"/>
-              </a:rPr>
-              <a:t> </a:t>
+              <a:t>Results: </a:t>
             </a:r>
             <a:r>
               <a:rPr lang="en-US" sz="3200" b="0" i="0" u="none" strike="noStrike" dirty="0">
@@ -4238,13 +4253,8 @@
                 <a:latin typeface="Calibri" panose="020F0502020204030204" pitchFamily="34" charset="0"/>
                 <a:cs typeface="Calibri" panose="020F0502020204030204" pitchFamily="34" charset="0"/>
               </a:rPr>
-              <a:t>Our results revealed that embedding-based text standardization methods outperformed methods based on text-matching algorithms. We generated two different sets of embeddings from OpenAI’s large language models and observed that accuracy of methods improved with embeddings that had higher dimensions. In particular, we found that finding the closest WHO term to a given tumor name from the registry using Euclidean distance outperformed the other methods.</a:t>
-            </a:r>
-            <a:endParaRPr lang="en-US" sz="3200" b="0" dirty="0">
-              <a:effectLst/>
-              <a:latin typeface="Calibri" panose="020F0502020204030204" pitchFamily="34" charset="0"/>
-              <a:cs typeface="Calibri" panose="020F0502020204030204" pitchFamily="34" charset="0"/>
-            </a:endParaRPr>
+              <a:t>Our results revealed that embedding-based text standardization methods outperformed methods based on text-matching algorithms. We generated two different sets of embeddings from OpenAI’s large language models and observed that accuracy of methods improved with embeddings that had higher dimensions. In particular, the method that mapped a given tumor name in the registry to the nearest term from WHO tumor classification system using Euclidean distance in the embedding space outperformed other methods.</a:t>
+            </a:r>
           </a:p>
           <a:p>
             <a:pPr algn="just" rtl="0">
@@ -4282,7 +4292,7 @@
                 <a:latin typeface="Calibri" panose="020F0502020204030204" pitchFamily="34" charset="0"/>
                 <a:cs typeface="Calibri" panose="020F0502020204030204" pitchFamily="34" charset="0"/>
               </a:rPr>
-              <a:t>The tumor names in the NIH clinical trials registry are not standardized, making integrating this data with other biomedical databases challenging. Therefore, we developed a computational pipeline that identifies tumors from the NIH clinical trials registry and standardizes them according to the standardized terms established in the WHO tumors classification system. </a:t>
+              <a:t>The tumor names in the NIH clinical trials registry are not standardized, making integrating this data with other biomedical databases challenging. Therefore, we developed a computational pipeline that identifies tumors from the NIH clinical trials registry and maps them to their standardized terms established in the WHO tumors classification system. </a:t>
             </a:r>
             <a:endParaRPr lang="en-US" sz="3200" b="0" dirty="0">
               <a:effectLst/>
@@ -4312,7 +4322,7 @@
         </p:nvSpPr>
         <p:spPr>
           <a:xfrm>
-            <a:off x="17605220" y="6106424"/>
+            <a:off x="17559752" y="6162854"/>
             <a:ext cx="20683595" cy="938712"/>
           </a:xfrm>
           <a:prstGeom prst="rect">
@@ -4449,7 +4459,7 @@
         </p:nvSpPr>
         <p:spPr>
           <a:xfrm>
-            <a:off x="91741" y="40844339"/>
+            <a:off x="249315" y="41292159"/>
             <a:ext cx="16781364" cy="5765681"/>
           </a:xfrm>
           <a:prstGeom prst="rect">
@@ -4687,7 +4697,7 @@
         </p:nvSpPr>
         <p:spPr>
           <a:xfrm>
-            <a:off x="280332" y="18829214"/>
+            <a:off x="370802" y="19471291"/>
             <a:ext cx="16938935" cy="21786232"/>
           </a:xfrm>
           <a:prstGeom prst="rect">

</xml_diff>

<commit_message>
adding updates to database write up in MABC
</commit_message>
<xml_diff>
--- a/MABC_CONF_2024/Poster_MABC_2024.pptx
+++ b/MABC_CONF_2024/Poster_MABC_2024.pptx
@@ -4377,7 +4377,7 @@
         </p:blipFill>
         <p:spPr>
           <a:xfrm>
-            <a:off x="4501891" y="47543778"/>
+            <a:off x="4483044" y="48280343"/>
             <a:ext cx="6113349" cy="2548647"/>
           </a:xfrm>
           <a:prstGeom prst="rect">
@@ -4407,7 +4407,7 @@
         </p:blipFill>
         <p:spPr>
           <a:xfrm>
-            <a:off x="11196386" y="47561832"/>
+            <a:off x="11196385" y="48280343"/>
             <a:ext cx="5686409" cy="2282520"/>
           </a:xfrm>
           <a:prstGeom prst="rect">
@@ -4437,7 +4437,7 @@
         </p:blipFill>
         <p:spPr>
           <a:xfrm>
-            <a:off x="280332" y="47543778"/>
+            <a:off x="242639" y="48211621"/>
             <a:ext cx="3640413" cy="2928450"/>
           </a:xfrm>
           <a:prstGeom prst="rect">
@@ -4459,8 +4459,8 @@
         </p:nvSpPr>
         <p:spPr>
           <a:xfrm>
-            <a:off x="249315" y="41292159"/>
-            <a:ext cx="16781364" cy="5765681"/>
+            <a:off x="249314" y="41292159"/>
+            <a:ext cx="16891165" cy="6750566"/>
           </a:xfrm>
           <a:prstGeom prst="rect">
             <a:avLst/>
@@ -4506,7 +4506,7 @@
             </a:endParaRPr>
           </a:p>
           <a:p>
-            <a:pPr algn="just">
+            <a:pPr>
               <a:spcAft>
                 <a:spcPts val="2000"/>
               </a:spcAft>
@@ -4517,7 +4517,7 @@
                 <a:latin typeface="Calibri" panose="020F0502020204030204" pitchFamily="34" charset="0"/>
                 <a:cs typeface="Calibri" panose="020F0502020204030204" pitchFamily="34" charset="0"/>
               </a:rPr>
-              <a:t>The WHO Tumor Classification database consists names of adult and pediatric tumors. The database is considered the gold standard for tumor nomenclature and is used for standardization of the tumors identified from the CT registry. We considered  5</a:t>
+              <a:t>The WHO Tumor Classification database consists standardized terms for tumor names. This database is considered the gold standard for tumor nomenclature and is used for standardization of the tumors identified from the CT registry. We considered  5</a:t>
             </a:r>
             <a:r>
               <a:rPr lang="en-US" sz="3200" baseline="30000" dirty="0">
@@ -4602,17 +4602,27 @@
                 <a:latin typeface="Calibri" panose="020F0502020204030204" pitchFamily="34" charset="0"/>
                 <a:cs typeface="Calibri" panose="020F0502020204030204" pitchFamily="34" charset="0"/>
               </a:rPr>
-              <a:t>The Nationa</a:t>
+              <a:t>NCI Thesaurus (</a:t>
+            </a:r>
+            <a:r>
+              <a:rPr lang="en-US" sz="3200" dirty="0" err="1">
+                <a:effectLst/>
+                <a:latin typeface="Calibri" panose="020F0502020204030204" pitchFamily="34" charset="0"/>
+                <a:cs typeface="Calibri" panose="020F0502020204030204" pitchFamily="34" charset="0"/>
+              </a:rPr>
+              <a:t>NCIt</a:t>
             </a:r>
             <a:r>
               <a:rPr lang="en-US" sz="3200" dirty="0">
-                <a:latin typeface="Calibri" panose="020F0502020204030204" pitchFamily="34" charset="0"/>
-                <a:cs typeface="Calibri" panose="020F0502020204030204" pitchFamily="34" charset="0"/>
-              </a:rPr>
-              <a:t>l Cancer Institute thesaurus (</a:t>
+                <a:effectLst/>
+                <a:latin typeface="Calibri" panose="020F0502020204030204" pitchFamily="34" charset="0"/>
+                <a:cs typeface="Calibri" panose="020F0502020204030204" pitchFamily="34" charset="0"/>
+              </a:rPr>
+              <a:t>) provides reference terminology for many NCI and other systems. It covers vocabulary for clinical care, translational and basic research, and public information and administrative activities. The </a:t>
             </a:r>
             <a:r>
               <a:rPr lang="en-US" sz="3200" dirty="0" err="1">
+                <a:effectLst/>
                 <a:latin typeface="Calibri" panose="020F0502020204030204" pitchFamily="34" charset="0"/>
                 <a:cs typeface="Calibri" panose="020F0502020204030204" pitchFamily="34" charset="0"/>
               </a:rPr>
@@ -4620,18 +4630,11 @@
             </a:r>
             <a:r>
               <a:rPr lang="en-US" sz="3200" dirty="0">
-                <a:latin typeface="Calibri" panose="020F0502020204030204" pitchFamily="34" charset="0"/>
-                <a:cs typeface="Calibri" panose="020F0502020204030204" pitchFamily="34" charset="0"/>
-              </a:rPr>
-              <a:t>) also provides standardized tumor terms and it is also used for standardizing the tumor names from the clinical trials registry.  </a:t>
-            </a:r>
-            <a:r>
-              <a:rPr lang="en-US" sz="3200" dirty="0">
-                <a:effectLst/>
-                <a:latin typeface="Calibri" panose="020F0502020204030204" pitchFamily="34" charset="0"/>
-                <a:cs typeface="Calibri" panose="020F0502020204030204" pitchFamily="34" charset="0"/>
-              </a:rPr>
-              <a:t> </a:t>
+                <a:effectLst/>
+                <a:latin typeface="Calibri" panose="020F0502020204030204" pitchFamily="34" charset="0"/>
+                <a:cs typeface="Calibri" panose="020F0502020204030204" pitchFamily="34" charset="0"/>
+              </a:rPr>
+              <a:t> database also provides standardized terms for tumor names. We used this database to standardize the tumor names from the clinical trials registry. </a:t>
             </a:r>
           </a:p>
         </p:txBody>
@@ -4866,7 +4869,7 @@
                 <a:latin typeface="Calibri" panose="020F0502020204030204" pitchFamily="34" charset="0"/>
                 <a:cs typeface="Calibri" panose="020F0502020204030204" pitchFamily="34" charset="0"/>
               </a:rPr>
-              <a:t>.  Therefore, to understand the therapeutic landscape associated with adult and pediatric tumors, it is critical to extract and analyze data from various biomedical databases, especially the National Institutes of Health (NIH) Clinical Trials Registry (CT Registry). The CT registry stores data about various aspects of a clinical trial in separate text files in its database. One such file is the conditions file, which informs the users about the conditions/diseases being studied for a clinical trial. Thus, the condition file is the key to extracting cancer information from the CT registry. </a:t>
+              <a:t>.  Therefore, to understand the therapeutic landscape associated with adult and pediatric tumors, it is critical to extract and analyze data from various biomedical databases, especially the National Institutes of Health’s (NIH) Clinical Trials Registry (CT Registry). The CT registry stores data about various aspects of a clinical trial in separate text files in its database. One such file is the conditions file, which informs the users about the conditions/diseases being studied for a clinical trial. Thus, the condition file is the key to extracting cancer information from the CT registry. </a:t>
             </a:r>
           </a:p>
           <a:p>
@@ -4905,7 +4908,7 @@
                 <a:latin typeface="Calibri" panose="020F0502020204030204" pitchFamily="34" charset="0"/>
                 <a:cs typeface="Calibri" panose="020F0502020204030204" pitchFamily="34" charset="0"/>
               </a:rPr>
-              <a:t>Even though there are established protocols for submitting data into the CT registry and maintaining data integrity, our analysis of the conditions data revealed that the conditions file contains various inconsistencies in the form of extraneous information, typographical errors, missing values, etc. Furthermore, the tumor names need to be extracted from the file from the rest of the conditions, and the tumor names are not necessarily standardized with respect to the World Health Organization's tumor classification system (WHO database) and the National Cancer Institute Thesaurus (</a:t>
+              <a:t>Even though there are established protocols for submitting data into the CT registry to ensure data integrity, our analysis of the conditions file revealed that the conditions data contain various inconsistencies in the form of extraneous information, typographical errors, missing values, etc. Furthermore, the tumor names need to be extracted from the file from the rest of the conditions, and the tumor names are not necessarily standardized with respect to the World Health Organization's tumor classification system (WHO database) and the National Cancer Institute Thesaurus (</a:t>
             </a:r>
             <a:r>
               <a:rPr lang="en-US" sz="3200" dirty="0" err="1">
@@ -5091,7 +5094,7 @@
                 <a:latin typeface="Calibri" panose="020F0502020204030204" pitchFamily="34" charset="0"/>
                 <a:cs typeface="Calibri" panose="020F0502020204030204" pitchFamily="34" charset="0"/>
               </a:rPr>
-              <a:t>We manually validated each of the CT registry condition terms that were identified as tumor and pediatric tumor by the pipeline. For each pediatric tumor, we also manually added a citation from peer-reviewed literature, governmental websites, or articles posted by a research institution stating that the tumor in question is a pediatric tumor. </a:t>
+              <a:t>We manually validated each of the CT registry condition terms that were identified as tumor by the pipeline. For each tumor that was determined to be a pediatric tumor, we also manually added a citation from peer-reviewed literature, governmental websites, or articles published by a research institution stating that the tumor in question is a pediatric tumor. </a:t>
             </a:r>
             <a:r>
               <a:rPr lang="en-US" sz="3200" dirty="0">

</xml_diff>

<commit_message>
fix NCit issues in the text
</commit_message>
<xml_diff>
--- a/MABC_CONF_2024/Poster_MABC_2024.pptx
+++ b/MABC_CONF_2024/Poster_MABC_2024.pptx
@@ -5339,7 +5339,43 @@
                 </a:solidFill>
                 <a:effectLst/>
               </a:rPr>
-              <a:t>WHO and NCIT databases. We then identified the WHO and NCIT terms closest to each tumor term in the CT registry and assigned them as the standardized term. </a:t>
+              <a:t>WHO and </a:t>
+            </a:r>
+            <a:r>
+              <a:rPr lang="en-US" sz="3200" dirty="0" err="1">
+                <a:solidFill>
+                  <a:srgbClr val="0E101A"/>
+                </a:solidFill>
+                <a:effectLst/>
+              </a:rPr>
+              <a:t>NCIt</a:t>
+            </a:r>
+            <a:r>
+              <a:rPr lang="en-US" sz="3200" dirty="0">
+                <a:solidFill>
+                  <a:srgbClr val="0E101A"/>
+                </a:solidFill>
+                <a:effectLst/>
+              </a:rPr>
+              <a:t> databases. We then identified the WHO and </a:t>
+            </a:r>
+            <a:r>
+              <a:rPr lang="en-US" sz="3200" dirty="0" err="1">
+                <a:solidFill>
+                  <a:srgbClr val="0E101A"/>
+                </a:solidFill>
+                <a:effectLst/>
+              </a:rPr>
+              <a:t>NCIt</a:t>
+            </a:r>
+            <a:r>
+              <a:rPr lang="en-US" sz="3200" dirty="0">
+                <a:solidFill>
+                  <a:srgbClr val="0E101A"/>
+                </a:solidFill>
+                <a:effectLst/>
+              </a:rPr>
+              <a:t> terms closest to each tumor term in the CT registry and assigned them as the standardized term. </a:t>
             </a:r>
           </a:p>
           <a:p>
@@ -5367,24 +5403,96 @@
                 </a:solidFill>
                 <a:effectLst/>
               </a:rPr>
-              <a:t>: In this method, we computed the pairwise edit distance between each tumor term in the CT registry, WHO, and NCIT databases and used it as a divergence metric for affinity propagation clustering. For each cluster, we evaluate if they are large and perform nested clustering if necessary. In the following step we performed outlier analysis using isolation forest and local outlier factors on each cluster. Finally, for each cluster, we assign a standardized cluster label. This </a:t>
+              <a:t>: In this method, we computed the pairwise edit distance between each tumor term in the CT registry, WHO, and </a:t>
+            </a:r>
+            <a:r>
+              <a:rPr lang="en-US" sz="3200" dirty="0" err="1">
+                <a:solidFill>
+                  <a:srgbClr val="0E101A"/>
+                </a:solidFill>
+                <a:effectLst/>
+              </a:rPr>
+              <a:t>NCIt</a:t>
             </a:r>
             <a:r>
               <a:rPr lang="en-US" sz="3200" dirty="0">
                 <a:solidFill>
                   <a:srgbClr val="0E101A"/>
                 </a:solidFill>
-              </a:rPr>
-              <a:t>was done by identifying </a:t>
+                <a:effectLst/>
+              </a:rPr>
+              <a:t> databases and used it as a divergence metric for affinity propagation clustering. For each cluster, we evaluate if they are large and perform nested clustering if necessary. In the following step we performed outlier analysis using isolation forest and local outlier factors on each cluster. Finally, for each cluster, we assign a standardized cluster label. This </a:t>
             </a:r>
             <a:r>
               <a:rPr lang="en-US" sz="3200" dirty="0">
                 <a:solidFill>
                   <a:srgbClr val="0E101A"/>
                 </a:solidFill>
-                <a:effectLst/>
-              </a:rPr>
-              <a:t>the WHO and NCIT terms closest to each cluster member. If there was a WHO or NCIT term closest to most of the cluster members (majority), then that term is assigned as the standardized tumor name for each cluster member; otherwise, each cluster member is assigned to its nearest (in terms of edit distances) matching WHO and NCIT terms. </a:t>
+              </a:rPr>
+              <a:t>was done by identifying </a:t>
+            </a:r>
+            <a:r>
+              <a:rPr lang="en-US" sz="3200" dirty="0">
+                <a:solidFill>
+                  <a:srgbClr val="0E101A"/>
+                </a:solidFill>
+                <a:effectLst/>
+              </a:rPr>
+              <a:t>the WHO and </a:t>
+            </a:r>
+            <a:r>
+              <a:rPr lang="en-US" sz="3200" dirty="0" err="1">
+                <a:solidFill>
+                  <a:srgbClr val="0E101A"/>
+                </a:solidFill>
+                <a:effectLst/>
+              </a:rPr>
+              <a:t>NCIt</a:t>
+            </a:r>
+            <a:r>
+              <a:rPr lang="en-US" sz="3200" dirty="0">
+                <a:solidFill>
+                  <a:srgbClr val="0E101A"/>
+                </a:solidFill>
+                <a:effectLst/>
+              </a:rPr>
+              <a:t> terms closest to each cluster member. If there was a WHO or </a:t>
+            </a:r>
+            <a:r>
+              <a:rPr lang="en-US" sz="3200" dirty="0" err="1">
+                <a:solidFill>
+                  <a:srgbClr val="0E101A"/>
+                </a:solidFill>
+                <a:effectLst/>
+              </a:rPr>
+              <a:t>NCIt</a:t>
+            </a:r>
+            <a:r>
+              <a:rPr lang="en-US" sz="3200" dirty="0">
+                <a:solidFill>
+                  <a:srgbClr val="0E101A"/>
+                </a:solidFill>
+                <a:effectLst/>
+              </a:rPr>
+              <a:t> term closest to most of the cluster members (majority), then that term is assigned as the standardized tumor name for each cluster member; otherwise, each cluster member is assigned to its nearest (in terms of edit distances) matching WHO and </a:t>
+            </a:r>
+            <a:r>
+              <a:rPr lang="en-US" sz="3200" dirty="0" err="1">
+                <a:solidFill>
+                  <a:srgbClr val="0E101A"/>
+                </a:solidFill>
+                <a:effectLst/>
+              </a:rPr>
+              <a:t>NCIt</a:t>
+            </a:r>
+            <a:r>
+              <a:rPr lang="en-US" sz="3200" dirty="0">
+                <a:solidFill>
+                  <a:srgbClr val="0E101A"/>
+                </a:solidFill>
+                <a:effectLst/>
+              </a:rPr>
+              <a:t> terms. </a:t>
             </a:r>
           </a:p>
           <a:p>
@@ -5473,7 +5581,43 @@
                 </a:solidFill>
                 <a:effectLst/>
               </a:rPr>
-              <a:t> We computed the Euclidean distance in the embedding space ( LTE-3 or ADA002) between each tumor term in the CT registry and the terms in the WHO and NCIT databases. We then identified the WHO and NCIT terms closest to each tumor term in the CT registry and assigned them as the standardized term. </a:t>
+              <a:t> We computed the Euclidean distance in the embedding space ( LTE-3 or ADA002) between each tumor term in the CT registry and the terms in the WHO and </a:t>
+            </a:r>
+            <a:r>
+              <a:rPr lang="en-US" sz="3200" dirty="0" err="1">
+                <a:solidFill>
+                  <a:srgbClr val="0E101A"/>
+                </a:solidFill>
+                <a:effectLst/>
+              </a:rPr>
+              <a:t>NCIt</a:t>
+            </a:r>
+            <a:r>
+              <a:rPr lang="en-US" sz="3200" dirty="0">
+                <a:solidFill>
+                  <a:srgbClr val="0E101A"/>
+                </a:solidFill>
+                <a:effectLst/>
+              </a:rPr>
+              <a:t> databases. We then identified the WHO and </a:t>
+            </a:r>
+            <a:r>
+              <a:rPr lang="en-US" sz="3200" dirty="0" err="1">
+                <a:solidFill>
+                  <a:srgbClr val="0E101A"/>
+                </a:solidFill>
+                <a:effectLst/>
+              </a:rPr>
+              <a:t>NCIt</a:t>
+            </a:r>
+            <a:r>
+              <a:rPr lang="en-US" sz="3200" dirty="0">
+                <a:solidFill>
+                  <a:srgbClr val="0E101A"/>
+                </a:solidFill>
+                <a:effectLst/>
+              </a:rPr>
+              <a:t> terms closest to each tumor term in the CT registry and assigned them as the standardized term. </a:t>
             </a:r>
           </a:p>
           <a:p>
@@ -5501,7 +5645,25 @@
                 </a:solidFill>
                 <a:effectLst/>
               </a:rPr>
-              <a:t>: In this method, we first perform principal component analysis to reduce the dimensionality of the embedding space. We then compute pairwise Euclidean distance between each tumor term in the CT registry, WHO, and NCIT databases in the PCA transformed embedding space and use it as a divergence metric for affinity propagation and K-Means clustering. For clusters formed using affinity propagation only, we evaluated if they were large and performed nested clustering if required. Then, for both clustering methods, we carry out outlier analysis and cluster label assignment as we did in edit distance based affinity propagation clustering. </a:t>
+              <a:t>: In this method, we first perform principal component analysis to reduce the dimensionality of the embedding space. We then compute pairwise Euclidean distance between each tumor term in the CT registry, WHO, and </a:t>
+            </a:r>
+            <a:r>
+              <a:rPr lang="en-US" sz="3200">
+                <a:solidFill>
+                  <a:srgbClr val="0E101A"/>
+                </a:solidFill>
+                <a:effectLst/>
+              </a:rPr>
+              <a:t>NCIt </a:t>
+            </a:r>
+            <a:r>
+              <a:rPr lang="en-US" sz="3200" dirty="0">
+                <a:solidFill>
+                  <a:srgbClr val="0E101A"/>
+                </a:solidFill>
+                <a:effectLst/>
+              </a:rPr>
+              <a:t>databases in the PCA transformed embedding space and use it as a divergence metric for affinity propagation and K-Means clustering. For clusters formed using affinity propagation only, we evaluated if they were large and performed nested clustering if required. Then, for both clustering methods, we carry out outlier analysis and cluster label assignment as we did in edit distance based affinity propagation clustering. </a:t>
             </a:r>
           </a:p>
           <a:p>

</xml_diff>

<commit_message>
updates to manuscript abstract, and background, and MABC poster
</commit_message>
<xml_diff>
--- a/MABC_CONF_2024/Poster_MABC_2024.pptx
+++ b/MABC_CONF_2024/Poster_MABC_2024.pptx
@@ -5198,7 +5198,7 @@
         </p:blipFill>
         <p:spPr>
           <a:xfrm>
-            <a:off x="20075319" y="7122504"/>
+            <a:off x="20799296" y="7101566"/>
             <a:ext cx="14098078" cy="13464086"/>
           </a:xfrm>
           <a:prstGeom prst="rect">
@@ -5221,7 +5221,7 @@
         <p:spPr>
           <a:xfrm>
             <a:off x="17407857" y="20516163"/>
-            <a:ext cx="19433003" cy="16096714"/>
+            <a:ext cx="20646383" cy="14619387"/>
           </a:xfrm>
           <a:prstGeom prst="rect">
             <a:avLst/>
@@ -5375,7 +5375,7 @@
                 </a:solidFill>
                 <a:effectLst/>
               </a:rPr>
-              <a:t> terms closest to each tumor term in the CT registry and assigned them as the standardized term. </a:t>
+              <a:t> terms closest to each tumor term in the CT registry and mapped them as the standardized term. </a:t>
             </a:r>
           </a:p>
           <a:p>
@@ -5648,13 +5648,13 @@
               <a:t>: In this method, we first perform principal component analysis to reduce the dimensionality of the embedding space. We then compute pairwise Euclidean distance between each tumor term in the CT registry, WHO, and </a:t>
             </a:r>
             <a:r>
-              <a:rPr lang="en-US" sz="3200">
+              <a:rPr lang="en-US" sz="3200" dirty="0" err="1">
                 <a:solidFill>
                   <a:srgbClr val="0E101A"/>
                 </a:solidFill>
                 <a:effectLst/>
               </a:rPr>
-              <a:t>NCIt </a:t>
+              <a:t>NCIt</a:t>
             </a:r>
             <a:r>
               <a:rPr lang="en-US" sz="3200" dirty="0">
@@ -5663,7 +5663,7 @@
                 </a:solidFill>
                 <a:effectLst/>
               </a:rPr>
-              <a:t>databases in the PCA transformed embedding space and use it as a divergence metric for affinity propagation and K-Means clustering. For clusters formed using affinity propagation only, we evaluated if they were large and performed nested clustering if required. Then, for both clustering methods, we carry out outlier analysis and cluster label assignment as we did in edit distance based affinity propagation clustering. </a:t>
+              <a:t> databases in the PCA transformed embedding space and use it as a divergence metric for affinity propagation and K-Means clustering. For clusters formed using affinity propagation only, we evaluated if they were large and performed nested clustering if required. Then, for both clustering methods, we carry out outlier analysis and cluster label assignment as we did in edit distance based affinity propagation clustering. </a:t>
             </a:r>
           </a:p>
           <a:p>

</xml_diff>

<commit_message>
fix text in MABC poster
</commit_message>
<xml_diff>
--- a/MABC_CONF_2024/Poster_MABC_2024.pptx
+++ b/MABC_CONF_2024/Poster_MABC_2024.pptx
@@ -4407,8 +4407,8 @@
         </p:blipFill>
         <p:spPr>
           <a:xfrm>
-            <a:off x="11196385" y="48280343"/>
-            <a:ext cx="5686409" cy="2282520"/>
+            <a:off x="11196385" y="48211620"/>
+            <a:ext cx="5944094" cy="2385955"/>
           </a:xfrm>
           <a:prstGeom prst="rect">
             <a:avLst/>
@@ -4653,7 +4653,7 @@
         </p:nvSpPr>
         <p:spPr>
           <a:xfrm>
-            <a:off x="17208214" y="46610020"/>
+            <a:off x="17327093" y="45699807"/>
             <a:ext cx="20916254" cy="938712"/>
           </a:xfrm>
           <a:prstGeom prst="rect">
@@ -5198,7 +5198,7 @@
         </p:blipFill>
         <p:spPr>
           <a:xfrm>
-            <a:off x="20799296" y="7101566"/>
+            <a:off x="20852510" y="7124865"/>
             <a:ext cx="14098078" cy="13464086"/>
           </a:xfrm>
           <a:prstGeom prst="rect">
@@ -5221,7 +5221,7 @@
         <p:spPr>
           <a:xfrm>
             <a:off x="17407857" y="20516163"/>
-            <a:ext cx="20646383" cy="14619387"/>
+            <a:ext cx="20646383" cy="15111829"/>
           </a:xfrm>
           <a:prstGeom prst="rect">
             <a:avLst/>
@@ -5421,7 +5421,7 @@
                 </a:solidFill>
                 <a:effectLst/>
               </a:rPr>
-              <a:t> databases and used it as a divergence metric for affinity propagation clustering. For each cluster, we evaluate if they are large and perform nested clustering if necessary. In the following step we performed outlier analysis using isolation forest and local outlier factors on each cluster. Finally, for each cluster, we assign a standardized cluster label. This </a:t>
+              <a:t> databases and used it as a divergence metric for affinity propagation clustering. For each cluster, we evaluated if they were large and performed nested clustering if necessary. In the following step we performed outlier analysis using isolation forest and local outlier factors on each cluster. Finally, for each cluster, we assigned a standardized cluster label. This </a:t>
             </a:r>
             <a:r>
               <a:rPr lang="en-US" sz="3200" dirty="0">
@@ -5474,7 +5474,7 @@
                 </a:solidFill>
                 <a:effectLst/>
               </a:rPr>
-              <a:t> term closest to most of the cluster members (majority), then that term is assigned as the standardized tumor name for each cluster member; otherwise, each cluster member is assigned to its nearest (in terms of edit distances) matching WHO and </a:t>
+              <a:t> term closest to most of the cluster members (majority), then that term was assigned as the standardized tumor name for each cluster member; otherwise, each cluster member was assigned to its nearest (in terms of edit distances) matching WHO and </a:t>
             </a:r>
             <a:r>
               <a:rPr lang="en-US" sz="3200" dirty="0" err="1">
@@ -5553,7 +5553,7 @@
                 </a:solidFill>
                 <a:effectLst/>
               </a:rPr>
-              <a:t> databases using Open AI's text embedding models: text-embedding-ada-002 (ADA002) and text-embedding-3-large (LTE-3)</a:t>
+              <a:t> databases using Open AI's text embedding models: text-embedding-ada-002 (ADA002) and text-embedding-3-large (LTE-3).</a:t>
             </a:r>
           </a:p>
           <a:p>
@@ -5645,7 +5645,7 @@
                 </a:solidFill>
                 <a:effectLst/>
               </a:rPr>
-              <a:t>: In this method, we first perform principal component analysis to reduce the dimensionality of the embedding space. We then compute pairwise Euclidean distance between each tumor term in the CT registry, WHO, and </a:t>
+              <a:t>: In this method, we first performed principal component analysis to reduce the dimensionality of the embedding space. We then computed pairwise Euclidean distance between each tumor term in the CT registry, WHO, and </a:t>
             </a:r>
             <a:r>
               <a:rPr lang="en-US" sz="3200" dirty="0" err="1">
@@ -5663,7 +5663,7 @@
                 </a:solidFill>
                 <a:effectLst/>
               </a:rPr>
-              <a:t> databases in the PCA transformed embedding space and use it as a divergence metric for affinity propagation and K-Means clustering. For clusters formed using affinity propagation only, we evaluated if they were large and performed nested clustering if required. Then, for both clustering methods, we carry out outlier analysis and cluster label assignment as we did in edit distance based affinity propagation clustering. </a:t>
+              <a:t> databases in the PCA transformed embedding space and used it as a divergence metric for affinity propagation and K-Means clustering. For clusters formed using affinity propagation only, we evaluated if they were large and performed nested clustering if required. Then, for both clustering methods, we carried out outlier analysis and cluster label assignment as we did in edit distance based affinity propagation clustering. </a:t>
             </a:r>
           </a:p>
           <a:p>
@@ -5757,7 +5757,7 @@
         </p:nvSpPr>
         <p:spPr>
           <a:xfrm>
-            <a:off x="17407856" y="35029045"/>
+            <a:off x="17344740" y="33739838"/>
             <a:ext cx="20880959" cy="938712"/>
           </a:xfrm>
           <a:prstGeom prst="rect">
@@ -5805,13 +5805,13 @@
           <p:nvPr>
             <p:extLst>
               <p:ext uri="{D42A27DB-BD31-4B8C-83A1-F6EECF244321}">
-                <p14:modId xmlns:p14="http://schemas.microsoft.com/office/powerpoint/2010/main" val="1590498535"/>
+                <p14:modId xmlns:p14="http://schemas.microsoft.com/office/powerpoint/2010/main" val="3981291111"/>
               </p:ext>
             </p:extLst>
           </p:nvPr>
         </p:nvGraphicFramePr>
         <p:xfrm>
-          <a:off x="28952955" y="39855801"/>
+          <a:off x="28819626" y="38859293"/>
           <a:ext cx="9335860" cy="6399133"/>
         </p:xfrm>
         <a:graphic>
@@ -9602,8 +9602,8 @@
         </p:nvSpPr>
         <p:spPr>
           <a:xfrm>
-            <a:off x="17356795" y="35833696"/>
-            <a:ext cx="20650387" cy="4031873"/>
+            <a:off x="17403853" y="34627455"/>
+            <a:ext cx="20916254" cy="4031873"/>
           </a:xfrm>
           <a:prstGeom prst="rect">
             <a:avLst/>
@@ -9618,31 +9618,7 @@
           <a:p>
             <a:r>
               <a:rPr lang="en-US" sz="3200" dirty="0"/>
-              <a:t>To evaluate the performance accuracies of each method we needed to annotate the ground truth or the most appropriate standardized tumor name for each of the tumor term from the clinical trials registry. Since these annotations are not available it is not feasible to manually annotate all the 13,230 tumors. Thus, we arbitrarily sampled 1600 tumors from the CT registry and manually annotated the ground truths for them to evaluate the accuracies. However, we only limit the ground truth annotation with respect to the 5th edition and the combined editions (3</a:t>
-            </a:r>
-            <a:r>
-              <a:rPr lang="en-US" sz="3200" baseline="30000" dirty="0"/>
-              <a:t>rd</a:t>
-            </a:r>
-            <a:r>
-              <a:rPr lang="en-US" sz="3200" dirty="0"/>
-              <a:t>, 4</a:t>
-            </a:r>
-            <a:r>
-              <a:rPr lang="en-US" sz="3200" baseline="30000" dirty="0"/>
-              <a:t>th</a:t>
-            </a:r>
-            <a:r>
-              <a:rPr lang="en-US" sz="3200" dirty="0"/>
-              <a:t> and 5</a:t>
-            </a:r>
-            <a:r>
-              <a:rPr lang="en-US" sz="3200" baseline="30000" dirty="0"/>
-              <a:t>th</a:t>
-            </a:r>
-            <a:r>
-              <a:rPr lang="en-US" sz="3200" dirty="0"/>
-              <a:t>) edition of WHO database. We limit the accuracy evaluations to only the WHO tumor database as it is considered the gold standard for tumor nomenclature.  However, we provide the WHO and NCIT standardized terms for each tumor term in the CT registry as supplemental files. </a:t>
+              <a:t>To evaluate each method's performance accuracies, we needed to annotate the ground truth, i.e., the appropriate standardized tumor nomenclature for each tumor name from the CT registry. Since these annotations are not available, they need to be manually annotated. Since it is not feasible to manually annotate all the 13,230 tumors, we arbitrarily sampled 1600 tumors from the CT registry for manual annotation so that the accuracies of each standardization method could be estimated. However, we limited the ground truth annotation to the 5th edition and the combined editions (3rd, 4th and 5th) of the WHO database. This is because the WHO database is considered the gold standard for tumor nomenclature.  However, we provided the WHO and NCIT standardized terms for each tumor term in the CT registry as supplemental files. </a:t>
             </a:r>
           </a:p>
         </p:txBody>
@@ -9662,13 +9638,13 @@
           <p:nvPr>
             <p:extLst>
               <p:ext uri="{D42A27DB-BD31-4B8C-83A1-F6EECF244321}">
-                <p14:modId xmlns:p14="http://schemas.microsoft.com/office/powerpoint/2010/main" val="1553477944"/>
+                <p14:modId xmlns:p14="http://schemas.microsoft.com/office/powerpoint/2010/main" val="2061342764"/>
               </p:ext>
             </p:extLst>
           </p:nvPr>
         </p:nvGraphicFramePr>
         <p:xfrm>
-          <a:off x="17478060" y="39907445"/>
+          <a:off x="17490691" y="38839110"/>
           <a:ext cx="11062410" cy="6389389"/>
         </p:xfrm>
         <a:graphic>
@@ -13293,7 +13269,7 @@
         </p:nvSpPr>
         <p:spPr>
           <a:xfrm>
-            <a:off x="17309737" y="47451506"/>
+            <a:off x="17297533" y="46622663"/>
             <a:ext cx="20650387" cy="3908762"/>
           </a:xfrm>
           <a:prstGeom prst="rect">

</xml_diff>

<commit_message>
fix ppt image for pipeline
</commit_message>
<xml_diff>
--- a/MABC_CONF_2024/Poster_MABC_2024.pptx
+++ b/MABC_CONF_2024/Poster_MABC_2024.pptx
@@ -197,7 +197,7 @@
           <a:p>
             <a:fld id="{D5C4B054-80A2-7F4E-AB06-502C5069E235}" type="datetimeFigureOut">
               <a:rPr lang="en-US" smtClean="0"/>
-              <a:t>9/22/24</a:t>
+              <a:t>9/30/24</a:t>
             </a:fld>
             <a:endParaRPr lang="en-US"/>
           </a:p>
@@ -679,7 +679,7 @@
           <a:p>
             <a:fld id="{533FD80D-BBB5-6E40-8FD3-426FE7B58FAD}" type="datetimeFigureOut">
               <a:rPr lang="en-US" smtClean="0"/>
-              <a:t>9/22/24</a:t>
+              <a:t>9/30/24</a:t>
             </a:fld>
             <a:endParaRPr lang="en-US"/>
           </a:p>
@@ -849,7 +849,7 @@
           <a:p>
             <a:fld id="{533FD80D-BBB5-6E40-8FD3-426FE7B58FAD}" type="datetimeFigureOut">
               <a:rPr lang="en-US" smtClean="0"/>
-              <a:t>9/22/24</a:t>
+              <a:t>9/30/24</a:t>
             </a:fld>
             <a:endParaRPr lang="en-US"/>
           </a:p>
@@ -1029,7 +1029,7 @@
           <a:p>
             <a:fld id="{533FD80D-BBB5-6E40-8FD3-426FE7B58FAD}" type="datetimeFigureOut">
               <a:rPr lang="en-US" smtClean="0"/>
-              <a:t>9/22/24</a:t>
+              <a:t>9/30/24</a:t>
             </a:fld>
             <a:endParaRPr lang="en-US"/>
           </a:p>
@@ -1199,7 +1199,7 @@
           <a:p>
             <a:fld id="{533FD80D-BBB5-6E40-8FD3-426FE7B58FAD}" type="datetimeFigureOut">
               <a:rPr lang="en-US" smtClean="0"/>
-              <a:t>9/22/24</a:t>
+              <a:t>9/30/24</a:t>
             </a:fld>
             <a:endParaRPr lang="en-US"/>
           </a:p>
@@ -1445,7 +1445,7 @@
           <a:p>
             <a:fld id="{533FD80D-BBB5-6E40-8FD3-426FE7B58FAD}" type="datetimeFigureOut">
               <a:rPr lang="en-US" smtClean="0"/>
-              <a:t>9/22/24</a:t>
+              <a:t>9/30/24</a:t>
             </a:fld>
             <a:endParaRPr lang="en-US"/>
           </a:p>
@@ -1677,7 +1677,7 @@
           <a:p>
             <a:fld id="{533FD80D-BBB5-6E40-8FD3-426FE7B58FAD}" type="datetimeFigureOut">
               <a:rPr lang="en-US" smtClean="0"/>
-              <a:t>9/22/24</a:t>
+              <a:t>9/30/24</a:t>
             </a:fld>
             <a:endParaRPr lang="en-US"/>
           </a:p>
@@ -2044,7 +2044,7 @@
           <a:p>
             <a:fld id="{533FD80D-BBB5-6E40-8FD3-426FE7B58FAD}" type="datetimeFigureOut">
               <a:rPr lang="en-US" smtClean="0"/>
-              <a:t>9/22/24</a:t>
+              <a:t>9/30/24</a:t>
             </a:fld>
             <a:endParaRPr lang="en-US"/>
           </a:p>
@@ -2162,7 +2162,7 @@
           <a:p>
             <a:fld id="{533FD80D-BBB5-6E40-8FD3-426FE7B58FAD}" type="datetimeFigureOut">
               <a:rPr lang="en-US" smtClean="0"/>
-              <a:t>9/22/24</a:t>
+              <a:t>9/30/24</a:t>
             </a:fld>
             <a:endParaRPr lang="en-US"/>
           </a:p>
@@ -2257,7 +2257,7 @@
           <a:p>
             <a:fld id="{533FD80D-BBB5-6E40-8FD3-426FE7B58FAD}" type="datetimeFigureOut">
               <a:rPr lang="en-US" smtClean="0"/>
-              <a:t>9/22/24</a:t>
+              <a:t>9/30/24</a:t>
             </a:fld>
             <a:endParaRPr lang="en-US"/>
           </a:p>
@@ -2534,7 +2534,7 @@
           <a:p>
             <a:fld id="{533FD80D-BBB5-6E40-8FD3-426FE7B58FAD}" type="datetimeFigureOut">
               <a:rPr lang="en-US" smtClean="0"/>
-              <a:t>9/22/24</a:t>
+              <a:t>9/30/24</a:t>
             </a:fld>
             <a:endParaRPr lang="en-US"/>
           </a:p>
@@ -2791,7 +2791,7 @@
           <a:p>
             <a:fld id="{533FD80D-BBB5-6E40-8FD3-426FE7B58FAD}" type="datetimeFigureOut">
               <a:rPr lang="en-US" smtClean="0"/>
-              <a:t>9/22/24</a:t>
+              <a:t>9/30/24</a:t>
             </a:fld>
             <a:endParaRPr lang="en-US"/>
           </a:p>
@@ -3004,7 +3004,7 @@
           <a:p>
             <a:fld id="{533FD80D-BBB5-6E40-8FD3-426FE7B58FAD}" type="datetimeFigureOut">
               <a:rPr lang="en-US" smtClean="0"/>
-              <a:t>9/22/24</a:t>
+              <a:t>9/30/24</a:t>
             </a:fld>
             <a:endParaRPr lang="en-US"/>
           </a:p>
@@ -5176,36 +5176,6 @@
           </a:p>
         </p:txBody>
       </p:sp>
-      <p:pic>
-        <p:nvPicPr>
-          <p:cNvPr id="32" name="Picture 31" descr="A diagram of a company&#10;&#10;Description automatically generated">
-            <a:extLst>
-              <a:ext uri="{FF2B5EF4-FFF2-40B4-BE49-F238E27FC236}">
-                <a16:creationId xmlns:a16="http://schemas.microsoft.com/office/drawing/2014/main" id="{02E85AC4-6FE5-A42A-06F8-4DFC24EE3E3E}"/>
-              </a:ext>
-            </a:extLst>
-          </p:cNvPr>
-          <p:cNvPicPr>
-            <a:picLocks noChangeAspect="1"/>
-          </p:cNvPicPr>
-          <p:nvPr/>
-        </p:nvPicPr>
-        <p:blipFill>
-          <a:blip r:embed="rId14"/>
-          <a:stretch>
-            <a:fillRect/>
-          </a:stretch>
-        </p:blipFill>
-        <p:spPr>
-          <a:xfrm>
-            <a:off x="20852510" y="7124865"/>
-            <a:ext cx="14098078" cy="13464086"/>
-          </a:xfrm>
-          <a:prstGeom prst="rect">
-            <a:avLst/>
-          </a:prstGeom>
-        </p:spPr>
-      </p:pic>
       <p:sp>
         <p:nvSpPr>
           <p:cNvPr id="33" name="TextBox 32">
@@ -13862,6 +13832,36 @@
           </a:p>
         </p:txBody>
       </p:sp>
+      <p:pic>
+        <p:nvPicPr>
+          <p:cNvPr id="3" name="Picture 2" descr="A diagram of a company&#10;&#10;Description automatically generated">
+            <a:extLst>
+              <a:ext uri="{FF2B5EF4-FFF2-40B4-BE49-F238E27FC236}">
+                <a16:creationId xmlns:a16="http://schemas.microsoft.com/office/drawing/2014/main" id="{A31BD3BA-291B-CDF4-1AE7-5E135E59900D}"/>
+              </a:ext>
+            </a:extLst>
+          </p:cNvPr>
+          <p:cNvPicPr>
+            <a:picLocks noChangeAspect="1"/>
+          </p:cNvPicPr>
+          <p:nvPr/>
+        </p:nvPicPr>
+        <p:blipFill>
+          <a:blip r:embed="rId14"/>
+          <a:stretch>
+            <a:fillRect/>
+          </a:stretch>
+        </p:blipFill>
+        <p:spPr>
+          <a:xfrm>
+            <a:off x="22488889" y="6916887"/>
+            <a:ext cx="12661474" cy="13702051"/>
+          </a:xfrm>
+          <a:prstGeom prst="rect">
+            <a:avLst/>
+          </a:prstGeom>
+        </p:spPr>
+      </p:pic>
     </p:spTree>
     <p:extLst>
       <p:ext uri="{BB962C8B-B14F-4D97-AF65-F5344CB8AC3E}">

</xml_diff>

<commit_message>
modify pdf and poster and submit
</commit_message>
<xml_diff>
--- a/MABC_CONF_2024/Poster_MABC_2024.pptx
+++ b/MABC_CONF_2024/Poster_MABC_2024.pptx
@@ -3944,7 +3944,7 @@
           <a:p>
             <a:pPr algn="ctr"/>
             <a:r>
-              <a:rPr lang="en-US" sz="5400" dirty="0">
+              <a:rPr lang="en-US" sz="5400" b="1" dirty="0">
                 <a:solidFill>
                   <a:schemeClr val="bg1"/>
                 </a:solidFill>
@@ -3991,7 +3991,7 @@
           <a:p>
             <a:pPr algn="ctr"/>
             <a:r>
-              <a:rPr lang="en-US" sz="5400" dirty="0">
+              <a:rPr lang="en-US" sz="5400" b="1" dirty="0">
                 <a:solidFill>
                   <a:schemeClr val="bg1"/>
                 </a:solidFill>
@@ -4038,7 +4038,7 @@
           <a:p>
             <a:pPr algn="ctr"/>
             <a:r>
-              <a:rPr lang="en-US" sz="5400" dirty="0">
+              <a:rPr lang="en-US" sz="5400" b="1" dirty="0">
                 <a:solidFill>
                   <a:schemeClr val="bg1"/>
                 </a:solidFill>
@@ -4343,7 +4343,7 @@
           <a:p>
             <a:pPr algn="ctr"/>
             <a:r>
-              <a:rPr lang="en-US" sz="5400" dirty="0">
+              <a:rPr lang="en-US" sz="5400" b="1" dirty="0">
                 <a:solidFill>
                   <a:schemeClr val="bg1"/>
                 </a:solidFill>
@@ -4634,7 +4634,22 @@
                 <a:latin typeface="Calibri" panose="020F0502020204030204" pitchFamily="34" charset="0"/>
                 <a:cs typeface="Calibri" panose="020F0502020204030204" pitchFamily="34" charset="0"/>
               </a:rPr>
-              <a:t> database also provides standardized terms for tumor names. We used this database to standardize the tumor names from the clinical trials registry. </a:t>
+              <a:t> database also provides standardized terms for tumor names. We used this database to standardize the tumor names from the </a:t>
+            </a:r>
+            <a:r>
+              <a:rPr lang="en-US" sz="3200" dirty="0">
+                <a:latin typeface="Calibri" panose="020F0502020204030204" pitchFamily="34" charset="0"/>
+                <a:cs typeface="Calibri" panose="020F0502020204030204" pitchFamily="34" charset="0"/>
+              </a:rPr>
+              <a:t>CT </a:t>
+            </a:r>
+            <a:r>
+              <a:rPr lang="en-US" sz="3200" dirty="0">
+                <a:effectLst/>
+                <a:latin typeface="Calibri" panose="020F0502020204030204" pitchFamily="34" charset="0"/>
+                <a:cs typeface="Calibri" panose="020F0502020204030204" pitchFamily="34" charset="0"/>
+              </a:rPr>
+              <a:t>registry. </a:t>
             </a:r>
           </a:p>
         </p:txBody>
@@ -4653,7 +4668,7 @@
         </p:nvSpPr>
         <p:spPr>
           <a:xfrm>
-            <a:off x="17327093" y="45699807"/>
+            <a:off x="17403853" y="45351790"/>
             <a:ext cx="20916254" cy="938712"/>
           </a:xfrm>
           <a:prstGeom prst="rect">
@@ -4674,7 +4689,7 @@
           <a:p>
             <a:pPr algn="ctr"/>
             <a:r>
-              <a:rPr lang="en-US" sz="5400" dirty="0">
+              <a:rPr lang="en-US" sz="5400" b="1" dirty="0">
                 <a:solidFill>
                   <a:schemeClr val="bg1"/>
                 </a:solidFill>
@@ -4700,8 +4715,8 @@
         </p:nvSpPr>
         <p:spPr>
           <a:xfrm>
-            <a:off x="260657" y="19348343"/>
-            <a:ext cx="16938935" cy="21786232"/>
+            <a:off x="242639" y="19329488"/>
+            <a:ext cx="16938935" cy="22036802"/>
           </a:xfrm>
           <a:prstGeom prst="rect">
             <a:avLst/>
@@ -4869,7 +4884,7 @@
                 <a:latin typeface="Calibri" panose="020F0502020204030204" pitchFamily="34" charset="0"/>
                 <a:cs typeface="Calibri" panose="020F0502020204030204" pitchFamily="34" charset="0"/>
               </a:rPr>
-              <a:t>.  Therefore, to understand the therapeutic landscape associated with adult and pediatric tumors, it is critical to extract and analyze data from various biomedical databases, especially the National Institutes of Health’s (NIH) Clinical Trials Registry (CT Registry). The CT registry stores data about various aspects of a clinical trial in separate text files in its database. One such file is the conditions file, which informs the users about the conditions/diseases being studied for a clinical trial. Thus, the condition file is the key to extracting cancer information from the CT registry. </a:t>
+              <a:t>.  Therefore, to understand the therapeutic landscape associated with adult and pediatric tumors, it is critical to extract and analyze data from various biomedical databases, especially the National Institutes of Health’s (NIH) Clinical Trials Registry (CT Registry). The CT registry stores data about various aspects of a clinical trial in separate text files in its database. One such file is the conditions file, which informs the users about the conditions/diseases being studied in a particular clinical trial. Thus, the condition file is the key to extracting cancer information from the CT registry. </a:t>
             </a:r>
           </a:p>
           <a:p>
@@ -4908,7 +4923,7 @@
                 <a:latin typeface="Calibri" panose="020F0502020204030204" pitchFamily="34" charset="0"/>
                 <a:cs typeface="Calibri" panose="020F0502020204030204" pitchFamily="34" charset="0"/>
               </a:rPr>
-              <a:t>Even though there are established protocols for submitting data into the CT registry to ensure data integrity, our analysis of the conditions file revealed that the conditions data contain various inconsistencies in the form of extraneous information, typographical errors, missing values, etc. Furthermore, the tumor names need to be extracted from the file from the rest of the conditions, and the tumor names are not necessarily standardized with respect to the World Health Organization's tumor classification system (WHO database) and the National Cancer Institute Thesaurus (</a:t>
+              <a:t>Even though there are established protocols for submitting data into the CT registry to ensure data integrity, our analysis of the conditions file revealed that the conditions data contain various inconsistencies in the form of extraneous information, typographical errors, missing values, etc. Furthermore, the tumor names need to be extracted from the rest of the conditions, and the tumor names are not necessarily standardized with respect to the World Health Organization's tumor classification system (WHO database) or the National Cancer Institute Thesaurus (</a:t>
             </a:r>
             <a:r>
               <a:rPr lang="en-US" sz="3200" dirty="0" err="1">
@@ -4930,7 +4945,7 @@
                 <a:latin typeface="Calibri" panose="020F0502020204030204" pitchFamily="34" charset="0"/>
                 <a:cs typeface="Calibri" panose="020F0502020204030204" pitchFamily="34" charset="0"/>
               </a:rPr>
-              <a:t> database). These discrepancies must be addressed before the data can be used for further downstream analysis.</a:t>
+              <a:t> database). These discrepancies must be addressed before the data can be used for further downstream analysis or data integration.</a:t>
             </a:r>
           </a:p>
           <a:p>
@@ -4984,7 +4999,7 @@
               <a:buAutoNum type="arabicPeriod"/>
             </a:pPr>
             <a:r>
-              <a:rPr lang="en-US" sz="3200" dirty="0">
+              <a:rPr lang="en-US" sz="3200" b="1" dirty="0">
                 <a:solidFill>
                   <a:srgbClr val="0E101A"/>
                 </a:solidFill>
@@ -4992,7 +5007,7 @@
                 <a:latin typeface="Calibri" panose="020F0502020204030204" pitchFamily="34" charset="0"/>
                 <a:cs typeface="Calibri" panose="020F0502020204030204" pitchFamily="34" charset="0"/>
               </a:rPr>
-              <a:t>Extracts tumors from the rest of the conditions file in the CT registry. </a:t>
+              <a:t>Extracts tumors from the rest of the conditions in the CT registry. </a:t>
             </a:r>
           </a:p>
           <a:p>
@@ -5007,7 +5022,7 @@
               <a:buAutoNum type="arabicPeriod"/>
             </a:pPr>
             <a:r>
-              <a:rPr lang="en-US" sz="3200" dirty="0">
+              <a:rPr lang="en-US" sz="3200" b="1" dirty="0">
                 <a:solidFill>
                   <a:srgbClr val="0E101A"/>
                 </a:solidFill>
@@ -5030,7 +5045,7 @@
               <a:buAutoNum type="arabicPeriod"/>
             </a:pPr>
             <a:r>
-              <a:rPr lang="en-US" sz="3200" dirty="0">
+              <a:rPr lang="en-US" sz="3200" b="1" dirty="0">
                 <a:solidFill>
                   <a:srgbClr val="0E101A"/>
                 </a:solidFill>
@@ -5041,7 +5056,7 @@
               <a:t>Standardizes tumors with respect to the WHO and </a:t>
             </a:r>
             <a:r>
-              <a:rPr lang="en-US" sz="3200" dirty="0" err="1">
+              <a:rPr lang="en-US" sz="3200" b="1" dirty="0" err="1">
                 <a:solidFill>
                   <a:srgbClr val="0E101A"/>
                 </a:solidFill>
@@ -5052,7 +5067,7 @@
               <a:t>NCIt</a:t>
             </a:r>
             <a:r>
-              <a:rPr lang="en-US" sz="3200" dirty="0">
+              <a:rPr lang="en-US" sz="3200" b="1" dirty="0">
                 <a:solidFill>
                   <a:srgbClr val="0E101A"/>
                 </a:solidFill>
@@ -5094,7 +5109,7 @@
                 <a:latin typeface="Calibri" panose="020F0502020204030204" pitchFamily="34" charset="0"/>
                 <a:cs typeface="Calibri" panose="020F0502020204030204" pitchFamily="34" charset="0"/>
               </a:rPr>
-              <a:t>We manually validated each of the CT registry condition terms that were identified as tumor by the pipeline. For each tumor that was determined to be a pediatric tumor, we also manually added a citation from peer-reviewed literature, governmental websites, or articles published by a research institution stating that the tumor in question is a pediatric tumor. </a:t>
+              <a:t>We manually validated each of the CT registry condition terms that were identified as tumor by the pipeline. For each tumor that was determined to be a pediatric tumor, we also manually added a citation from peer-reviewed literature, governmental websites, or articles published by research institutions stating that the tumor in question is a pediatric tumor. </a:t>
             </a:r>
             <a:r>
               <a:rPr lang="en-US" sz="3200" dirty="0">
@@ -5125,7 +5140,7 @@
                 <a:latin typeface="Calibri" panose="020F0502020204030204" pitchFamily="34" charset="0"/>
                 <a:cs typeface="Calibri" panose="020F0502020204030204" pitchFamily="34" charset="0"/>
               </a:rPr>
-              <a:t> databases. Text matching methods are based on edit distances, which are a class of metric that quantifies the syntactical differences between strings. The larger the edit distance between two strings, the further apart the strings are; thus, two strings with minimal edit distance could convey the same meaning. Text embeddings, on the other hand, are low-dimensional numeric vector representations of unstructured text data. Unlike edit distances, text embeddings focus on capturing the semantic and contextual meaning of the input text they encode; consequently, in the embedding vector space, texts with similar meanings should have embeddings close to each other, and texts that differ in meaning should be further apart </a:t>
+              <a:t> databases. Text matching methods are based on edit distances, which are a class of metric that quantifies the syntactical differences between strings to measure text similarity. The larger the edit distance between two strings, the further apart the strings are; thus, two strings with minimal edit distance could potentially convey the same meaning. Text embeddings, on the other hand, are low-dimensional numeric vector representations of unstructured text data. Unlike edit distances, text embeddings focus on capturing the semantic and contextual meaning of the input text they encode; consequently, in the embedding space, texts with similar meanings should have embeddings close to each other, and texts that differ in their meaning should be further apart </a:t>
             </a:r>
             <a:r>
               <a:rPr lang="en-US" sz="3200" dirty="0">
@@ -5190,8 +5205,8 @@
         </p:nvSpPr>
         <p:spPr>
           <a:xfrm>
-            <a:off x="17407857" y="20516163"/>
-            <a:ext cx="20646383" cy="15111829"/>
+            <a:off x="17439148" y="20935098"/>
+            <a:ext cx="20880959" cy="15111829"/>
           </a:xfrm>
           <a:prstGeom prst="rect">
             <a:avLst/>
@@ -5748,7 +5763,7 @@
           <a:p>
             <a:pPr algn="ctr"/>
             <a:r>
-              <a:rPr lang="en-US" sz="5400" dirty="0">
+              <a:rPr lang="en-US" sz="5400" b="1" dirty="0">
                 <a:solidFill>
                   <a:schemeClr val="bg1"/>
                 </a:solidFill>
@@ -5775,14 +5790,14 @@
           <p:nvPr>
             <p:extLst>
               <p:ext uri="{D42A27DB-BD31-4B8C-83A1-F6EECF244321}">
-                <p14:modId xmlns:p14="http://schemas.microsoft.com/office/powerpoint/2010/main" val="3981291111"/>
+                <p14:modId xmlns:p14="http://schemas.microsoft.com/office/powerpoint/2010/main" val="3214129268"/>
               </p:ext>
             </p:extLst>
           </p:nvPr>
         </p:nvGraphicFramePr>
         <p:xfrm>
           <a:off x="28819626" y="38859293"/>
-          <a:ext cx="9335860" cy="6399133"/>
+          <a:ext cx="9425154" cy="6399133"/>
         </p:xfrm>
         <a:graphic>
           <a:graphicData uri="http://schemas.openxmlformats.org/drawingml/2006/table">
@@ -5810,7 +5825,7 @@
                     </a:ext>
                   </a:extLst>
                 </a:gridCol>
-                <a:gridCol w="2218444">
+                <a:gridCol w="2307738">
                   <a:extLst>
                     <a:ext uri="{9D8B030D-6E8A-4147-A177-3AD203B41FA5}">
                       <a16:colId xmlns:a16="http://schemas.microsoft.com/office/drawing/2014/main" val="3594090422"/>
@@ -9586,9 +9601,10 @@
           </a:bodyPr>
           <a:lstStyle/>
           <a:p>
+            <a:pPr algn="just"/>
             <a:r>
               <a:rPr lang="en-US" sz="3200" dirty="0"/>
-              <a:t>To evaluate each method's performance accuracies, we needed to annotate the ground truth, i.e., the appropriate standardized tumor nomenclature for each tumor name from the CT registry. Since these annotations are not available, they need to be manually annotated. Since it is not feasible to manually annotate all the 13,230 tumors, we arbitrarily sampled 1600 tumors from the CT registry for manual annotation so that the accuracies of each standardization method could be estimated. However, we limited the ground truth annotation to the 5th edition and the combined editions (3rd, 4th and 5th) of the WHO database. This is because the WHO database is considered the gold standard for tumor nomenclature.  However, we provided the WHO and NCIT standardized terms for each tumor term in the CT registry as supplemental files. </a:t>
+              <a:t>To evaluate each method's performance accuracies, we needed to annotate the ground truth, i.e., the appropriate standardized tumor nomenclature for each tumor name from the CT registry. These annotations are not available in the CT registry, therefore need to be manually annotated. Since it is not feasible to manually annotate all the 13,230 tumors, we arbitrarily sampled 1600 tumors from the CT registry for manual annotation, so that the accuracies of each standardization method could be estimated. However, we limited the ground truth annotation and thereby the accuracy evaluation to the 5th edition and the combined editions (3rd, 4th and 5th) of the WHO database. This is because the WHO database is considered the gold standard for tumor nomenclature.  However, we provided the WHO and NCIT standardized terms for each tumor term in the CT registry as supplemental files. </a:t>
             </a:r>
           </a:p>
         </p:txBody>
@@ -9608,7 +9624,7 @@
           <p:nvPr>
             <p:extLst>
               <p:ext uri="{D42A27DB-BD31-4B8C-83A1-F6EECF244321}">
-                <p14:modId xmlns:p14="http://schemas.microsoft.com/office/powerpoint/2010/main" val="2061342764"/>
+                <p14:modId xmlns:p14="http://schemas.microsoft.com/office/powerpoint/2010/main" val="1678975652"/>
               </p:ext>
             </p:extLst>
           </p:nvPr>
@@ -13239,8 +13255,8 @@
         </p:nvSpPr>
         <p:spPr>
           <a:xfrm>
-            <a:off x="17297533" y="46622663"/>
-            <a:ext cx="20650387" cy="3908762"/>
+            <a:off x="17326055" y="46073842"/>
+            <a:ext cx="21071850" cy="5278368"/>
           </a:xfrm>
           <a:prstGeom prst="rect">
             <a:avLst/>
@@ -13261,7 +13277,7 @@
                 <a:spcPts val="0"/>
               </a:spcAft>
             </a:pPr>
-            <a:endParaRPr lang="en-US" sz="1600" dirty="0">
+            <a:endParaRPr lang="en-US" sz="1900" dirty="0">
               <a:effectLst/>
               <a:latin typeface="Calibri" panose="020F0502020204030204" pitchFamily="34" charset="0"/>
               <a:cs typeface="Calibri" panose="020F0502020204030204" pitchFamily="34" charset="0"/>
@@ -13279,7 +13295,7 @@
               <a:buAutoNum type="arabicPeriod"/>
             </a:pPr>
             <a:r>
-              <a:rPr lang="en-US" sz="1600" dirty="0">
+              <a:rPr lang="en-US" sz="2000" dirty="0">
                 <a:effectLst/>
                 <a:latin typeface="Calibri" panose="020F0502020204030204" pitchFamily="34" charset="0"/>
                 <a:cs typeface="Calibri" panose="020F0502020204030204" pitchFamily="34" charset="0"/>
@@ -13287,7 +13303,7 @@
               <a:t>Bray F, Laversanne M, Sung H, </a:t>
             </a:r>
             <a:r>
-              <a:rPr lang="en-US" sz="1600" i="1" dirty="0">
+              <a:rPr lang="en-US" sz="2000" i="1" dirty="0">
                 <a:effectLst/>
                 <a:latin typeface="Calibri" panose="020F0502020204030204" pitchFamily="34" charset="0"/>
                 <a:cs typeface="Calibri" panose="020F0502020204030204" pitchFamily="34" charset="0"/>
@@ -13295,7 +13311,7 @@
               <a:t>et al.</a:t>
             </a:r>
             <a:r>
-              <a:rPr lang="en-US" sz="1600" dirty="0">
+              <a:rPr lang="en-US" sz="2000" dirty="0">
                 <a:effectLst/>
                 <a:latin typeface="Calibri" panose="020F0502020204030204" pitchFamily="34" charset="0"/>
                 <a:cs typeface="Calibri" panose="020F0502020204030204" pitchFamily="34" charset="0"/>
@@ -13303,7 +13319,7 @@
               <a:t> Global cancer statistics 2022: GLOBOCAN estimates of incidence and mortality worldwide for 36 cancers in 185 countries. </a:t>
             </a:r>
             <a:r>
-              <a:rPr lang="en-US" sz="1600" i="1" dirty="0">
+              <a:rPr lang="en-US" sz="2000" i="1" dirty="0">
                 <a:effectLst/>
                 <a:latin typeface="Calibri" panose="020F0502020204030204" pitchFamily="34" charset="0"/>
                 <a:cs typeface="Calibri" panose="020F0502020204030204" pitchFamily="34" charset="0"/>
@@ -13311,7 +13327,7 @@
               <a:t>CA Cancer J Clin</a:t>
             </a:r>
             <a:r>
-              <a:rPr lang="en-US" sz="1600" dirty="0">
+              <a:rPr lang="en-US" sz="2000" dirty="0">
                 <a:effectLst/>
                 <a:latin typeface="Calibri" panose="020F0502020204030204" pitchFamily="34" charset="0"/>
                 <a:cs typeface="Calibri" panose="020F0502020204030204" pitchFamily="34" charset="0"/>
@@ -13331,7 +13347,7 @@
               <a:buAutoNum type="arabicPeriod"/>
             </a:pPr>
             <a:r>
-              <a:rPr lang="en-US" sz="1600" dirty="0">
+              <a:rPr lang="en-US" sz="2000" dirty="0">
                 <a:effectLst/>
                 <a:latin typeface="Calibri" panose="020F0502020204030204" pitchFamily="34" charset="0"/>
                 <a:cs typeface="Calibri" panose="020F0502020204030204" pitchFamily="34" charset="0"/>
@@ -13339,7 +13355,7 @@
               <a:t> Siegel RL, Giaquinto AN, Jemal A. Cancer statistics, 2024. </a:t>
             </a:r>
             <a:r>
-              <a:rPr lang="en-US" sz="1600" i="1" dirty="0">
+              <a:rPr lang="en-US" sz="2000" i="1" dirty="0">
                 <a:effectLst/>
                 <a:latin typeface="Calibri" panose="020F0502020204030204" pitchFamily="34" charset="0"/>
                 <a:cs typeface="Calibri" panose="020F0502020204030204" pitchFamily="34" charset="0"/>
@@ -13347,7 +13363,7 @@
               <a:t>CA Cancer J Clin</a:t>
             </a:r>
             <a:r>
-              <a:rPr lang="en-US" sz="1600" dirty="0">
+              <a:rPr lang="en-US" sz="2000" dirty="0">
                 <a:effectLst/>
                 <a:latin typeface="Calibri" panose="020F0502020204030204" pitchFamily="34" charset="0"/>
                 <a:cs typeface="Calibri" panose="020F0502020204030204" pitchFamily="34" charset="0"/>
@@ -13367,7 +13383,7 @@
               <a:buAutoNum type="arabicPeriod"/>
             </a:pPr>
             <a:r>
-              <a:rPr lang="en-US" sz="1600" dirty="0">
+              <a:rPr lang="en-US" sz="2000" dirty="0">
                 <a:effectLst/>
                 <a:latin typeface="Calibri" panose="020F0502020204030204" pitchFamily="34" charset="0"/>
                 <a:cs typeface="Calibri" panose="020F0502020204030204" pitchFamily="34" charset="0"/>
@@ -13375,7 +13391,7 @@
               <a:t>Matt GY, Sioson E, Shelton K, </a:t>
             </a:r>
             <a:r>
-              <a:rPr lang="en-US" sz="1600" i="1" dirty="0">
+              <a:rPr lang="en-US" sz="2000" i="1" dirty="0">
                 <a:effectLst/>
                 <a:latin typeface="Calibri" panose="020F0502020204030204" pitchFamily="34" charset="0"/>
                 <a:cs typeface="Calibri" panose="020F0502020204030204" pitchFamily="34" charset="0"/>
@@ -13383,7 +13399,7 @@
               <a:t>et al.</a:t>
             </a:r>
             <a:r>
-              <a:rPr lang="en-US" sz="1600" dirty="0">
+              <a:rPr lang="en-US" sz="2000" dirty="0">
                 <a:effectLst/>
                 <a:latin typeface="Calibri" panose="020F0502020204030204" pitchFamily="34" charset="0"/>
                 <a:cs typeface="Calibri" panose="020F0502020204030204" pitchFamily="34" charset="0"/>
@@ -13391,7 +13407,7 @@
               <a:t> St. Jude Survivorship Portal: Sharing and Analyzing Large Clinical and Genomic Datasets from Pediatric Cancer Survivors. </a:t>
             </a:r>
             <a:r>
-              <a:rPr lang="en-US" sz="1600" i="1" dirty="0">
+              <a:rPr lang="en-US" sz="2000" i="1" dirty="0">
                 <a:effectLst/>
                 <a:latin typeface="Calibri" panose="020F0502020204030204" pitchFamily="34" charset="0"/>
                 <a:cs typeface="Calibri" panose="020F0502020204030204" pitchFamily="34" charset="0"/>
@@ -13399,7 +13415,7 @@
               <a:t>Cancer Discov</a:t>
             </a:r>
             <a:r>
-              <a:rPr lang="en-US" sz="1600" dirty="0">
+              <a:rPr lang="en-US" sz="2000" dirty="0">
                 <a:effectLst/>
                 <a:latin typeface="Calibri" panose="020F0502020204030204" pitchFamily="34" charset="0"/>
                 <a:cs typeface="Calibri" panose="020F0502020204030204" pitchFamily="34" charset="0"/>
@@ -13419,7 +13435,7 @@
               <a:buAutoNum type="arabicPeriod"/>
             </a:pPr>
             <a:r>
-              <a:rPr lang="en-US" sz="1600" dirty="0">
+              <a:rPr lang="en-US" sz="2000" dirty="0">
                 <a:effectLst/>
                 <a:latin typeface="Calibri" panose="020F0502020204030204" pitchFamily="34" charset="0"/>
                 <a:cs typeface="Calibri" panose="020F0502020204030204" pitchFamily="34" charset="0"/>
@@ -13427,7 +13443,7 @@
               <a:t>Aristizabal P, Winestone LE, Umaretiya P, </a:t>
             </a:r>
             <a:r>
-              <a:rPr lang="en-US" sz="1600" i="1" dirty="0">
+              <a:rPr lang="en-US" sz="2000" i="1" dirty="0">
                 <a:effectLst/>
                 <a:latin typeface="Calibri" panose="020F0502020204030204" pitchFamily="34" charset="0"/>
                 <a:cs typeface="Calibri" panose="020F0502020204030204" pitchFamily="34" charset="0"/>
@@ -13435,7 +13451,7 @@
               <a:t>et al.</a:t>
             </a:r>
             <a:r>
-              <a:rPr lang="en-US" sz="1600" dirty="0">
+              <a:rPr lang="en-US" sz="2000" dirty="0">
                 <a:effectLst/>
                 <a:latin typeface="Calibri" panose="020F0502020204030204" pitchFamily="34" charset="0"/>
                 <a:cs typeface="Calibri" panose="020F0502020204030204" pitchFamily="34" charset="0"/>
@@ -13443,7 +13459,7 @@
               <a:t> Disparities in Pediatric Oncology: The 21st Century Opportunity to Improve Outcomes for Children and Adolescents With Cancer. </a:t>
             </a:r>
             <a:r>
-              <a:rPr lang="en-US" sz="1600" i="1" dirty="0">
+              <a:rPr lang="en-US" sz="2000" i="1" dirty="0">
                 <a:effectLst/>
                 <a:latin typeface="Calibri" panose="020F0502020204030204" pitchFamily="34" charset="0"/>
                 <a:cs typeface="Calibri" panose="020F0502020204030204" pitchFamily="34" charset="0"/>
@@ -13451,7 +13467,7 @@
               <a:t>Am Soc Clin Oncol Educ Book</a:t>
             </a:r>
             <a:r>
-              <a:rPr lang="en-US" sz="1600" dirty="0">
+              <a:rPr lang="en-US" sz="2000" dirty="0">
                 <a:effectLst/>
                 <a:latin typeface="Calibri" panose="020F0502020204030204" pitchFamily="34" charset="0"/>
                 <a:cs typeface="Calibri" panose="020F0502020204030204" pitchFamily="34" charset="0"/>
@@ -13471,7 +13487,7 @@
               <a:buAutoNum type="arabicPeriod"/>
             </a:pPr>
             <a:r>
-              <a:rPr lang="en-US" sz="1600" dirty="0">
+              <a:rPr lang="en-US" sz="2000" dirty="0">
                 <a:effectLst/>
                 <a:latin typeface="Calibri" panose="020F0502020204030204" pitchFamily="34" charset="0"/>
                 <a:cs typeface="Calibri" panose="020F0502020204030204" pitchFamily="34" charset="0"/>
@@ -13479,7 +13495,7 @@
               <a:t> Hunger Stephen P., Mullighan Charles G. Acute Lymphoblastic Leukemia in Children. </a:t>
             </a:r>
             <a:r>
-              <a:rPr lang="en-US" sz="1600" i="1" dirty="0">
+              <a:rPr lang="en-US" sz="2000" i="1" dirty="0">
                 <a:effectLst/>
                 <a:latin typeface="Calibri" panose="020F0502020204030204" pitchFamily="34" charset="0"/>
                 <a:cs typeface="Calibri" panose="020F0502020204030204" pitchFamily="34" charset="0"/>
@@ -13487,7 +13503,7 @@
               <a:t>N Engl J Med</a:t>
             </a:r>
             <a:r>
-              <a:rPr lang="en-US" sz="1600" dirty="0">
+              <a:rPr lang="en-US" sz="2000" dirty="0">
                 <a:effectLst/>
                 <a:latin typeface="Calibri" panose="020F0502020204030204" pitchFamily="34" charset="0"/>
                 <a:cs typeface="Calibri" panose="020F0502020204030204" pitchFamily="34" charset="0"/>
@@ -13507,7 +13523,7 @@
               <a:buAutoNum type="arabicPeriod"/>
             </a:pPr>
             <a:r>
-              <a:rPr lang="en-US" sz="1600" dirty="0">
+              <a:rPr lang="en-US" sz="2000" dirty="0">
                 <a:effectLst/>
                 <a:latin typeface="Calibri" panose="020F0502020204030204" pitchFamily="34" charset="0"/>
                 <a:cs typeface="Calibri" panose="020F0502020204030204" pitchFamily="34" charset="0"/>
@@ -13515,7 +13531,7 @@
               <a:t> Laetsch TW, DuBois SG, Bender JG, </a:t>
             </a:r>
             <a:r>
-              <a:rPr lang="en-US" sz="1600" i="1" dirty="0">
+              <a:rPr lang="en-US" sz="2000" i="1" dirty="0">
                 <a:effectLst/>
                 <a:latin typeface="Calibri" panose="020F0502020204030204" pitchFamily="34" charset="0"/>
                 <a:cs typeface="Calibri" panose="020F0502020204030204" pitchFamily="34" charset="0"/>
@@ -13523,7 +13539,7 @@
               <a:t>et al.</a:t>
             </a:r>
             <a:r>
-              <a:rPr lang="en-US" sz="1600" dirty="0">
+              <a:rPr lang="en-US" sz="2000" dirty="0">
                 <a:effectLst/>
                 <a:latin typeface="Calibri" panose="020F0502020204030204" pitchFamily="34" charset="0"/>
                 <a:cs typeface="Calibri" panose="020F0502020204030204" pitchFamily="34" charset="0"/>
@@ -13531,7 +13547,7 @@
               <a:t> Opportunities and Challenges in Drug Development for Pediatric Cancers. </a:t>
             </a:r>
             <a:r>
-              <a:rPr lang="en-US" sz="1600" i="1" dirty="0">
+              <a:rPr lang="en-US" sz="2000" i="1" dirty="0">
                 <a:effectLst/>
                 <a:latin typeface="Calibri" panose="020F0502020204030204" pitchFamily="34" charset="0"/>
                 <a:cs typeface="Calibri" panose="020F0502020204030204" pitchFamily="34" charset="0"/>
@@ -13539,7 +13555,7 @@
               <a:t>Cancer Discov</a:t>
             </a:r>
             <a:r>
-              <a:rPr lang="en-US" sz="1600" dirty="0">
+              <a:rPr lang="en-US" sz="2000" dirty="0">
                 <a:effectLst/>
                 <a:latin typeface="Calibri" panose="020F0502020204030204" pitchFamily="34" charset="0"/>
                 <a:cs typeface="Calibri" panose="020F0502020204030204" pitchFamily="34" charset="0"/>
@@ -13559,7 +13575,7 @@
               <a:buAutoNum type="arabicPeriod"/>
             </a:pPr>
             <a:r>
-              <a:rPr lang="en-US" sz="1600" dirty="0">
+              <a:rPr lang="en-US" sz="2000" dirty="0">
                 <a:effectLst/>
                 <a:latin typeface="Calibri" panose="020F0502020204030204" pitchFamily="34" charset="0"/>
                 <a:cs typeface="Calibri" panose="020F0502020204030204" pitchFamily="34" charset="0"/>
@@ -13567,7 +13583,7 @@
               <a:t> Renfro LA, Ji L, Piao J, </a:t>
             </a:r>
             <a:r>
-              <a:rPr lang="en-US" sz="1600" i="1" dirty="0">
+              <a:rPr lang="en-US" sz="2000" i="1" dirty="0">
                 <a:effectLst/>
                 <a:latin typeface="Calibri" panose="020F0502020204030204" pitchFamily="34" charset="0"/>
                 <a:cs typeface="Calibri" panose="020F0502020204030204" pitchFamily="34" charset="0"/>
@@ -13575,7 +13591,7 @@
               <a:t>et al.</a:t>
             </a:r>
             <a:r>
-              <a:rPr lang="en-US" sz="1600" dirty="0">
+              <a:rPr lang="en-US" sz="2000" dirty="0">
                 <a:effectLst/>
                 <a:latin typeface="Calibri" panose="020F0502020204030204" pitchFamily="34" charset="0"/>
                 <a:cs typeface="Calibri" panose="020F0502020204030204" pitchFamily="34" charset="0"/>
@@ -13583,7 +13599,7 @@
               <a:t> Trial Design Challenges and Approaches for Precision Oncology in Rare Tumors: Experiences of the Children’s Oncology Group. </a:t>
             </a:r>
             <a:r>
-              <a:rPr lang="en-US" sz="1600" i="1" dirty="0">
+              <a:rPr lang="en-US" sz="2000" i="1" dirty="0">
                 <a:effectLst/>
                 <a:latin typeface="Calibri" panose="020F0502020204030204" pitchFamily="34" charset="0"/>
                 <a:cs typeface="Calibri" panose="020F0502020204030204" pitchFamily="34" charset="0"/>
@@ -13591,7 +13607,7 @@
               <a:t>JCO Precis Oncol</a:t>
             </a:r>
             <a:r>
-              <a:rPr lang="en-US" sz="1600" dirty="0">
+              <a:rPr lang="en-US" sz="2000" dirty="0">
                 <a:effectLst/>
                 <a:latin typeface="Calibri" panose="020F0502020204030204" pitchFamily="34" charset="0"/>
                 <a:cs typeface="Calibri" panose="020F0502020204030204" pitchFamily="34" charset="0"/>
@@ -13611,7 +13627,7 @@
               <a:buAutoNum type="arabicPeriod"/>
             </a:pPr>
             <a:r>
-              <a:rPr lang="en-US" sz="1600" dirty="0">
+              <a:rPr lang="en-US" sz="2000" dirty="0">
                 <a:effectLst/>
                 <a:latin typeface="Calibri" panose="020F0502020204030204" pitchFamily="34" charset="0"/>
                 <a:cs typeface="Calibri" panose="020F0502020204030204" pitchFamily="34" charset="0"/>
@@ -13619,7 +13635,7 @@
               <a:t> Rivers Z, Hyde B, Ronski K, </a:t>
             </a:r>
             <a:r>
-              <a:rPr lang="en-US" sz="1600" i="1" dirty="0">
+              <a:rPr lang="en-US" sz="2000" i="1" dirty="0">
                 <a:effectLst/>
                 <a:latin typeface="Calibri" panose="020F0502020204030204" pitchFamily="34" charset="0"/>
                 <a:cs typeface="Calibri" panose="020F0502020204030204" pitchFamily="34" charset="0"/>
@@ -13627,7 +13643,7 @@
               <a:t>et al.</a:t>
             </a:r>
             <a:r>
-              <a:rPr lang="en-US" sz="1600" dirty="0">
+              <a:rPr lang="en-US" sz="2000" dirty="0">
                 <a:effectLst/>
                 <a:latin typeface="Calibri" panose="020F0502020204030204" pitchFamily="34" charset="0"/>
                 <a:cs typeface="Calibri" panose="020F0502020204030204" pitchFamily="34" charset="0"/>
@@ -13635,7 +13651,7 @@
               <a:t> Exploring Barriers to Pediatric Cancer Clinical Trials: The Role of a Networked, Just-in-Time Study Program. </a:t>
             </a:r>
             <a:r>
-              <a:rPr lang="en-US" sz="1600" i="1" dirty="0">
+              <a:rPr lang="en-US" sz="2000" i="1" dirty="0">
                 <a:effectLst/>
                 <a:latin typeface="Calibri" panose="020F0502020204030204" pitchFamily="34" charset="0"/>
                 <a:cs typeface="Calibri" panose="020F0502020204030204" pitchFamily="34" charset="0"/>
@@ -13643,7 +13659,7 @@
               <a:t>Clin Ther</a:t>
             </a:r>
             <a:r>
-              <a:rPr lang="en-US" sz="1600" dirty="0">
+              <a:rPr lang="en-US" sz="2000" dirty="0">
                 <a:effectLst/>
                 <a:latin typeface="Calibri" panose="020F0502020204030204" pitchFamily="34" charset="0"/>
                 <a:cs typeface="Calibri" panose="020F0502020204030204" pitchFamily="34" charset="0"/>
@@ -13663,7 +13679,7 @@
               <a:buAutoNum type="arabicPeriod"/>
             </a:pPr>
             <a:r>
-              <a:rPr lang="en-US" sz="1600" dirty="0">
+              <a:rPr lang="en-US" sz="2000" dirty="0">
                 <a:effectLst/>
                 <a:latin typeface="Calibri" panose="020F0502020204030204" pitchFamily="34" charset="0"/>
                 <a:cs typeface="Calibri" panose="020F0502020204030204" pitchFamily="34" charset="0"/>
@@ -13671,7 +13687,7 @@
               <a:t> Morris J, Kuleshov V, Shmatikov V, </a:t>
             </a:r>
             <a:r>
-              <a:rPr lang="en-US" sz="1600" i="1" dirty="0">
+              <a:rPr lang="en-US" sz="2000" i="1" dirty="0">
                 <a:effectLst/>
                 <a:latin typeface="Calibri" panose="020F0502020204030204" pitchFamily="34" charset="0"/>
                 <a:cs typeface="Calibri" panose="020F0502020204030204" pitchFamily="34" charset="0"/>
@@ -13679,7 +13695,7 @@
               <a:t>et al.</a:t>
             </a:r>
             <a:r>
-              <a:rPr lang="en-US" sz="1600" dirty="0">
+              <a:rPr lang="en-US" sz="2000" dirty="0">
                 <a:effectLst/>
                 <a:latin typeface="Calibri" panose="020F0502020204030204" pitchFamily="34" charset="0"/>
                 <a:cs typeface="Calibri" panose="020F0502020204030204" pitchFamily="34" charset="0"/>
@@ -13687,7 +13703,7 @@
               <a:t> Text embeddings reveal (almost) as much as text. </a:t>
             </a:r>
             <a:r>
-              <a:rPr lang="en-US" sz="1600" i="1" dirty="0">
+              <a:rPr lang="en-US" sz="2000" i="1" dirty="0">
                 <a:effectLst/>
                 <a:latin typeface="Calibri" panose="020F0502020204030204" pitchFamily="34" charset="0"/>
                 <a:cs typeface="Calibri" panose="020F0502020204030204" pitchFamily="34" charset="0"/>
@@ -13695,7 +13711,7 @@
               <a:t>Proceedings of the 2023 Conference on Empirical Methods in Natural Language Processing</a:t>
             </a:r>
             <a:r>
-              <a:rPr lang="en-US" sz="1600" dirty="0">
+              <a:rPr lang="en-US" sz="2000" dirty="0">
                 <a:effectLst/>
                 <a:latin typeface="Calibri" panose="020F0502020204030204" pitchFamily="34" charset="0"/>
                 <a:cs typeface="Calibri" panose="020F0502020204030204" pitchFamily="34" charset="0"/>
@@ -13715,7 +13731,7 @@
               <a:buAutoNum type="arabicPeriod"/>
             </a:pPr>
             <a:r>
-              <a:rPr lang="en-US" sz="1600" dirty="0">
+              <a:rPr lang="en-US" sz="2000" dirty="0">
                 <a:effectLst/>
                 <a:latin typeface="Calibri" panose="020F0502020204030204" pitchFamily="34" charset="0"/>
                 <a:cs typeface="Calibri" panose="020F0502020204030204" pitchFamily="34" charset="0"/>
@@ -13723,7 +13739,7 @@
               <a:t> Mikolov T. Efficient estimation of word representations in vector space. </a:t>
             </a:r>
             <a:r>
-              <a:rPr lang="en-US" sz="1600" i="1" dirty="0">
+              <a:rPr lang="en-US" sz="2000" i="1" dirty="0">
                 <a:effectLst/>
                 <a:latin typeface="Calibri" panose="020F0502020204030204" pitchFamily="34" charset="0"/>
                 <a:cs typeface="Calibri" panose="020F0502020204030204" pitchFamily="34" charset="0"/>
@@ -13731,7 +13747,7 @@
               <a:t>arXiv preprint arXiv:13013781</a:t>
             </a:r>
             <a:r>
-              <a:rPr lang="en-US" sz="1600" dirty="0">
+              <a:rPr lang="en-US" sz="2000" dirty="0">
                 <a:effectLst/>
                 <a:latin typeface="Calibri" panose="020F0502020204030204" pitchFamily="34" charset="0"/>
                 <a:cs typeface="Calibri" panose="020F0502020204030204" pitchFamily="34" charset="0"/>
@@ -13751,7 +13767,7 @@
               <a:buAutoNum type="arabicPeriod"/>
             </a:pPr>
             <a:r>
-              <a:rPr lang="en-US" sz="1600" dirty="0">
+              <a:rPr lang="en-US" sz="2000" dirty="0">
                 <a:effectLst/>
                 <a:latin typeface="Calibri" panose="020F0502020204030204" pitchFamily="34" charset="0"/>
                 <a:cs typeface="Calibri" panose="020F0502020204030204" pitchFamily="34" charset="0"/>
@@ -13759,7 +13775,7 @@
               <a:t> Incitti F, Urli F, Snidaro L. Beyond word embeddings: A survey. </a:t>
             </a:r>
             <a:r>
-              <a:rPr lang="en-US" sz="1600" i="1" dirty="0">
+              <a:rPr lang="en-US" sz="2000" i="1" dirty="0">
                 <a:effectLst/>
                 <a:latin typeface="Calibri" panose="020F0502020204030204" pitchFamily="34" charset="0"/>
                 <a:cs typeface="Calibri" panose="020F0502020204030204" pitchFamily="34" charset="0"/>
@@ -13767,7 +13783,7 @@
               <a:t>Inf Fusion</a:t>
             </a:r>
             <a:r>
-              <a:rPr lang="en-US" sz="1600" dirty="0">
+              <a:rPr lang="en-US" sz="2000" dirty="0">
                 <a:effectLst/>
                 <a:latin typeface="Calibri" panose="020F0502020204030204" pitchFamily="34" charset="0"/>
                 <a:cs typeface="Calibri" panose="020F0502020204030204" pitchFamily="34" charset="0"/>
@@ -13787,7 +13803,7 @@
               <a:buAutoNum type="arabicPeriod"/>
             </a:pPr>
             <a:r>
-              <a:rPr lang="en-US" sz="1600" dirty="0">
+              <a:rPr lang="en-US" sz="2000" dirty="0">
                 <a:effectLst/>
                 <a:latin typeface="Calibri" panose="020F0502020204030204" pitchFamily="34" charset="0"/>
                 <a:cs typeface="Calibri" panose="020F0502020204030204" pitchFamily="34" charset="0"/>
@@ -13795,7 +13811,7 @@
               <a:t> Khattak FK, Jeblee S, Pou-Prom C, </a:t>
             </a:r>
             <a:r>
-              <a:rPr lang="en-US" sz="1600" i="1" dirty="0">
+              <a:rPr lang="en-US" sz="2000" i="1" dirty="0">
                 <a:effectLst/>
                 <a:latin typeface="Calibri" panose="020F0502020204030204" pitchFamily="34" charset="0"/>
                 <a:cs typeface="Calibri" panose="020F0502020204030204" pitchFamily="34" charset="0"/>
@@ -13803,7 +13819,7 @@
               <a:t>et al.</a:t>
             </a:r>
             <a:r>
-              <a:rPr lang="en-US" sz="1600" dirty="0">
+              <a:rPr lang="en-US" sz="2000" dirty="0">
                 <a:effectLst/>
                 <a:latin typeface="Calibri" panose="020F0502020204030204" pitchFamily="34" charset="0"/>
                 <a:cs typeface="Calibri" panose="020F0502020204030204" pitchFamily="34" charset="0"/>
@@ -13811,7 +13827,7 @@
               <a:t> A survey of word embeddings for clinical text. </a:t>
             </a:r>
             <a:r>
-              <a:rPr lang="en-US" sz="1600" i="1" dirty="0">
+              <a:rPr lang="en-US" sz="2000" i="1" dirty="0">
                 <a:effectLst/>
                 <a:latin typeface="Calibri" panose="020F0502020204030204" pitchFamily="34" charset="0"/>
                 <a:cs typeface="Calibri" panose="020F0502020204030204" pitchFamily="34" charset="0"/>
@@ -13819,7 +13835,7 @@
               <a:t>J Biomed Inform</a:t>
             </a:r>
             <a:r>
-              <a:rPr lang="en-US" sz="1600" dirty="0">
+              <a:rPr lang="en-US" sz="2000" dirty="0">
                 <a:effectLst/>
                 <a:latin typeface="Calibri" panose="020F0502020204030204" pitchFamily="34" charset="0"/>
                 <a:cs typeface="Calibri" panose="020F0502020204030204" pitchFamily="34" charset="0"/>
@@ -13854,8 +13870,8 @@
         </p:blipFill>
         <p:spPr>
           <a:xfrm>
-            <a:off x="22488889" y="6916887"/>
-            <a:ext cx="12661474" cy="13702051"/>
+            <a:off x="22313280" y="6975750"/>
+            <a:ext cx="13012691" cy="14082133"/>
           </a:xfrm>
           <a:prstGeom prst="rect">
             <a:avLst/>

</xml_diff>